<commit_message>
Final Changes for Aug 12 coursework today
</commit_message>
<xml_diff>
--- a/Teaching/Chemistry/FCC Chem 3A Chap  1 Content.pptx
+++ b/Teaching/Chemistry/FCC Chem 3A Chap  1 Content.pptx
@@ -5,7 +5,7 @@
     <p:sldMasterId id="2147483803" r:id="rId1"/>
   </p:sldMasterIdLst>
   <p:notesMasterIdLst>
-    <p:notesMasterId r:id="rId34"/>
+    <p:notesMasterId r:id="rId35"/>
   </p:notesMasterIdLst>
   <p:sldIdLst>
     <p:sldId id="608" r:id="rId2"/>
@@ -27,19 +27,20 @@
     <p:sldId id="831" r:id="rId18"/>
     <p:sldId id="834" r:id="rId19"/>
     <p:sldId id="830" r:id="rId20"/>
-    <p:sldId id="832" r:id="rId21"/>
-    <p:sldId id="821" r:id="rId22"/>
-    <p:sldId id="823" r:id="rId23"/>
-    <p:sldId id="805" r:id="rId24"/>
-    <p:sldId id="835" r:id="rId25"/>
-    <p:sldId id="836" r:id="rId26"/>
-    <p:sldId id="838" r:id="rId27"/>
-    <p:sldId id="839" r:id="rId28"/>
-    <p:sldId id="827" r:id="rId29"/>
-    <p:sldId id="807" r:id="rId30"/>
-    <p:sldId id="828" r:id="rId31"/>
-    <p:sldId id="808" r:id="rId32"/>
-    <p:sldId id="829" r:id="rId33"/>
+    <p:sldId id="841" r:id="rId21"/>
+    <p:sldId id="832" r:id="rId22"/>
+    <p:sldId id="821" r:id="rId23"/>
+    <p:sldId id="823" r:id="rId24"/>
+    <p:sldId id="805" r:id="rId25"/>
+    <p:sldId id="835" r:id="rId26"/>
+    <p:sldId id="836" r:id="rId27"/>
+    <p:sldId id="838" r:id="rId28"/>
+    <p:sldId id="839" r:id="rId29"/>
+    <p:sldId id="827" r:id="rId30"/>
+    <p:sldId id="807" r:id="rId31"/>
+    <p:sldId id="828" r:id="rId32"/>
+    <p:sldId id="808" r:id="rId33"/>
+    <p:sldId id="829" r:id="rId34"/>
   </p:sldIdLst>
   <p:sldSz cx="9144000" cy="6858000" type="screen4x3"/>
   <p:notesSz cx="7315200" cy="9601200"/>
@@ -24047,6 +24048,88 @@
 <file path=ppt/slides/slide20.xml><?xml version="1.0" encoding="utf-8"?>
 <p:sld xmlns:a="http://schemas.openxmlformats.org/drawingml/2006/main" xmlns:r="http://schemas.openxmlformats.org/officeDocument/2006/relationships" xmlns:p="http://schemas.openxmlformats.org/presentationml/2006/main">
   <p:cSld>
+    <p:bg>
+      <p:bgPr>
+        <a:gradFill>
+          <a:gsLst>
+            <a:gs pos="51000">
+              <a:srgbClr val="C00000"/>
+            </a:gs>
+            <a:gs pos="0">
+              <a:srgbClr val="FF0000"/>
+            </a:gs>
+            <a:gs pos="100000">
+              <a:srgbClr val="FFFF00"/>
+            </a:gs>
+          </a:gsLst>
+          <a:lin ang="2700000" scaled="1"/>
+        </a:gradFill>
+        <a:effectLst/>
+      </p:bgPr>
+    </p:bg>
+    <p:spTree>
+      <p:nvGrpSpPr>
+        <p:cNvPr id="1" name=""/>
+        <p:cNvGrpSpPr/>
+        <p:nvPr/>
+      </p:nvGrpSpPr>
+      <p:grpSpPr>
+        <a:xfrm>
+          <a:off x="0" y="0"/>
+          <a:ext cx="0" cy="0"/>
+          <a:chOff x="0" y="0"/>
+          <a:chExt cx="0" cy="0"/>
+        </a:xfrm>
+      </p:grpSpPr>
+      <p:sp>
+        <p:nvSpPr>
+          <p:cNvPr id="2" name="Title 1">
+            <a:extLst>
+              <a:ext uri="{FF2B5EF4-FFF2-40B4-BE49-F238E27FC236}">
+                <a16:creationId xmlns:a16="http://schemas.microsoft.com/office/drawing/2014/main" id="{60AB58A2-A058-5A39-5353-68BA0B1E81FB}"/>
+              </a:ext>
+            </a:extLst>
+          </p:cNvPr>
+          <p:cNvSpPr>
+            <a:spLocks noGrp="1"/>
+          </p:cNvSpPr>
+          <p:nvPr>
+            <p:ph type="title"/>
+          </p:nvPr>
+        </p:nvSpPr>
+        <p:spPr>
+          <a:xfrm>
+            <a:off x="361244" y="413947"/>
+            <a:ext cx="8421512" cy="6217087"/>
+          </a:xfrm>
+        </p:spPr>
+        <p:txBody>
+          <a:bodyPr/>
+          <a:lstStyle/>
+          <a:p>
+            <a:r>
+              <a:rPr lang="en-US" sz="19900" dirty="0"/>
+              <a:t>EDIT NEXT</a:t>
+            </a:r>
+          </a:p>
+        </p:txBody>
+      </p:sp>
+    </p:spTree>
+    <p:extLst>
+      <p:ext uri="{BB962C8B-B14F-4D97-AF65-F5344CB8AC3E}">
+        <p14:creationId xmlns:p14="http://schemas.microsoft.com/office/powerpoint/2010/main" val="179474474"/>
+      </p:ext>
+    </p:extLst>
+  </p:cSld>
+  <p:clrMapOvr>
+    <a:masterClrMapping/>
+  </p:clrMapOvr>
+</p:sld>
+</file>
+
+<file path=ppt/slides/slide21.xml><?xml version="1.0" encoding="utf-8"?>
+<p:sld xmlns:a="http://schemas.openxmlformats.org/drawingml/2006/main" xmlns:r="http://schemas.openxmlformats.org/officeDocument/2006/relationships" xmlns:p="http://schemas.openxmlformats.org/presentationml/2006/main">
+  <p:cSld>
     <p:spTree>
       <p:nvGrpSpPr>
         <p:cNvPr id="1" name="">
@@ -24142,7 +24225,7 @@
 </p:sld>
 </file>
 
-<file path=ppt/slides/slide21.xml><?xml version="1.0" encoding="utf-8"?>
+<file path=ppt/slides/slide22.xml><?xml version="1.0" encoding="utf-8"?>
 <p:sld xmlns:a="http://schemas.openxmlformats.org/drawingml/2006/main" xmlns:r="http://schemas.openxmlformats.org/officeDocument/2006/relationships" xmlns:p="http://schemas.openxmlformats.org/presentationml/2006/main">
   <p:cSld>
     <p:spTree>
@@ -24391,7 +24474,7 @@
 </p:sld>
 </file>
 
-<file path=ppt/slides/slide22.xml><?xml version="1.0" encoding="utf-8"?>
+<file path=ppt/slides/slide23.xml><?xml version="1.0" encoding="utf-8"?>
 <p:sld xmlns:a="http://schemas.openxmlformats.org/drawingml/2006/main" xmlns:r="http://schemas.openxmlformats.org/officeDocument/2006/relationships" xmlns:p="http://schemas.openxmlformats.org/presentationml/2006/main">
   <p:cSld>
     <p:spTree>
@@ -25545,7 +25628,7 @@
 </p:sld>
 </file>
 
-<file path=ppt/slides/slide23.xml><?xml version="1.0" encoding="utf-8"?>
+<file path=ppt/slides/slide24.xml><?xml version="1.0" encoding="utf-8"?>
 <p:sld xmlns:a="http://schemas.openxmlformats.org/drawingml/2006/main" xmlns:r="http://schemas.openxmlformats.org/officeDocument/2006/relationships" xmlns:p="http://schemas.openxmlformats.org/presentationml/2006/main">
   <p:cSld>
     <p:spTree>
@@ -25984,7 +26067,7 @@
 </p:sld>
 </file>
 
-<file path=ppt/slides/slide24.xml><?xml version="1.0" encoding="utf-8"?>
+<file path=ppt/slides/slide25.xml><?xml version="1.0" encoding="utf-8"?>
 <p:sld xmlns:a="http://schemas.openxmlformats.org/drawingml/2006/main" xmlns:r="http://schemas.openxmlformats.org/officeDocument/2006/relationships" xmlns:p="http://schemas.openxmlformats.org/presentationml/2006/main">
   <p:cSld>
     <p:spTree>
@@ -27049,7 +27132,7 @@
 </p:sld>
 </file>
 
-<file path=ppt/slides/slide25.xml><?xml version="1.0" encoding="utf-8"?>
+<file path=ppt/slides/slide26.xml><?xml version="1.0" encoding="utf-8"?>
 <p:sld xmlns:a="http://schemas.openxmlformats.org/drawingml/2006/main" xmlns:r="http://schemas.openxmlformats.org/officeDocument/2006/relationships" xmlns:p="http://schemas.openxmlformats.org/presentationml/2006/main">
   <p:cSld>
     <p:spTree>
@@ -27286,7 +27369,7 @@
 </p:sld>
 </file>
 
-<file path=ppt/slides/slide26.xml><?xml version="1.0" encoding="utf-8"?>
+<file path=ppt/slides/slide27.xml><?xml version="1.0" encoding="utf-8"?>
 <p:sld xmlns:a="http://schemas.openxmlformats.org/drawingml/2006/main" xmlns:r="http://schemas.openxmlformats.org/officeDocument/2006/relationships" xmlns:p="http://schemas.openxmlformats.org/presentationml/2006/main">
   <p:cSld>
     <p:spTree>
@@ -27492,7 +27575,7 @@
 </p:sld>
 </file>
 
-<file path=ppt/slides/slide27.xml><?xml version="1.0" encoding="utf-8"?>
+<file path=ppt/slides/slide28.xml><?xml version="1.0" encoding="utf-8"?>
 <p:sld xmlns:a="http://schemas.openxmlformats.org/drawingml/2006/main" xmlns:r="http://schemas.openxmlformats.org/officeDocument/2006/relationships" xmlns:p="http://schemas.openxmlformats.org/presentationml/2006/main">
   <p:cSld>
     <p:spTree>
@@ -27914,7 +27997,7 @@
 </p:sld>
 </file>
 
-<file path=ppt/slides/slide28.xml><?xml version="1.0" encoding="utf-8"?>
+<file path=ppt/slides/slide29.xml><?xml version="1.0" encoding="utf-8"?>
 <p:sld xmlns:a="http://schemas.openxmlformats.org/drawingml/2006/main" xmlns:r="http://schemas.openxmlformats.org/officeDocument/2006/relationships" xmlns:p="http://schemas.openxmlformats.org/presentationml/2006/main">
   <p:cSld>
     <p:spTree>
@@ -27997,154 +28080,6 @@
     <p:extLst>
       <p:ext uri="{BB962C8B-B14F-4D97-AF65-F5344CB8AC3E}">
         <p14:creationId xmlns:p14="http://schemas.microsoft.com/office/powerpoint/2010/main" val="2915462355"/>
-      </p:ext>
-    </p:extLst>
-  </p:cSld>
-  <p:clrMapOvr>
-    <a:masterClrMapping/>
-  </p:clrMapOvr>
-</p:sld>
-</file>
-
-<file path=ppt/slides/slide29.xml><?xml version="1.0" encoding="utf-8"?>
-<p:sld xmlns:a="http://schemas.openxmlformats.org/drawingml/2006/main" xmlns:r="http://schemas.openxmlformats.org/officeDocument/2006/relationships" xmlns:p="http://schemas.openxmlformats.org/presentationml/2006/main">
-  <p:cSld>
-    <p:spTree>
-      <p:nvGrpSpPr>
-        <p:cNvPr id="1" name=""/>
-        <p:cNvGrpSpPr/>
-        <p:nvPr/>
-      </p:nvGrpSpPr>
-      <p:grpSpPr>
-        <a:xfrm>
-          <a:off x="0" y="0"/>
-          <a:ext cx="0" cy="0"/>
-          <a:chOff x="0" y="0"/>
-          <a:chExt cx="0" cy="0"/>
-        </a:xfrm>
-      </p:grpSpPr>
-      <p:sp>
-        <p:nvSpPr>
-          <p:cNvPr id="2" name="Title 1">
-            <a:extLst>
-              <a:ext uri="{FF2B5EF4-FFF2-40B4-BE49-F238E27FC236}">
-                <a16:creationId xmlns:a16="http://schemas.microsoft.com/office/drawing/2014/main" id="{1849F1E8-D2AC-7FA9-E917-F90C94B3818A}"/>
-              </a:ext>
-            </a:extLst>
-          </p:cNvPr>
-          <p:cNvSpPr>
-            <a:spLocks noGrp="1"/>
-          </p:cNvSpPr>
-          <p:nvPr>
-            <p:ph type="title"/>
-          </p:nvPr>
-        </p:nvSpPr>
-        <p:spPr/>
-        <p:txBody>
-          <a:bodyPr/>
-          <a:lstStyle/>
-          <a:p>
-            <a:r>
-              <a:rPr lang="en-US" dirty="0"/>
-              <a:t>Measuring Temperature</a:t>
-            </a:r>
-          </a:p>
-        </p:txBody>
-      </p:sp>
-      <p:pic>
-        <p:nvPicPr>
-          <p:cNvPr id="1026" name="Picture 2">
-            <a:extLst>
-              <a:ext uri="{FF2B5EF4-FFF2-40B4-BE49-F238E27FC236}">
-                <a16:creationId xmlns:a16="http://schemas.microsoft.com/office/drawing/2014/main" id="{AD199F0B-D17C-D6D3-55F3-74755658B584}"/>
-              </a:ext>
-            </a:extLst>
-          </p:cNvPr>
-          <p:cNvPicPr>
-            <a:picLocks noGrp="1" noChangeAspect="1" noChangeArrowheads="1"/>
-          </p:cNvPicPr>
-          <p:nvPr>
-            <p:ph idx="1"/>
-          </p:nvPr>
-        </p:nvPicPr>
-        <p:blipFill>
-          <a:blip r:embed="rId2">
-            <a:extLst>
-              <a:ext uri="{28A0092B-C50C-407E-A947-70E740481C1C}">
-                <a14:useLocalDpi xmlns:a14="http://schemas.microsoft.com/office/drawing/2010/main" val="0"/>
-              </a:ext>
-            </a:extLst>
-          </a:blip>
-          <a:srcRect/>
-          <a:stretch>
-            <a:fillRect/>
-          </a:stretch>
-        </p:blipFill>
-        <p:spPr bwMode="auto">
-          <a:xfrm>
-            <a:off x="373063" y="1580605"/>
-            <a:ext cx="8386762" cy="4717553"/>
-          </a:xfrm>
-          <a:prstGeom prst="rect">
-            <a:avLst/>
-          </a:prstGeom>
-          <a:noFill/>
-          <a:extLst>
-            <a:ext uri="{909E8E84-426E-40DD-AFC4-6F175D3DCCD1}">
-              <a14:hiddenFill xmlns:a14="http://schemas.microsoft.com/office/drawing/2010/main">
-                <a:solidFill>
-                  <a:srgbClr val="FFFFFF"/>
-                </a:solidFill>
-              </a14:hiddenFill>
-            </a:ext>
-          </a:extLst>
-        </p:spPr>
-      </p:pic>
-      <p:sp>
-        <p:nvSpPr>
-          <p:cNvPr id="4" name="TextBox 3">
-            <a:extLst>
-              <a:ext uri="{FF2B5EF4-FFF2-40B4-BE49-F238E27FC236}">
-                <a16:creationId xmlns:a16="http://schemas.microsoft.com/office/drawing/2014/main" id="{84CE6475-A36D-80BA-1C65-FB4D262EAC11}"/>
-              </a:ext>
-            </a:extLst>
-          </p:cNvPr>
-          <p:cNvSpPr txBox="1"/>
-          <p:nvPr/>
-        </p:nvSpPr>
-        <p:spPr>
-          <a:xfrm>
-            <a:off x="7137779" y="6298158"/>
-            <a:ext cx="1552284" cy="276999"/>
-          </a:xfrm>
-          <a:prstGeom prst="rect">
-            <a:avLst/>
-          </a:prstGeom>
-          <a:noFill/>
-        </p:spPr>
-        <p:txBody>
-          <a:bodyPr wrap="none" rtlCol="0">
-            <a:spAutoFit/>
-          </a:bodyPr>
-          <a:lstStyle/>
-          <a:p>
-            <a:r>
-              <a:rPr lang="en-US" sz="1200" i="1" dirty="0">
-                <a:solidFill>
-                  <a:srgbClr val="FFFFCC"/>
-                </a:solidFill>
-                <a:latin typeface="Times New Roman" panose="02020603050405020304" pitchFamily="18" charset="0"/>
-                <a:cs typeface="Times New Roman" panose="02020603050405020304" pitchFamily="18" charset="0"/>
-              </a:rPr>
-              <a:t>image from Study.com</a:t>
-            </a:r>
-          </a:p>
-        </p:txBody>
-      </p:sp>
-    </p:spTree>
-    <p:extLst>
-      <p:ext uri="{BB962C8B-B14F-4D97-AF65-F5344CB8AC3E}">
-        <p14:creationId xmlns:p14="http://schemas.microsoft.com/office/powerpoint/2010/main" val="1697733660"/>
       </p:ext>
     </p:extLst>
   </p:cSld>
@@ -28604,6 +28539,154 @@
   <p:cSld>
     <p:spTree>
       <p:nvGrpSpPr>
+        <p:cNvPr id="1" name=""/>
+        <p:cNvGrpSpPr/>
+        <p:nvPr/>
+      </p:nvGrpSpPr>
+      <p:grpSpPr>
+        <a:xfrm>
+          <a:off x="0" y="0"/>
+          <a:ext cx="0" cy="0"/>
+          <a:chOff x="0" y="0"/>
+          <a:chExt cx="0" cy="0"/>
+        </a:xfrm>
+      </p:grpSpPr>
+      <p:sp>
+        <p:nvSpPr>
+          <p:cNvPr id="2" name="Title 1">
+            <a:extLst>
+              <a:ext uri="{FF2B5EF4-FFF2-40B4-BE49-F238E27FC236}">
+                <a16:creationId xmlns:a16="http://schemas.microsoft.com/office/drawing/2014/main" id="{1849F1E8-D2AC-7FA9-E917-F90C94B3818A}"/>
+              </a:ext>
+            </a:extLst>
+          </p:cNvPr>
+          <p:cNvSpPr>
+            <a:spLocks noGrp="1"/>
+          </p:cNvSpPr>
+          <p:nvPr>
+            <p:ph type="title"/>
+          </p:nvPr>
+        </p:nvSpPr>
+        <p:spPr/>
+        <p:txBody>
+          <a:bodyPr/>
+          <a:lstStyle/>
+          <a:p>
+            <a:r>
+              <a:rPr lang="en-US" dirty="0"/>
+              <a:t>Measuring Temperature</a:t>
+            </a:r>
+          </a:p>
+        </p:txBody>
+      </p:sp>
+      <p:pic>
+        <p:nvPicPr>
+          <p:cNvPr id="1026" name="Picture 2">
+            <a:extLst>
+              <a:ext uri="{FF2B5EF4-FFF2-40B4-BE49-F238E27FC236}">
+                <a16:creationId xmlns:a16="http://schemas.microsoft.com/office/drawing/2014/main" id="{AD199F0B-D17C-D6D3-55F3-74755658B584}"/>
+              </a:ext>
+            </a:extLst>
+          </p:cNvPr>
+          <p:cNvPicPr>
+            <a:picLocks noGrp="1" noChangeAspect="1" noChangeArrowheads="1"/>
+          </p:cNvPicPr>
+          <p:nvPr>
+            <p:ph idx="1"/>
+          </p:nvPr>
+        </p:nvPicPr>
+        <p:blipFill>
+          <a:blip r:embed="rId2">
+            <a:extLst>
+              <a:ext uri="{28A0092B-C50C-407E-A947-70E740481C1C}">
+                <a14:useLocalDpi xmlns:a14="http://schemas.microsoft.com/office/drawing/2010/main" val="0"/>
+              </a:ext>
+            </a:extLst>
+          </a:blip>
+          <a:srcRect/>
+          <a:stretch>
+            <a:fillRect/>
+          </a:stretch>
+        </p:blipFill>
+        <p:spPr bwMode="auto">
+          <a:xfrm>
+            <a:off x="373063" y="1580605"/>
+            <a:ext cx="8386762" cy="4717553"/>
+          </a:xfrm>
+          <a:prstGeom prst="rect">
+            <a:avLst/>
+          </a:prstGeom>
+          <a:noFill/>
+          <a:extLst>
+            <a:ext uri="{909E8E84-426E-40DD-AFC4-6F175D3DCCD1}">
+              <a14:hiddenFill xmlns:a14="http://schemas.microsoft.com/office/drawing/2010/main">
+                <a:solidFill>
+                  <a:srgbClr val="FFFFFF"/>
+                </a:solidFill>
+              </a14:hiddenFill>
+            </a:ext>
+          </a:extLst>
+        </p:spPr>
+      </p:pic>
+      <p:sp>
+        <p:nvSpPr>
+          <p:cNvPr id="4" name="TextBox 3">
+            <a:extLst>
+              <a:ext uri="{FF2B5EF4-FFF2-40B4-BE49-F238E27FC236}">
+                <a16:creationId xmlns:a16="http://schemas.microsoft.com/office/drawing/2014/main" id="{84CE6475-A36D-80BA-1C65-FB4D262EAC11}"/>
+              </a:ext>
+            </a:extLst>
+          </p:cNvPr>
+          <p:cNvSpPr txBox="1"/>
+          <p:nvPr/>
+        </p:nvSpPr>
+        <p:spPr>
+          <a:xfrm>
+            <a:off x="7137779" y="6298158"/>
+            <a:ext cx="1552284" cy="276999"/>
+          </a:xfrm>
+          <a:prstGeom prst="rect">
+            <a:avLst/>
+          </a:prstGeom>
+          <a:noFill/>
+        </p:spPr>
+        <p:txBody>
+          <a:bodyPr wrap="none" rtlCol="0">
+            <a:spAutoFit/>
+          </a:bodyPr>
+          <a:lstStyle/>
+          <a:p>
+            <a:r>
+              <a:rPr lang="en-US" sz="1200" i="1" dirty="0">
+                <a:solidFill>
+                  <a:srgbClr val="FFFFCC"/>
+                </a:solidFill>
+                <a:latin typeface="Times New Roman" panose="02020603050405020304" pitchFamily="18" charset="0"/>
+                <a:cs typeface="Times New Roman" panose="02020603050405020304" pitchFamily="18" charset="0"/>
+              </a:rPr>
+              <a:t>image from Study.com</a:t>
+            </a:r>
+          </a:p>
+        </p:txBody>
+      </p:sp>
+    </p:spTree>
+    <p:extLst>
+      <p:ext uri="{BB962C8B-B14F-4D97-AF65-F5344CB8AC3E}">
+        <p14:creationId xmlns:p14="http://schemas.microsoft.com/office/powerpoint/2010/main" val="1697733660"/>
+      </p:ext>
+    </p:extLst>
+  </p:cSld>
+  <p:clrMapOvr>
+    <a:masterClrMapping/>
+  </p:clrMapOvr>
+</p:sld>
+</file>
+
+<file path=ppt/slides/slide31.xml><?xml version="1.0" encoding="utf-8"?>
+<p:sld xmlns:a="http://schemas.openxmlformats.org/drawingml/2006/main" xmlns:r="http://schemas.openxmlformats.org/officeDocument/2006/relationships" xmlns:p="http://schemas.openxmlformats.org/presentationml/2006/main">
+  <p:cSld>
+    <p:spTree>
+      <p:nvGrpSpPr>
         <p:cNvPr id="1" name="">
           <a:extLst>
             <a:ext uri="{FF2B5EF4-FFF2-40B4-BE49-F238E27FC236}">
@@ -29132,7 +29215,7 @@
 </p:sld>
 </file>
 
-<file path=ppt/slides/slide31.xml><?xml version="1.0" encoding="utf-8"?>
+<file path=ppt/slides/slide32.xml><?xml version="1.0" encoding="utf-8"?>
 <p:sld xmlns:a="http://schemas.openxmlformats.org/drawingml/2006/main" xmlns:r="http://schemas.openxmlformats.org/officeDocument/2006/relationships" xmlns:p="http://schemas.openxmlformats.org/presentationml/2006/main">
   <p:cSld>
     <p:spTree>
@@ -29894,7 +29977,7 @@
 </p:sld>
 </file>
 
-<file path=ppt/slides/slide32.xml><?xml version="1.0" encoding="utf-8"?>
+<file path=ppt/slides/slide33.xml><?xml version="1.0" encoding="utf-8"?>
 <p:sld xmlns:a="http://schemas.openxmlformats.org/drawingml/2006/main" xmlns:r="http://schemas.openxmlformats.org/officeDocument/2006/relationships" xmlns:p="http://schemas.openxmlformats.org/presentationml/2006/main">
   <p:cSld>
     <p:spTree>

</xml_diff>

<commit_message>
Tue Aug 19 course updates
</commit_message>
<xml_diff>
--- a/Teaching/Chemistry/FCC Chem 3A Chap  1 Content.pptx
+++ b/Teaching/Chemistry/FCC Chem 3A Chap  1 Content.pptx
@@ -5,7 +5,7 @@
     <p:sldMasterId id="2147483803" r:id="rId1"/>
   </p:sldMasterIdLst>
   <p:notesMasterIdLst>
-    <p:notesMasterId r:id="rId50"/>
+    <p:notesMasterId r:id="rId51"/>
   </p:notesMasterIdLst>
   <p:sldIdLst>
     <p:sldId id="608" r:id="rId2"/>
@@ -31,31 +31,32 @@
     <p:sldId id="804" r:id="rId22"/>
     <p:sldId id="831" r:id="rId23"/>
     <p:sldId id="834" r:id="rId24"/>
-    <p:sldId id="830" r:id="rId25"/>
-    <p:sldId id="832" r:id="rId26"/>
-    <p:sldId id="847" r:id="rId27"/>
-    <p:sldId id="848" r:id="rId28"/>
-    <p:sldId id="849" r:id="rId29"/>
-    <p:sldId id="821" r:id="rId30"/>
-    <p:sldId id="823" r:id="rId31"/>
-    <p:sldId id="850" r:id="rId32"/>
-    <p:sldId id="851" r:id="rId33"/>
-    <p:sldId id="852" r:id="rId34"/>
-    <p:sldId id="853" r:id="rId35"/>
-    <p:sldId id="854" r:id="rId36"/>
-    <p:sldId id="855" r:id="rId37"/>
-    <p:sldId id="856" r:id="rId38"/>
-    <p:sldId id="805" r:id="rId39"/>
-    <p:sldId id="835" r:id="rId40"/>
-    <p:sldId id="836" r:id="rId41"/>
-    <p:sldId id="838" r:id="rId42"/>
-    <p:sldId id="839" r:id="rId43"/>
-    <p:sldId id="857" r:id="rId44"/>
-    <p:sldId id="827" r:id="rId45"/>
-    <p:sldId id="807" r:id="rId46"/>
-    <p:sldId id="828" r:id="rId47"/>
-    <p:sldId id="808" r:id="rId48"/>
-    <p:sldId id="829" r:id="rId49"/>
+    <p:sldId id="858" r:id="rId25"/>
+    <p:sldId id="830" r:id="rId26"/>
+    <p:sldId id="832" r:id="rId27"/>
+    <p:sldId id="847" r:id="rId28"/>
+    <p:sldId id="848" r:id="rId29"/>
+    <p:sldId id="849" r:id="rId30"/>
+    <p:sldId id="821" r:id="rId31"/>
+    <p:sldId id="823" r:id="rId32"/>
+    <p:sldId id="850" r:id="rId33"/>
+    <p:sldId id="851" r:id="rId34"/>
+    <p:sldId id="852" r:id="rId35"/>
+    <p:sldId id="853" r:id="rId36"/>
+    <p:sldId id="854" r:id="rId37"/>
+    <p:sldId id="855" r:id="rId38"/>
+    <p:sldId id="856" r:id="rId39"/>
+    <p:sldId id="805" r:id="rId40"/>
+    <p:sldId id="835" r:id="rId41"/>
+    <p:sldId id="836" r:id="rId42"/>
+    <p:sldId id="838" r:id="rId43"/>
+    <p:sldId id="839" r:id="rId44"/>
+    <p:sldId id="857" r:id="rId45"/>
+    <p:sldId id="827" r:id="rId46"/>
+    <p:sldId id="807" r:id="rId47"/>
+    <p:sldId id="828" r:id="rId48"/>
+    <p:sldId id="808" r:id="rId49"/>
+    <p:sldId id="829" r:id="rId50"/>
   </p:sldIdLst>
   <p:sldSz cx="9144000" cy="6858000" type="screen4x3"/>
   <p:notesSz cx="7315200" cy="9601200"/>
@@ -14299,7 +14300,41 @@
                 <a:ea typeface="+mn-ea"/>
                 <a:cs typeface="+mn-cs"/>
               </a:rPr>
-              <a:t>Scientific notation is actually a </a:t>
+              <a:t>Scientific notation is </a:t>
+            </a:r>
+            <a:r>
+              <a:rPr kumimoji="0" lang="en-US" sz="2800" b="0" i="1" u="none" strike="noStrike" kern="0" cap="none" spc="0" normalizeH="0" baseline="0" noProof="0" dirty="0">
+                <a:ln>
+                  <a:noFill/>
+                </a:ln>
+                <a:solidFill>
+                  <a:srgbClr val="FFFFFF"/>
+                </a:solidFill>
+                <a:effectLst/>
+                <a:uLnTx/>
+                <a:uFillTx/>
+                <a:latin typeface="Verdana"/>
+                <a:ea typeface="+mn-ea"/>
+                <a:cs typeface="+mn-cs"/>
+              </a:rPr>
+              <a:t>actually</a:t>
+            </a:r>
+            <a:r>
+              <a:rPr kumimoji="0" lang="en-US" sz="2800" b="0" i="0" u="none" strike="noStrike" kern="0" cap="none" spc="0" normalizeH="0" baseline="0" noProof="0" dirty="0">
+                <a:ln>
+                  <a:noFill/>
+                </a:ln>
+                <a:solidFill>
+                  <a:srgbClr val="FFFFFF"/>
+                </a:solidFill>
+                <a:effectLst/>
+                <a:uLnTx/>
+                <a:uFillTx/>
+                <a:latin typeface="Verdana"/>
+                <a:ea typeface="+mn-ea"/>
+                <a:cs typeface="+mn-cs"/>
+              </a:rPr>
+              <a:t> a </a:t>
             </a:r>
             <a:r>
               <a:rPr kumimoji="0" lang="en-US" sz="2800" b="0" i="1" u="none" strike="noStrike" kern="0" cap="none" spc="0" normalizeH="0" baseline="0" noProof="0" dirty="0">
@@ -20875,6 +20910,23 @@
               <a:buNone/>
             </a:pPr>
             <a:r>
+              <a:rPr lang="en-US" sz="2000" i="1" dirty="0">
+                <a:solidFill>
+                  <a:srgbClr val="FFFF00"/>
+                </a:solidFill>
+              </a:rPr>
+              <a:t>Decimal places for final answer should be the one number with the fewest number of decimal places</a:t>
+            </a:r>
+            <a:endParaRPr lang="en-US" i="1" dirty="0"/>
+          </a:p>
+          <a:p>
+            <a:pPr marL="0" indent="0">
+              <a:spcBef>
+                <a:spcPts val="1200"/>
+              </a:spcBef>
+              <a:buNone/>
+            </a:pPr>
+            <a:r>
               <a:rPr lang="en-US" dirty="0"/>
               <a:t>Solve 12.11 + 18.0 + 1.013 = </a:t>
             </a:r>
@@ -20895,12 +20947,6 @@
             <a:pPr marL="0" indent="0">
               <a:buNone/>
             </a:pPr>
-            <a:endParaRPr lang="en-US" dirty="0"/>
-          </a:p>
-          <a:p>
-            <a:pPr marL="0" indent="0">
-              <a:buNone/>
-            </a:pPr>
             <a:r>
               <a:rPr lang="en-US" dirty="0"/>
               <a:t>Solve 100.29 – 2.343 – 72.9 =</a:t>
@@ -20925,8 +20971,14 @@
             <a:pPr marL="0" indent="0">
               <a:buNone/>
             </a:pPr>
-            <a:r>
-              <a:rPr lang="en-US" dirty="0"/>
+            <a:endParaRPr lang="en-US" sz="2000" dirty="0"/>
+          </a:p>
+          <a:p>
+            <a:pPr marL="0" indent="0">
+              <a:buNone/>
+            </a:pPr>
+            <a:r>
+              <a:rPr lang="en-US" sz="2000" dirty="0"/>
               <a:t>Solve 1000.23 – 87.532 + 200.49 – 50.439 =</a:t>
             </a:r>
           </a:p>
@@ -20947,13 +20999,13 @@
           <p:nvPr>
             <p:extLst>
               <p:ext uri="{D42A27DB-BD31-4B8C-83A1-F6EECF244321}">
-                <p14:modId xmlns:p14="http://schemas.microsoft.com/office/powerpoint/2010/main" val="942056689"/>
+                <p14:modId xmlns:p14="http://schemas.microsoft.com/office/powerpoint/2010/main" val="2186675988"/>
               </p:ext>
             </p:extLst>
           </p:nvPr>
         </p:nvGraphicFramePr>
         <p:xfrm>
-          <a:off x="349955" y="1864741"/>
+          <a:off x="333462" y="2378852"/>
           <a:ext cx="8386764" cy="1185337"/>
         </p:xfrm>
         <a:graphic>
@@ -21013,7 +21065,7 @@
                       <a:pPr algn="l" fontAlgn="b">
                         <a:buNone/>
                       </a:pPr>
-                      <a:endParaRPr lang="en-US" sz="1000" b="0" i="0" u="none" strike="noStrike">
+                      <a:endParaRPr lang="en-US" sz="1000" b="0" i="0" u="none" strike="noStrike" dirty="0">
                         <a:solidFill>
                           <a:srgbClr val="000000"/>
                         </a:solidFill>
@@ -21046,7 +21098,7 @@
                       <a:pPr algn="l" fontAlgn="b">
                         <a:buNone/>
                       </a:pPr>
-                      <a:endParaRPr lang="en-US" sz="1000" b="0" i="0" u="none" strike="noStrike">
+                      <a:endParaRPr lang="en-US" sz="1000" b="0" i="0" u="none" strike="noStrike" dirty="0">
                         <a:solidFill>
                           <a:srgbClr val="000000"/>
                         </a:solidFill>
@@ -21079,7 +21131,7 @@
                       <a:pPr algn="l" fontAlgn="b">
                         <a:buNone/>
                       </a:pPr>
-                      <a:endParaRPr lang="en-US" sz="1000" b="0" i="0" u="none" strike="noStrike">
+                      <a:endParaRPr lang="en-US" sz="1000" b="0" i="0" u="none" strike="noStrike" dirty="0">
                         <a:solidFill>
                           <a:srgbClr val="000000"/>
                         </a:solidFill>
@@ -21152,7 +21204,7 @@
                         <a:buNone/>
                       </a:pPr>
                       <a:r>
-                        <a:rPr lang="en-US" sz="1600" b="1" i="0" u="none" strike="noStrike">
+                        <a:rPr lang="en-US" sz="1600" b="1" i="0" u="none" strike="noStrike" dirty="0">
                           <a:solidFill>
                             <a:srgbClr val="FFFFFF"/>
                           </a:solidFill>
@@ -22279,13 +22331,13 @@
           <p:nvPr>
             <p:extLst>
               <p:ext uri="{D42A27DB-BD31-4B8C-83A1-F6EECF244321}">
-                <p14:modId xmlns:p14="http://schemas.microsoft.com/office/powerpoint/2010/main" val="2551976345"/>
+                <p14:modId xmlns:p14="http://schemas.microsoft.com/office/powerpoint/2010/main" val="4130194691"/>
               </p:ext>
             </p:extLst>
           </p:nvPr>
         </p:nvGraphicFramePr>
         <p:xfrm>
-          <a:off x="367329" y="3429000"/>
+          <a:off x="333462" y="3886479"/>
           <a:ext cx="8386764" cy="1185337"/>
         </p:xfrm>
         <a:graphic>
@@ -23154,14 +23206,14 @@
                         <a:buNone/>
                       </a:pPr>
                       <a:r>
-                        <a:rPr lang="en-US" sz="1600" b="0" i="0" u="none" strike="noStrike">
+                        <a:rPr lang="en-US" sz="1600" b="0" i="0" u="none" strike="noStrike" dirty="0">
                           <a:solidFill>
                             <a:srgbClr val="000000"/>
                           </a:solidFill>
                           <a:effectLst/>
                           <a:latin typeface="Verdana" panose="020B0604030504040204" pitchFamily="34" charset="0"/>
                         </a:rPr>
-                        <a:t>25.1</a:t>
+                        <a:t>25.0</a:t>
                       </a:r>
                     </a:p>
                   </a:txBody>
@@ -23471,7 +23523,7 @@
                         <a:buNone/>
                       </a:pPr>
                       <a:r>
-                        <a:rPr lang="en-US" sz="1600" b="0" i="0" u="none" strike="noStrike">
+                        <a:rPr lang="en-US" sz="1600" b="0" i="0" u="none" strike="noStrike" dirty="0">
                           <a:solidFill>
                             <a:srgbClr val="000000"/>
                           </a:solidFill>
@@ -23750,7 +23802,7 @@
                       <a:pPr algn="l" fontAlgn="b">
                         <a:buNone/>
                       </a:pPr>
-                      <a:endParaRPr lang="en-US" sz="1000" b="0" i="0" u="none" strike="noStrike">
+                      <a:endParaRPr lang="en-US" sz="1000" b="0" i="0" u="none" strike="noStrike" dirty="0">
                         <a:solidFill>
                           <a:srgbClr val="000000"/>
                         </a:solidFill>
@@ -25256,6 +25308,20 @@
               <a:buNone/>
             </a:pPr>
             <a:r>
+              <a:rPr lang="en-US" i="1" dirty="0">
+                <a:solidFill>
+                  <a:srgbClr val="FFFF00"/>
+                </a:solidFill>
+              </a:rPr>
+              <a:t>Significant digits for final answer should be the one number with the fewest number of significant digits</a:t>
+            </a:r>
+            <a:endParaRPr lang="en-US" i="1" dirty="0"/>
+          </a:p>
+          <a:p>
+            <a:pPr marL="0" indent="0">
+              <a:buNone/>
+            </a:pPr>
+            <a:r>
               <a:rPr lang="en-US" dirty="0"/>
               <a:t>Solve 4.56 x 1.4 = </a:t>
             </a:r>
@@ -25274,12 +25340,9 @@
           </a:p>
           <a:p>
             <a:pPr marL="0" indent="0">
-              <a:buNone/>
-            </a:pPr>
-            <a:endParaRPr lang="en-US" dirty="0"/>
-          </a:p>
-          <a:p>
-            <a:pPr marL="0" indent="0">
+              <a:spcBef>
+                <a:spcPts val="1200"/>
+              </a:spcBef>
               <a:buNone/>
             </a:pPr>
             <a:r>
@@ -25307,7 +25370,7 @@
               <a:buNone/>
             </a:pPr>
             <a:r>
-              <a:rPr lang="en-US" dirty="0"/>
+              <a:rPr lang="en-US" sz="2000" dirty="0"/>
               <a:t>Solve 2340.09 ÷ 24.190 =</a:t>
             </a:r>
           </a:p>
@@ -25334,13 +25397,13 @@
           <p:nvPr>
             <p:extLst>
               <p:ext uri="{D42A27DB-BD31-4B8C-83A1-F6EECF244321}">
-                <p14:modId xmlns:p14="http://schemas.microsoft.com/office/powerpoint/2010/main" val="2569574438"/>
+                <p14:modId xmlns:p14="http://schemas.microsoft.com/office/powerpoint/2010/main" val="2839235317"/>
               </p:ext>
             </p:extLst>
           </p:nvPr>
         </p:nvGraphicFramePr>
         <p:xfrm>
-          <a:off x="349955" y="1864741"/>
+          <a:off x="1013455" y="2606944"/>
           <a:ext cx="7117089" cy="1185337"/>
         </p:xfrm>
         <a:graphic>
@@ -25393,7 +25456,7 @@
                       <a:pPr algn="l" fontAlgn="b">
                         <a:buNone/>
                       </a:pPr>
-                      <a:endParaRPr lang="en-US" sz="1000" b="0" i="0" u="none" strike="noStrike">
+                      <a:endParaRPr lang="en-US" sz="1000" b="0" i="0" u="none" strike="noStrike" dirty="0">
                         <a:solidFill>
                           <a:srgbClr val="000000"/>
                         </a:solidFill>
@@ -26376,7 +26439,7 @@
                           <a:effectLst/>
                           <a:latin typeface="Verdana" panose="020B0604030504040204" pitchFamily="34" charset="0"/>
                         </a:rPr>
-                        <a:t>1</a:t>
+                        <a:t>2</a:t>
                       </a:r>
                     </a:p>
                   </a:txBody>
@@ -26447,13 +26510,13 @@
           <p:nvPr>
             <p:extLst>
               <p:ext uri="{D42A27DB-BD31-4B8C-83A1-F6EECF244321}">
-                <p14:modId xmlns:p14="http://schemas.microsoft.com/office/powerpoint/2010/main" val="2117607423"/>
+                <p14:modId xmlns:p14="http://schemas.microsoft.com/office/powerpoint/2010/main" val="4278736337"/>
               </p:ext>
             </p:extLst>
           </p:nvPr>
         </p:nvGraphicFramePr>
         <p:xfrm>
-          <a:off x="349955" y="3429000"/>
+          <a:off x="349955" y="3935141"/>
           <a:ext cx="8386764" cy="1185337"/>
         </p:xfrm>
         <a:graphic>
@@ -26511,6 +26574,9 @@
                     <a:lstStyle/>
                     <a:p>
                       <a:pPr algn="l" fontAlgn="b">
+                        <a:spcBef>
+                          <a:spcPts val="1200"/>
+                        </a:spcBef>
                         <a:buNone/>
                       </a:pPr>
                       <a:endParaRPr lang="en-US" sz="1000" b="0" i="0" u="none" strike="noStrike" dirty="0">
@@ -27788,13 +27854,13 @@
           <p:nvPr>
             <p:extLst>
               <p:ext uri="{D42A27DB-BD31-4B8C-83A1-F6EECF244321}">
-                <p14:modId xmlns:p14="http://schemas.microsoft.com/office/powerpoint/2010/main" val="1250165180"/>
+                <p14:modId xmlns:p14="http://schemas.microsoft.com/office/powerpoint/2010/main" val="2309561994"/>
               </p:ext>
             </p:extLst>
           </p:nvPr>
         </p:nvGraphicFramePr>
         <p:xfrm>
-          <a:off x="349955" y="5207051"/>
+          <a:off x="406400" y="5308875"/>
           <a:ext cx="7124346" cy="1185337"/>
         </p:xfrm>
         <a:graphic>
@@ -28129,7 +28195,7 @@
                         <a:buNone/>
                       </a:pPr>
                       <a:r>
-                        <a:rPr lang="en-US" sz="1000" b="1" i="0" u="none" strike="noStrike">
+                        <a:rPr lang="en-US" sz="1000" b="1" i="0" u="none" strike="noStrike" dirty="0">
                           <a:solidFill>
                             <a:srgbClr val="FFFFFF"/>
                           </a:solidFill>
@@ -28909,6 +28975,107 @@
 </file>
 
 <file path=ppt/slides/slide24.xml><?xml version="1.0" encoding="utf-8"?>
+<p:sld xmlns:a="http://schemas.openxmlformats.org/drawingml/2006/main" xmlns:r="http://schemas.openxmlformats.org/officeDocument/2006/relationships" xmlns:p="http://schemas.openxmlformats.org/presentationml/2006/main">
+  <p:cSld>
+    <p:spTree>
+      <p:nvGrpSpPr>
+        <p:cNvPr id="1" name=""/>
+        <p:cNvGrpSpPr/>
+        <p:nvPr/>
+      </p:nvGrpSpPr>
+      <p:grpSpPr>
+        <a:xfrm>
+          <a:off x="0" y="0"/>
+          <a:ext cx="0" cy="0"/>
+          <a:chOff x="0" y="0"/>
+          <a:chExt cx="0" cy="0"/>
+        </a:xfrm>
+      </p:grpSpPr>
+      <p:pic>
+        <p:nvPicPr>
+          <p:cNvPr id="5" name="Picture 4">
+            <a:extLst>
+              <a:ext uri="{FF2B5EF4-FFF2-40B4-BE49-F238E27FC236}">
+                <a16:creationId xmlns:a16="http://schemas.microsoft.com/office/drawing/2014/main" id="{F9CDBA5F-FDB3-8037-119D-B608F33CCFF2}"/>
+              </a:ext>
+            </a:extLst>
+          </p:cNvPr>
+          <p:cNvPicPr>
+            <a:picLocks noChangeAspect="1"/>
+          </p:cNvPicPr>
+          <p:nvPr/>
+        </p:nvPicPr>
+        <p:blipFill>
+          <a:blip r:embed="rId2"/>
+          <a:stretch>
+            <a:fillRect/>
+          </a:stretch>
+        </p:blipFill>
+        <p:spPr>
+          <a:xfrm>
+            <a:off x="1180626" y="499653"/>
+            <a:ext cx="6782747" cy="5858693"/>
+          </a:xfrm>
+          <a:prstGeom prst="rect">
+            <a:avLst/>
+          </a:prstGeom>
+        </p:spPr>
+      </p:pic>
+      <p:sp>
+        <p:nvSpPr>
+          <p:cNvPr id="6" name="TextBox 5">
+            <a:extLst>
+              <a:ext uri="{FF2B5EF4-FFF2-40B4-BE49-F238E27FC236}">
+                <a16:creationId xmlns:a16="http://schemas.microsoft.com/office/drawing/2014/main" id="{194687AA-D508-1FE3-D3D3-DAFE959A5A45}"/>
+              </a:ext>
+            </a:extLst>
+          </p:cNvPr>
+          <p:cNvSpPr txBox="1"/>
+          <p:nvPr/>
+        </p:nvSpPr>
+        <p:spPr>
+          <a:xfrm>
+            <a:off x="3704437" y="6410264"/>
+            <a:ext cx="4584909" cy="261610"/>
+          </a:xfrm>
+          <a:prstGeom prst="rect">
+            <a:avLst/>
+          </a:prstGeom>
+          <a:noFill/>
+        </p:spPr>
+        <p:txBody>
+          <a:bodyPr wrap="none" rtlCol="0">
+            <a:spAutoFit/>
+          </a:bodyPr>
+          <a:lstStyle/>
+          <a:p>
+            <a:r>
+              <a:rPr lang="en-US" sz="1100" i="1" dirty="0">
+                <a:solidFill>
+                  <a:srgbClr val="CC99FF"/>
+                </a:solidFill>
+                <a:latin typeface="Times New Roman" panose="02020603050405020304" pitchFamily="18" charset="0"/>
+                <a:cs typeface="Times New Roman" panose="02020603050405020304" pitchFamily="18" charset="0"/>
+              </a:rPr>
+              <a:t>This sheet (also as a PDF in Canvas LMS app) was produced by ChatGPT3.5</a:t>
+            </a:r>
+          </a:p>
+        </p:txBody>
+      </p:sp>
+    </p:spTree>
+    <p:extLst>
+      <p:ext uri="{BB962C8B-B14F-4D97-AF65-F5344CB8AC3E}">
+        <p14:creationId xmlns:p14="http://schemas.microsoft.com/office/powerpoint/2010/main" val="2959572589"/>
+      </p:ext>
+    </p:extLst>
+  </p:cSld>
+  <p:clrMapOvr>
+    <a:masterClrMapping/>
+  </p:clrMapOvr>
+</p:sld>
+</file>
+
+<file path=ppt/slides/slide25.xml><?xml version="1.0" encoding="utf-8"?>
 <p:sld xmlns:a="http://schemas.openxmlformats.org/drawingml/2006/main" xmlns:r="http://schemas.openxmlformats.org/officeDocument/2006/relationships" xmlns:p="http://schemas.openxmlformats.org/presentationml/2006/main">
   <p:cSld>
     <p:spTree>
@@ -29043,8 +29210,8 @@
               <a:defRPr/>
             </a:pPr>
             <a:r>
-              <a:rPr lang="en-US" sz="2000" dirty="0"/>
-              <a:t>You do the calculation in steps:</a:t>
+              <a:rPr lang="en-US" sz="1800" dirty="0"/>
+              <a:t>Suppose you do the calculation in steps (intermediate calculations):</a:t>
             </a:r>
           </a:p>
           <a:p>
@@ -29054,11 +29221,11 @@
               <a:defRPr/>
             </a:pPr>
             <a:r>
-              <a:rPr lang="en-US" sz="2000" dirty="0"/>
+              <a:rPr lang="en-US" sz="1800" dirty="0"/>
               <a:t>The area: 4.8 m × 3.2 m = 15.36 m</a:t>
             </a:r>
             <a:r>
-              <a:rPr lang="en-US" sz="2000" baseline="30000" dirty="0"/>
+              <a:rPr lang="en-US" sz="1800" baseline="30000" dirty="0"/>
               <a:t>2  </a:t>
             </a:r>
             <a:r>
@@ -29077,7 +29244,7 @@
               <a:defRPr/>
             </a:pPr>
             <a:r>
-              <a:rPr lang="en-US" sz="2000" dirty="0"/>
+              <a:rPr lang="en-US" sz="1800" dirty="0"/>
               <a:t>Finishing off</a:t>
             </a:r>
           </a:p>
@@ -29204,22 +29371,36 @@
               </a:rPr>
               <a:t>$645.12</a:t>
             </a:r>
-          </a:p>
-          <a:p>
-            <a:pPr marL="457200" indent="-457200">
-              <a:buFont typeface="+mj-lt"/>
-              <a:buAutoNum type="arabicPeriod"/>
+            <a:br>
+              <a:rPr lang="en-US" b="1" dirty="0">
+                <a:solidFill>
+                  <a:srgbClr val="FFC000"/>
+                </a:solidFill>
+              </a:rPr>
+            </a:br>
+            <a:endParaRPr lang="en-US" b="1" dirty="0">
+              <a:solidFill>
+                <a:srgbClr val="FFC000"/>
+              </a:solidFill>
+            </a:endParaRPr>
+          </a:p>
+          <a:p>
+            <a:pPr marL="0" indent="0">
+              <a:buNone/>
               <a:defRPr/>
             </a:pPr>
             <a:r>
-              <a:rPr lang="en-US" sz="2000" dirty="0"/>
-              <a:t>No need for intermediate result determination in nearly all cases</a:t>
-            </a:r>
-          </a:p>
-          <a:p>
-            <a:pPr marL="457200" indent="-457200">
-              <a:buFont typeface="+mj-lt"/>
-              <a:buAutoNum type="arabicPeriod"/>
+              <a:rPr lang="en-US" sz="1800" dirty="0">
+                <a:solidFill>
+                  <a:srgbClr val="FFFF00"/>
+                </a:solidFill>
+              </a:rPr>
+              <a:t>No need for intermediate result determination in (nearly) all cases:</a:t>
+            </a:r>
+          </a:p>
+          <a:p>
+            <a:pPr marL="0" indent="0">
+              <a:buNone/>
               <a:defRPr/>
             </a:pPr>
             <a:r>
@@ -29254,7 +29435,7 @@
                   <a:srgbClr val="00FF00"/>
                 </a:solidFill>
               </a:rPr>
-              <a:t>In business accounting &amp; chemistry, do the rounding at the end of the calculation. To significant digits </a:t>
+              <a:t>In business accounting &amp; chemistry, do the rounding at the end of the calculation. To significant digits (or decimal places)</a:t>
             </a:r>
           </a:p>
         </p:txBody>
@@ -29272,7 +29453,7 @@
 </p:sld>
 </file>
 
-<file path=ppt/slides/slide25.xml><?xml version="1.0" encoding="utf-8"?>
+<file path=ppt/slides/slide26.xml><?xml version="1.0" encoding="utf-8"?>
 <p:sld xmlns:a="http://schemas.openxmlformats.org/drawingml/2006/main" xmlns:r="http://schemas.openxmlformats.org/officeDocument/2006/relationships" xmlns:p="http://schemas.openxmlformats.org/presentationml/2006/main">
   <p:cSld>
     <p:spTree>
@@ -29430,7 +29611,7 @@
 </p:sld>
 </file>
 
-<file path=ppt/slides/slide26.xml><?xml version="1.0" encoding="utf-8"?>
+<file path=ppt/slides/slide27.xml><?xml version="1.0" encoding="utf-8"?>
 <p:sld xmlns:a="http://schemas.openxmlformats.org/drawingml/2006/main" xmlns:r="http://schemas.openxmlformats.org/officeDocument/2006/relationships" xmlns:p="http://schemas.openxmlformats.org/presentationml/2006/main">
   <p:cSld>
     <p:spTree>
@@ -29694,7 +29875,7 @@
 </p:sld>
 </file>
 
-<file path=ppt/slides/slide27.xml><?xml version="1.0" encoding="utf-8"?>
+<file path=ppt/slides/slide28.xml><?xml version="1.0" encoding="utf-8"?>
 <p:sld xmlns:a="http://schemas.openxmlformats.org/drawingml/2006/main" xmlns:r="http://schemas.openxmlformats.org/officeDocument/2006/relationships" xmlns:p="http://schemas.openxmlformats.org/presentationml/2006/main">
   <p:cSld>
     <p:spTree>
@@ -29927,7 +30108,7 @@
 </p:sld>
 </file>
 
-<file path=ppt/slides/slide28.xml><?xml version="1.0" encoding="utf-8"?>
+<file path=ppt/slides/slide29.xml><?xml version="1.0" encoding="utf-8"?>
 <p:sld xmlns:a="http://schemas.openxmlformats.org/drawingml/2006/main" xmlns:r="http://schemas.openxmlformats.org/officeDocument/2006/relationships" xmlns:p="http://schemas.openxmlformats.org/presentationml/2006/main">
   <p:cSld>
     <p:spTree>
@@ -30207,255 +30388,6 @@
     <p:extLst>
       <p:ext uri="{BB962C8B-B14F-4D97-AF65-F5344CB8AC3E}">
         <p14:creationId xmlns:p14="http://schemas.microsoft.com/office/powerpoint/2010/main" val="3215942982"/>
-      </p:ext>
-    </p:extLst>
-  </p:cSld>
-  <p:clrMapOvr>
-    <a:masterClrMapping/>
-  </p:clrMapOvr>
-</p:sld>
-</file>
-
-<file path=ppt/slides/slide29.xml><?xml version="1.0" encoding="utf-8"?>
-<p:sld xmlns:a="http://schemas.openxmlformats.org/drawingml/2006/main" xmlns:r="http://schemas.openxmlformats.org/officeDocument/2006/relationships" xmlns:p="http://schemas.openxmlformats.org/presentationml/2006/main">
-  <p:cSld>
-    <p:spTree>
-      <p:nvGrpSpPr>
-        <p:cNvPr id="1" name="">
-          <a:extLst>
-            <a:ext uri="{FF2B5EF4-FFF2-40B4-BE49-F238E27FC236}">
-              <a16:creationId xmlns:a16="http://schemas.microsoft.com/office/drawing/2014/main" id="{FCD3272F-1B6F-52A9-BA34-AAE242B9BFC3}"/>
-            </a:ext>
-          </a:extLst>
-        </p:cNvPr>
-        <p:cNvGrpSpPr/>
-        <p:nvPr/>
-      </p:nvGrpSpPr>
-      <p:grpSpPr>
-        <a:xfrm>
-          <a:off x="0" y="0"/>
-          <a:ext cx="0" cy="0"/>
-          <a:chOff x="0" y="0"/>
-          <a:chExt cx="0" cy="0"/>
-        </a:xfrm>
-      </p:grpSpPr>
-      <p:sp>
-        <p:nvSpPr>
-          <p:cNvPr id="4" name="Title 3">
-            <a:extLst>
-              <a:ext uri="{FF2B5EF4-FFF2-40B4-BE49-F238E27FC236}">
-                <a16:creationId xmlns:a16="http://schemas.microsoft.com/office/drawing/2014/main" id="{AFBDE3E4-8CEA-964C-19D2-B8E5CB169ACD}"/>
-              </a:ext>
-            </a:extLst>
-          </p:cNvPr>
-          <p:cNvSpPr>
-            <a:spLocks noGrp="1"/>
-          </p:cNvSpPr>
-          <p:nvPr>
-            <p:ph type="title"/>
-          </p:nvPr>
-        </p:nvSpPr>
-        <p:spPr>
-          <a:xfrm>
-            <a:off x="364067" y="336851"/>
-            <a:ext cx="8421512" cy="646331"/>
-          </a:xfrm>
-        </p:spPr>
-        <p:txBody>
-          <a:bodyPr/>
-          <a:lstStyle/>
-          <a:p>
-            <a:r>
-              <a:rPr lang="en-US" sz="3600" dirty="0"/>
-              <a:t>“Conversion Factors”</a:t>
-            </a:r>
-          </a:p>
-        </p:txBody>
-      </p:sp>
-      <p:sp>
-        <p:nvSpPr>
-          <p:cNvPr id="6" name="Content Placeholder 5">
-            <a:extLst>
-              <a:ext uri="{FF2B5EF4-FFF2-40B4-BE49-F238E27FC236}">
-                <a16:creationId xmlns:a16="http://schemas.microsoft.com/office/drawing/2014/main" id="{5FFADD48-4BAE-7A7F-9783-2253800A3BEA}"/>
-              </a:ext>
-            </a:extLst>
-          </p:cNvPr>
-          <p:cNvSpPr>
-            <a:spLocks noGrp="1"/>
-          </p:cNvSpPr>
-          <p:nvPr>
-            <p:ph idx="1"/>
-          </p:nvPr>
-        </p:nvSpPr>
-        <p:spPr/>
-        <p:txBody>
-          <a:bodyPr/>
-          <a:lstStyle/>
-          <a:p>
-            <a:pPr marL="0" indent="0">
-              <a:buNone/>
-              <a:defRPr/>
-            </a:pPr>
-            <a:r>
-              <a:rPr kumimoji="0" lang="en-US" b="0" i="0" u="none" strike="noStrike" kern="0" cap="none" spc="0" normalizeH="0" baseline="0" noProof="0" dirty="0">
-                <a:ln>
-                  <a:noFill/>
-                </a:ln>
-                <a:solidFill>
-                  <a:srgbClr val="FFFFFF"/>
-                </a:solidFill>
-                <a:effectLst/>
-                <a:uLnTx/>
-                <a:uFillTx/>
-                <a:latin typeface="Verdana"/>
-                <a:ea typeface="+mn-ea"/>
-                <a:cs typeface="+mn-cs"/>
-              </a:rPr>
-              <a:t>Calculations in chemistry frequently require converting between the </a:t>
-            </a:r>
-            <a:r>
-              <a:rPr kumimoji="0" lang="en-US" b="0" i="0" u="none" strike="noStrike" kern="0" cap="none" spc="0" normalizeH="0" baseline="0" noProof="0" dirty="0">
-                <a:ln>
-                  <a:noFill/>
-                </a:ln>
-                <a:solidFill>
-                  <a:srgbClr val="00FF00"/>
-                </a:solidFill>
-                <a:effectLst/>
-                <a:uLnTx/>
-                <a:uFillTx/>
-                <a:latin typeface="Verdana"/>
-                <a:ea typeface="+mn-ea"/>
-                <a:cs typeface="+mn-cs"/>
-              </a:rPr>
-              <a:t>units</a:t>
-            </a:r>
-            <a:r>
-              <a:rPr kumimoji="0" lang="en-US" b="0" i="0" u="none" strike="noStrike" kern="0" cap="none" spc="0" normalizeH="0" baseline="0" noProof="0" dirty="0">
-                <a:ln>
-                  <a:noFill/>
-                </a:ln>
-                <a:solidFill>
-                  <a:srgbClr val="FFFFFF"/>
-                </a:solidFill>
-                <a:effectLst/>
-                <a:uLnTx/>
-                <a:uFillTx/>
-                <a:latin typeface="Verdana"/>
-                <a:ea typeface="+mn-ea"/>
-                <a:cs typeface="+mn-cs"/>
-              </a:rPr>
-              <a:t> of a </a:t>
-            </a:r>
-            <a:r>
-              <a:rPr kumimoji="0" lang="en-US" b="0" i="0" u="none" strike="noStrike" kern="0" cap="none" spc="0" normalizeH="0" baseline="0" noProof="0" dirty="0">
-                <a:ln>
-                  <a:noFill/>
-                </a:ln>
-                <a:solidFill>
-                  <a:srgbClr val="00FF00"/>
-                </a:solidFill>
-                <a:effectLst/>
-                <a:uLnTx/>
-                <a:uFillTx/>
-                <a:latin typeface="Verdana"/>
-                <a:ea typeface="+mn-ea"/>
-                <a:cs typeface="+mn-cs"/>
-              </a:rPr>
-              <a:t>quantity</a:t>
-            </a:r>
-          </a:p>
-          <a:p>
-            <a:pPr>
-              <a:defRPr/>
-            </a:pPr>
-            <a:r>
-              <a:rPr lang="en-US" dirty="0"/>
-              <a:t>Volume: fluid ounces to milliliter (“</a:t>
-            </a:r>
-            <a:r>
-              <a:rPr lang="en-US" dirty="0" err="1"/>
-              <a:t>fl</a:t>
-            </a:r>
-            <a:r>
-              <a:rPr lang="en-US" dirty="0"/>
-              <a:t> oz” to “ml”)</a:t>
-            </a:r>
-          </a:p>
-          <a:p>
-            <a:pPr>
-              <a:defRPr/>
-            </a:pPr>
-            <a:r>
-              <a:rPr lang="en-US" dirty="0"/>
-              <a:t>Temperature: Celsius to Kelvin (“°C” to “K”)</a:t>
-            </a:r>
-          </a:p>
-          <a:p>
-            <a:pPr>
-              <a:defRPr/>
-            </a:pPr>
-            <a:r>
-              <a:rPr lang="en-US" dirty="0"/>
-              <a:t>Pressure: torr to atmosphere (“torr” to “atm”</a:t>
-            </a:r>
-          </a:p>
-          <a:p>
-            <a:pPr marL="0" indent="0">
-              <a:buNone/>
-              <a:defRPr/>
-            </a:pPr>
-            <a:endParaRPr lang="en-US" dirty="0"/>
-          </a:p>
-          <a:p>
-            <a:pPr marL="0" indent="0">
-              <a:buNone/>
-              <a:defRPr/>
-            </a:pPr>
-            <a:r>
-              <a:rPr lang="en-US" dirty="0"/>
-              <a:t>Conversions not just about measurement systems but also include scales which are powers of 10</a:t>
-            </a:r>
-          </a:p>
-          <a:p>
-            <a:pPr>
-              <a:defRPr/>
-            </a:pPr>
-            <a:r>
-              <a:rPr lang="en-US" dirty="0"/>
-              <a:t>1 liter (L) = 1000 milliliters = 1000 mL</a:t>
-            </a:r>
-          </a:p>
-          <a:p>
-            <a:pPr marL="236538" lvl="1" indent="0">
-              <a:buNone/>
-              <a:defRPr/>
-            </a:pPr>
-            <a:r>
-              <a:rPr lang="en-US" dirty="0">
-                <a:solidFill>
-                  <a:srgbClr val="FFC000"/>
-                </a:solidFill>
-              </a:rPr>
-              <a:t>not 1000 ml! use SI unit lettering case</a:t>
-            </a:r>
-          </a:p>
-          <a:p>
-            <a:pPr>
-              <a:defRPr/>
-            </a:pPr>
-            <a:r>
-              <a:rPr lang="en-US" dirty="0"/>
-              <a:t>1 kilogram (kg) = 1000 grams (g)</a:t>
-            </a:r>
-          </a:p>
-        </p:txBody>
-      </p:sp>
-    </p:spTree>
-    <p:extLst>
-      <p:ext uri="{BB962C8B-B14F-4D97-AF65-F5344CB8AC3E}">
-        <p14:creationId xmlns:p14="http://schemas.microsoft.com/office/powerpoint/2010/main" val="2113888390"/>
       </p:ext>
     </p:extLst>
   </p:cSld>
@@ -30911,6 +30843,255 @@
 </file>
 
 <file path=ppt/slides/slide30.xml><?xml version="1.0" encoding="utf-8"?>
+<p:sld xmlns:a="http://schemas.openxmlformats.org/drawingml/2006/main" xmlns:r="http://schemas.openxmlformats.org/officeDocument/2006/relationships" xmlns:p="http://schemas.openxmlformats.org/presentationml/2006/main">
+  <p:cSld>
+    <p:spTree>
+      <p:nvGrpSpPr>
+        <p:cNvPr id="1" name="">
+          <a:extLst>
+            <a:ext uri="{FF2B5EF4-FFF2-40B4-BE49-F238E27FC236}">
+              <a16:creationId xmlns:a16="http://schemas.microsoft.com/office/drawing/2014/main" id="{FCD3272F-1B6F-52A9-BA34-AAE242B9BFC3}"/>
+            </a:ext>
+          </a:extLst>
+        </p:cNvPr>
+        <p:cNvGrpSpPr/>
+        <p:nvPr/>
+      </p:nvGrpSpPr>
+      <p:grpSpPr>
+        <a:xfrm>
+          <a:off x="0" y="0"/>
+          <a:ext cx="0" cy="0"/>
+          <a:chOff x="0" y="0"/>
+          <a:chExt cx="0" cy="0"/>
+        </a:xfrm>
+      </p:grpSpPr>
+      <p:sp>
+        <p:nvSpPr>
+          <p:cNvPr id="4" name="Title 3">
+            <a:extLst>
+              <a:ext uri="{FF2B5EF4-FFF2-40B4-BE49-F238E27FC236}">
+                <a16:creationId xmlns:a16="http://schemas.microsoft.com/office/drawing/2014/main" id="{AFBDE3E4-8CEA-964C-19D2-B8E5CB169ACD}"/>
+              </a:ext>
+            </a:extLst>
+          </p:cNvPr>
+          <p:cNvSpPr>
+            <a:spLocks noGrp="1"/>
+          </p:cNvSpPr>
+          <p:nvPr>
+            <p:ph type="title"/>
+          </p:nvPr>
+        </p:nvSpPr>
+        <p:spPr>
+          <a:xfrm>
+            <a:off x="364067" y="275297"/>
+            <a:ext cx="8421512" cy="769441"/>
+          </a:xfrm>
+        </p:spPr>
+        <p:txBody>
+          <a:bodyPr/>
+          <a:lstStyle/>
+          <a:p>
+            <a:r>
+              <a:rPr lang="en-US" sz="4400" dirty="0"/>
+              <a:t>Conversion Factors</a:t>
+            </a:r>
+          </a:p>
+        </p:txBody>
+      </p:sp>
+      <p:sp>
+        <p:nvSpPr>
+          <p:cNvPr id="6" name="Content Placeholder 5">
+            <a:extLst>
+              <a:ext uri="{FF2B5EF4-FFF2-40B4-BE49-F238E27FC236}">
+                <a16:creationId xmlns:a16="http://schemas.microsoft.com/office/drawing/2014/main" id="{5FFADD48-4BAE-7A7F-9783-2253800A3BEA}"/>
+              </a:ext>
+            </a:extLst>
+          </p:cNvPr>
+          <p:cNvSpPr>
+            <a:spLocks noGrp="1"/>
+          </p:cNvSpPr>
+          <p:nvPr>
+            <p:ph idx="1"/>
+          </p:nvPr>
+        </p:nvSpPr>
+        <p:spPr/>
+        <p:txBody>
+          <a:bodyPr/>
+          <a:lstStyle/>
+          <a:p>
+            <a:pPr marL="0" indent="0">
+              <a:buNone/>
+              <a:defRPr/>
+            </a:pPr>
+            <a:r>
+              <a:rPr kumimoji="0" lang="en-US" b="0" i="0" u="none" strike="noStrike" kern="0" cap="none" spc="0" normalizeH="0" baseline="0" noProof="0" dirty="0">
+                <a:ln>
+                  <a:noFill/>
+                </a:ln>
+                <a:solidFill>
+                  <a:srgbClr val="FFFFFF"/>
+                </a:solidFill>
+                <a:effectLst/>
+                <a:uLnTx/>
+                <a:uFillTx/>
+                <a:latin typeface="Verdana"/>
+                <a:ea typeface="+mn-ea"/>
+                <a:cs typeface="+mn-cs"/>
+              </a:rPr>
+              <a:t>Calculations in chemistry frequently require converting between the </a:t>
+            </a:r>
+            <a:r>
+              <a:rPr kumimoji="0" lang="en-US" b="0" i="0" u="none" strike="noStrike" kern="0" cap="none" spc="0" normalizeH="0" baseline="0" noProof="0" dirty="0">
+                <a:ln>
+                  <a:noFill/>
+                </a:ln>
+                <a:solidFill>
+                  <a:srgbClr val="00FF00"/>
+                </a:solidFill>
+                <a:effectLst/>
+                <a:uLnTx/>
+                <a:uFillTx/>
+                <a:latin typeface="Verdana"/>
+                <a:ea typeface="+mn-ea"/>
+                <a:cs typeface="+mn-cs"/>
+              </a:rPr>
+              <a:t>units</a:t>
+            </a:r>
+            <a:r>
+              <a:rPr kumimoji="0" lang="en-US" b="0" i="0" u="none" strike="noStrike" kern="0" cap="none" spc="0" normalizeH="0" baseline="0" noProof="0" dirty="0">
+                <a:ln>
+                  <a:noFill/>
+                </a:ln>
+                <a:solidFill>
+                  <a:srgbClr val="FFFFFF"/>
+                </a:solidFill>
+                <a:effectLst/>
+                <a:uLnTx/>
+                <a:uFillTx/>
+                <a:latin typeface="Verdana"/>
+                <a:ea typeface="+mn-ea"/>
+                <a:cs typeface="+mn-cs"/>
+              </a:rPr>
+              <a:t> of a </a:t>
+            </a:r>
+            <a:r>
+              <a:rPr kumimoji="0" lang="en-US" b="0" i="0" u="none" strike="noStrike" kern="0" cap="none" spc="0" normalizeH="0" baseline="0" noProof="0" dirty="0">
+                <a:ln>
+                  <a:noFill/>
+                </a:ln>
+                <a:solidFill>
+                  <a:srgbClr val="00FF00"/>
+                </a:solidFill>
+                <a:effectLst/>
+                <a:uLnTx/>
+                <a:uFillTx/>
+                <a:latin typeface="Verdana"/>
+                <a:ea typeface="+mn-ea"/>
+                <a:cs typeface="+mn-cs"/>
+              </a:rPr>
+              <a:t>quantity</a:t>
+            </a:r>
+          </a:p>
+          <a:p>
+            <a:pPr>
+              <a:defRPr/>
+            </a:pPr>
+            <a:r>
+              <a:rPr lang="en-US" dirty="0"/>
+              <a:t>Volume: fluid ounces to milliliter (“</a:t>
+            </a:r>
+            <a:r>
+              <a:rPr lang="en-US" dirty="0" err="1"/>
+              <a:t>fl</a:t>
+            </a:r>
+            <a:r>
+              <a:rPr lang="en-US" dirty="0"/>
+              <a:t> oz” to “ml”)</a:t>
+            </a:r>
+          </a:p>
+          <a:p>
+            <a:pPr>
+              <a:defRPr/>
+            </a:pPr>
+            <a:r>
+              <a:rPr lang="en-US" dirty="0"/>
+              <a:t>Temperature: Celsius to Kelvin (“°C” to “K”)</a:t>
+            </a:r>
+          </a:p>
+          <a:p>
+            <a:pPr>
+              <a:defRPr/>
+            </a:pPr>
+            <a:r>
+              <a:rPr lang="en-US" dirty="0"/>
+              <a:t>Pressure: torr to atmosphere (“torr” to “atm”</a:t>
+            </a:r>
+          </a:p>
+          <a:p>
+            <a:pPr marL="0" indent="0">
+              <a:buNone/>
+              <a:defRPr/>
+            </a:pPr>
+            <a:endParaRPr lang="en-US" dirty="0"/>
+          </a:p>
+          <a:p>
+            <a:pPr marL="0" indent="0">
+              <a:buNone/>
+              <a:defRPr/>
+            </a:pPr>
+            <a:r>
+              <a:rPr lang="en-US" dirty="0"/>
+              <a:t>Conversions not just about measurement systems but also include scales which are powers of 10</a:t>
+            </a:r>
+          </a:p>
+          <a:p>
+            <a:pPr>
+              <a:defRPr/>
+            </a:pPr>
+            <a:r>
+              <a:rPr lang="en-US" dirty="0"/>
+              <a:t>1 liter (L) = 1000 milliliters = 1000 mL</a:t>
+            </a:r>
+          </a:p>
+          <a:p>
+            <a:pPr marL="236538" lvl="1" indent="0">
+              <a:buNone/>
+              <a:defRPr/>
+            </a:pPr>
+            <a:r>
+              <a:rPr lang="en-US" dirty="0">
+                <a:solidFill>
+                  <a:srgbClr val="FFC000"/>
+                </a:solidFill>
+              </a:rPr>
+              <a:t>not 1000 ml! use SI unit lettering case</a:t>
+            </a:r>
+          </a:p>
+          <a:p>
+            <a:pPr>
+              <a:defRPr/>
+            </a:pPr>
+            <a:r>
+              <a:rPr lang="en-US" dirty="0"/>
+              <a:t>1 kilogram (kg) = 1000 grams (g)</a:t>
+            </a:r>
+          </a:p>
+        </p:txBody>
+      </p:sp>
+    </p:spTree>
+    <p:extLst>
+      <p:ext uri="{BB962C8B-B14F-4D97-AF65-F5344CB8AC3E}">
+        <p14:creationId xmlns:p14="http://schemas.microsoft.com/office/powerpoint/2010/main" val="2113888390"/>
+      </p:ext>
+    </p:extLst>
+  </p:cSld>
+  <p:clrMapOvr>
+    <a:masterClrMapping/>
+  </p:clrMapOvr>
+</p:sld>
+</file>
+
+<file path=ppt/slides/slide31.xml><?xml version="1.0" encoding="utf-8"?>
 <p:sld xmlns:a="http://schemas.openxmlformats.org/drawingml/2006/main" xmlns:r="http://schemas.openxmlformats.org/officeDocument/2006/relationships" xmlns:p="http://schemas.openxmlformats.org/presentationml/2006/main">
   <p:cSld>
     <p:spTree>
@@ -32064,7 +32245,7 @@
 </p:sld>
 </file>
 
-<file path=ppt/slides/slide31.xml><?xml version="1.0" encoding="utf-8"?>
+<file path=ppt/slides/slide32.xml><?xml version="1.0" encoding="utf-8"?>
 <p:sld xmlns:a="http://schemas.openxmlformats.org/drawingml/2006/main" xmlns:r="http://schemas.openxmlformats.org/officeDocument/2006/relationships" xmlns:p="http://schemas.openxmlformats.org/presentationml/2006/main">
   <p:cSld>
     <p:spTree>
@@ -32257,7 +32438,7 @@
 </p:sld>
 </file>
 
-<file path=ppt/slides/slide32.xml><?xml version="1.0" encoding="utf-8"?>
+<file path=ppt/slides/slide33.xml><?xml version="1.0" encoding="utf-8"?>
 <p:sld xmlns:a="http://schemas.openxmlformats.org/drawingml/2006/main" xmlns:r="http://schemas.openxmlformats.org/officeDocument/2006/relationships" xmlns:p="http://schemas.openxmlformats.org/presentationml/2006/main">
   <p:cSld>
     <p:spTree>
@@ -32501,7 +32682,7 @@
 </p:sld>
 </file>
 
-<file path=ppt/slides/slide33.xml><?xml version="1.0" encoding="utf-8"?>
+<file path=ppt/slides/slide34.xml><?xml version="1.0" encoding="utf-8"?>
 <p:sld xmlns:a="http://schemas.openxmlformats.org/drawingml/2006/main" xmlns:r="http://schemas.openxmlformats.org/officeDocument/2006/relationships" xmlns:p="http://schemas.openxmlformats.org/presentationml/2006/main">
   <p:cSld>
     <p:spTree>
@@ -32740,7 +32921,7 @@
 </p:sld>
 </file>
 
-<file path=ppt/slides/slide34.xml><?xml version="1.0" encoding="utf-8"?>
+<file path=ppt/slides/slide35.xml><?xml version="1.0" encoding="utf-8"?>
 <p:sld xmlns:a="http://schemas.openxmlformats.org/drawingml/2006/main" xmlns:r="http://schemas.openxmlformats.org/officeDocument/2006/relationships" xmlns:p="http://schemas.openxmlformats.org/presentationml/2006/main">
   <p:cSld>
     <p:spTree>
@@ -32791,8 +32972,8 @@
           </a:p>
         </p:txBody>
       </p:sp>
-      <mc:AlternateContent xmlns:mc="http://schemas.openxmlformats.org/markup-compatibility/2006">
-        <mc:Choice xmlns:a14="http://schemas.microsoft.com/office/drawing/2010/main" Requires="a14">
+      <mc:AlternateContent xmlns:mc="http://schemas.openxmlformats.org/markup-compatibility/2006" xmlns:a14="http://schemas.microsoft.com/office/drawing/2010/main">
+        <mc:Choice Requires="a14">
           <p:sp>
             <p:nvSpPr>
               <p:cNvPr id="5" name="Content Placeholder 4">
@@ -33214,7 +33395,7 @@
             </p:txBody>
           </p:sp>
         </mc:Choice>
-        <mc:Fallback>
+        <mc:Fallback xmlns="">
           <p:sp>
             <p:nvSpPr>
               <p:cNvPr id="5" name="Content Placeholder 4">
@@ -33267,7 +33448,7 @@
 </p:sld>
 </file>
 
-<file path=ppt/slides/slide35.xml><?xml version="1.0" encoding="utf-8"?>
+<file path=ppt/slides/slide36.xml><?xml version="1.0" encoding="utf-8"?>
 <p:sld xmlns:a="http://schemas.openxmlformats.org/drawingml/2006/main" xmlns:r="http://schemas.openxmlformats.org/officeDocument/2006/relationships" xmlns:p="http://schemas.openxmlformats.org/presentationml/2006/main">
   <p:cSld>
     <p:spTree>
@@ -33318,8 +33499,8 @@
           </a:p>
         </p:txBody>
       </p:sp>
-      <mc:AlternateContent xmlns:mc="http://schemas.openxmlformats.org/markup-compatibility/2006">
-        <mc:Choice xmlns:a14="http://schemas.microsoft.com/office/drawing/2010/main" Requires="a14">
+      <mc:AlternateContent xmlns:mc="http://schemas.openxmlformats.org/markup-compatibility/2006" xmlns:a14="http://schemas.microsoft.com/office/drawing/2010/main">
+        <mc:Choice Requires="a14">
           <p:sp>
             <p:nvSpPr>
               <p:cNvPr id="5" name="Content Placeholder 4">
@@ -33781,7 +33962,7 @@
             </p:txBody>
           </p:sp>
         </mc:Choice>
-        <mc:Fallback>
+        <mc:Fallback xmlns="">
           <p:sp>
             <p:nvSpPr>
               <p:cNvPr id="5" name="Content Placeholder 4">
@@ -33834,7 +34015,7 @@
 </p:sld>
 </file>
 
-<file path=ppt/slides/slide36.xml><?xml version="1.0" encoding="utf-8"?>
+<file path=ppt/slides/slide37.xml><?xml version="1.0" encoding="utf-8"?>
 <p:sld xmlns:a="http://schemas.openxmlformats.org/drawingml/2006/main" xmlns:r="http://schemas.openxmlformats.org/officeDocument/2006/relationships" xmlns:p="http://schemas.openxmlformats.org/presentationml/2006/main">
   <p:cSld>
     <p:spTree>
@@ -33885,8 +34066,8 @@
           </a:p>
         </p:txBody>
       </p:sp>
-      <mc:AlternateContent xmlns:mc="http://schemas.openxmlformats.org/markup-compatibility/2006">
-        <mc:Choice xmlns:a14="http://schemas.microsoft.com/office/drawing/2010/main" Requires="a14">
+      <mc:AlternateContent xmlns:mc="http://schemas.openxmlformats.org/markup-compatibility/2006" xmlns:a14="http://schemas.microsoft.com/office/drawing/2010/main">
+        <mc:Choice Requires="a14">
           <p:sp>
             <p:nvSpPr>
               <p:cNvPr id="5" name="Content Placeholder 4">
@@ -34360,14 +34541,7 @@
                                   <a:latin typeface="Cambria Math" panose="02040503050406030204" pitchFamily="18" charset="0"/>
                                   <a:ea typeface="Cambria Math" panose="02040503050406030204" pitchFamily="18" charset="0"/>
                                 </a:rPr>
-                                <m:t>(</m:t>
-                              </m:r>
-                              <m:r>
-                                <a:rPr lang="en-US" i="1">
-                                  <a:latin typeface="Cambria Math" panose="02040503050406030204" pitchFamily="18" charset="0"/>
-                                  <a:ea typeface="Cambria Math" panose="02040503050406030204" pitchFamily="18" charset="0"/>
-                                </a:rPr>
-                                <m:t>1</m:t>
+                                <m:t>(1</m:t>
                               </m:r>
                               <m:r>
                                 <a:rPr lang="en-US" b="0" i="1" smtClean="0">
@@ -34539,13 +34713,7 @@
                             <a:rPr lang="en-US" i="1">
                               <a:latin typeface="Cambria Math" panose="02040503050406030204" pitchFamily="18" charset="0"/>
                             </a:rPr>
-                            <m:t>1</m:t>
-                          </m:r>
-                          <m:r>
-                            <a:rPr lang="en-US" i="1">
-                              <a:latin typeface="Cambria Math" panose="02040503050406030204" pitchFamily="18" charset="0"/>
-                            </a:rPr>
-                            <m:t>2</m:t>
+                            <m:t>12</m:t>
                           </m:r>
                         </m:num>
                         <m:den>
@@ -34720,14 +34888,7 @@
                                   <a:latin typeface="Cambria Math" panose="02040503050406030204" pitchFamily="18" charset="0"/>
                                   <a:ea typeface="Cambria Math" panose="02040503050406030204" pitchFamily="18" charset="0"/>
                                 </a:rPr>
-                                <m:t>(</m:t>
-                              </m:r>
-                              <m:r>
-                                <a:rPr lang="en-US" i="1">
-                                  <a:latin typeface="Cambria Math" panose="02040503050406030204" pitchFamily="18" charset="0"/>
-                                  <a:ea typeface="Cambria Math" panose="02040503050406030204" pitchFamily="18" charset="0"/>
-                                </a:rPr>
-                                <m:t>1</m:t>
+                                <m:t>(1</m:t>
                               </m:r>
                               <m:r>
                                 <a:rPr lang="en-US" i="1" smtClean="0">
@@ -34811,14 +34972,7 @@
                                   <a:latin typeface="Cambria Math" panose="02040503050406030204" pitchFamily="18" charset="0"/>
                                   <a:ea typeface="Cambria Math" panose="02040503050406030204" pitchFamily="18" charset="0"/>
                                 </a:rPr>
-                                <m:t>1</m:t>
-                              </m:r>
-                              <m:r>
-                                <a:rPr lang="en-US" i="1">
-                                  <a:latin typeface="Cambria Math" panose="02040503050406030204" pitchFamily="18" charset="0"/>
-                                  <a:ea typeface="Cambria Math" panose="02040503050406030204" pitchFamily="18" charset="0"/>
-                                </a:rPr>
-                                <m:t>00</m:t>
+                                <m:t>100</m:t>
                               </m:r>
                             </m:e>
                             <m:sup>
@@ -34893,7 +35047,7 @@
             </p:txBody>
           </p:sp>
         </mc:Choice>
-        <mc:Fallback>
+        <mc:Fallback xmlns="">
           <p:sp>
             <p:nvSpPr>
               <p:cNvPr id="5" name="Content Placeholder 4">
@@ -34946,7 +35100,7 @@
 </p:sld>
 </file>
 
-<file path=ppt/slides/slide37.xml><?xml version="1.0" encoding="utf-8"?>
+<file path=ppt/slides/slide38.xml><?xml version="1.0" encoding="utf-8"?>
 <p:sld xmlns:a="http://schemas.openxmlformats.org/drawingml/2006/main" xmlns:r="http://schemas.openxmlformats.org/officeDocument/2006/relationships" xmlns:p="http://schemas.openxmlformats.org/presentationml/2006/main">
   <p:cSld>
     <p:spTree>
@@ -34997,8 +35151,8 @@
           </a:p>
         </p:txBody>
       </p:sp>
-      <mc:AlternateContent xmlns:mc="http://schemas.openxmlformats.org/markup-compatibility/2006">
-        <mc:Choice xmlns:a14="http://schemas.microsoft.com/office/drawing/2010/main" Requires="a14">
+      <mc:AlternateContent xmlns:mc="http://schemas.openxmlformats.org/markup-compatibility/2006" xmlns:a14="http://schemas.microsoft.com/office/drawing/2010/main">
+        <mc:Choice Requires="a14">
           <p:sp>
             <p:nvSpPr>
               <p:cNvPr id="5" name="Content Placeholder 4">
@@ -35125,19 +35279,7 @@
                             <a:rPr lang="en-US" i="1">
                               <a:latin typeface="Cambria Math" panose="02040503050406030204" pitchFamily="18" charset="0"/>
                             </a:rPr>
-                            <m:t>1</m:t>
-                          </m:r>
-                          <m:r>
-                            <a:rPr lang="en-US" i="1">
-                              <a:latin typeface="Cambria Math" panose="02040503050406030204" pitchFamily="18" charset="0"/>
-                            </a:rPr>
-                            <m:t>2</m:t>
-                          </m:r>
-                          <m:r>
-                            <a:rPr lang="en-US" i="1">
-                              <a:latin typeface="Cambria Math" panose="02040503050406030204" pitchFamily="18" charset="0"/>
-                            </a:rPr>
-                            <m:t> </m:t>
+                            <m:t>12 </m:t>
                           </m:r>
                           <m:r>
                             <m:rPr>
@@ -35362,7 +35504,7 @@
             </p:txBody>
           </p:sp>
         </mc:Choice>
-        <mc:Fallback>
+        <mc:Fallback xmlns="">
           <p:sp>
             <p:nvSpPr>
               <p:cNvPr id="5" name="Content Placeholder 4">
@@ -35415,7 +35557,7 @@
 </p:sld>
 </file>
 
-<file path=ppt/slides/slide38.xml><?xml version="1.0" encoding="utf-8"?>
+<file path=ppt/slides/slide39.xml><?xml version="1.0" encoding="utf-8"?>
 <p:sld xmlns:a="http://schemas.openxmlformats.org/drawingml/2006/main" xmlns:r="http://schemas.openxmlformats.org/officeDocument/2006/relationships" xmlns:p="http://schemas.openxmlformats.org/presentationml/2006/main">
   <p:cSld>
     <p:spTree>
@@ -35854,7 +35996,1148 @@
 </p:sld>
 </file>
 
-<file path=ppt/slides/slide39.xml><?xml version="1.0" encoding="utf-8"?>
+<file path=ppt/slides/slide4.xml><?xml version="1.0" encoding="utf-8"?>
+<p:sld xmlns:a="http://schemas.openxmlformats.org/drawingml/2006/main" xmlns:r="http://schemas.openxmlformats.org/officeDocument/2006/relationships" xmlns:p="http://schemas.openxmlformats.org/presentationml/2006/main">
+  <p:cSld>
+    <p:spTree>
+      <p:nvGrpSpPr>
+        <p:cNvPr id="1" name="">
+          <a:extLst>
+            <a:ext uri="{FF2B5EF4-FFF2-40B4-BE49-F238E27FC236}">
+              <a16:creationId xmlns:a16="http://schemas.microsoft.com/office/drawing/2014/main" id="{77205898-47DB-81B7-F63B-65FCBBEA12CF}"/>
+            </a:ext>
+          </a:extLst>
+        </p:cNvPr>
+        <p:cNvGrpSpPr/>
+        <p:nvPr/>
+      </p:nvGrpSpPr>
+      <p:grpSpPr>
+        <a:xfrm>
+          <a:off x="0" y="0"/>
+          <a:ext cx="0" cy="0"/>
+          <a:chOff x="0" y="0"/>
+          <a:chExt cx="0" cy="0"/>
+        </a:xfrm>
+      </p:grpSpPr>
+      <p:sp>
+        <p:nvSpPr>
+          <p:cNvPr id="4" name="Title 3">
+            <a:extLst>
+              <a:ext uri="{FF2B5EF4-FFF2-40B4-BE49-F238E27FC236}">
+                <a16:creationId xmlns:a16="http://schemas.microsoft.com/office/drawing/2014/main" id="{D7E8F352-CE19-BD16-D0FA-ED2971FDDA4B}"/>
+              </a:ext>
+            </a:extLst>
+          </p:cNvPr>
+          <p:cNvSpPr>
+            <a:spLocks noGrp="1"/>
+          </p:cNvSpPr>
+          <p:nvPr>
+            <p:ph type="title"/>
+          </p:nvPr>
+        </p:nvSpPr>
+        <p:spPr>
+          <a:xfrm>
+            <a:off x="364067" y="306073"/>
+            <a:ext cx="8421512" cy="707886"/>
+          </a:xfrm>
+        </p:spPr>
+        <p:txBody>
+          <a:bodyPr/>
+          <a:lstStyle/>
+          <a:p>
+            <a:r>
+              <a:rPr lang="en-US" sz="4000" dirty="0"/>
+              <a:t>Scientific Notation</a:t>
+            </a:r>
+          </a:p>
+        </p:txBody>
+      </p:sp>
+      <p:sp>
+        <p:nvSpPr>
+          <p:cNvPr id="6" name="Content Placeholder 5">
+            <a:extLst>
+              <a:ext uri="{FF2B5EF4-FFF2-40B4-BE49-F238E27FC236}">
+                <a16:creationId xmlns:a16="http://schemas.microsoft.com/office/drawing/2014/main" id="{452EC8EF-100A-C97D-FC60-0F9A0B8B0A80}"/>
+              </a:ext>
+            </a:extLst>
+          </p:cNvPr>
+          <p:cNvSpPr>
+            <a:spLocks noGrp="1"/>
+          </p:cNvSpPr>
+          <p:nvPr>
+            <p:ph idx="1"/>
+          </p:nvPr>
+        </p:nvSpPr>
+        <p:spPr/>
+        <p:txBody>
+          <a:bodyPr/>
+          <a:lstStyle/>
+          <a:p>
+            <a:pPr marL="0" indent="0">
+              <a:buNone/>
+            </a:pPr>
+            <a:r>
+              <a:rPr lang="en-US" dirty="0"/>
+              <a:t>A way of expressing numerical values</a:t>
+            </a:r>
+          </a:p>
+          <a:p>
+            <a:pPr marL="0" indent="0">
+              <a:buNone/>
+            </a:pPr>
+            <a:endParaRPr lang="en-US" sz="1200" dirty="0"/>
+          </a:p>
+          <a:p>
+            <a:pPr marL="0" indent="0">
+              <a:buNone/>
+            </a:pPr>
+            <a:r>
+              <a:rPr lang="en-US" dirty="0"/>
+              <a:t>Format:  </a:t>
+            </a:r>
+            <a:r>
+              <a:rPr lang="en-US" i="1" dirty="0" err="1">
+                <a:solidFill>
+                  <a:srgbClr val="FFC000"/>
+                </a:solidFill>
+              </a:rPr>
+              <a:t>d.mmm</a:t>
+            </a:r>
+            <a:r>
+              <a:rPr lang="en-US" i="1" dirty="0">
+                <a:solidFill>
+                  <a:srgbClr val="FFC000"/>
+                </a:solidFill>
+              </a:rPr>
+              <a:t> </a:t>
+            </a:r>
+            <a:r>
+              <a:rPr lang="en-US" dirty="0"/>
+              <a:t>× </a:t>
+            </a:r>
+            <a:r>
+              <a:rPr lang="en-US" dirty="0">
+                <a:solidFill>
+                  <a:schemeClr val="accent1">
+                    <a:lumMod val="60000"/>
+                    <a:lumOff val="40000"/>
+                  </a:schemeClr>
+                </a:solidFill>
+              </a:rPr>
+              <a:t>10</a:t>
+            </a:r>
+            <a:r>
+              <a:rPr lang="en-US" baseline="30000" dirty="0">
+                <a:solidFill>
+                  <a:schemeClr val="accent1">
+                    <a:lumMod val="60000"/>
+                    <a:lumOff val="40000"/>
+                  </a:schemeClr>
+                </a:solidFill>
+              </a:rPr>
+              <a:t>n</a:t>
+            </a:r>
+            <a:endParaRPr lang="en-US" i="1" baseline="30000" dirty="0">
+              <a:solidFill>
+                <a:schemeClr val="accent1">
+                  <a:lumMod val="60000"/>
+                  <a:lumOff val="40000"/>
+                </a:schemeClr>
+              </a:solidFill>
+            </a:endParaRPr>
+          </a:p>
+          <a:p>
+            <a:pPr marL="0" indent="0">
+              <a:buNone/>
+            </a:pPr>
+            <a:endParaRPr lang="en-US" i="1" baseline="30000" dirty="0"/>
+          </a:p>
+        </p:txBody>
+      </p:sp>
+      <p:graphicFrame>
+        <p:nvGraphicFramePr>
+          <p:cNvPr id="7" name="Content Placeholder 2">
+            <a:extLst>
+              <a:ext uri="{FF2B5EF4-FFF2-40B4-BE49-F238E27FC236}">
+                <a16:creationId xmlns:a16="http://schemas.microsoft.com/office/drawing/2014/main" id="{0EDC1EB6-DB92-CFB3-343C-FFDD22B1C09E}"/>
+              </a:ext>
+            </a:extLst>
+          </p:cNvPr>
+          <p:cNvGraphicFramePr>
+            <a:graphicFrameLocks/>
+          </p:cNvGraphicFramePr>
+          <p:nvPr>
+            <p:extLst>
+              <p:ext uri="{D42A27DB-BD31-4B8C-83A1-F6EECF244321}">
+                <p14:modId xmlns:p14="http://schemas.microsoft.com/office/powerpoint/2010/main" val="2048550704"/>
+              </p:ext>
+            </p:extLst>
+          </p:nvPr>
+        </p:nvGraphicFramePr>
+        <p:xfrm>
+          <a:off x="696033" y="2667230"/>
+          <a:ext cx="7042247" cy="3677920"/>
+        </p:xfrm>
+        <a:graphic>
+          <a:graphicData uri="http://schemas.openxmlformats.org/drawingml/2006/table">
+            <a:tbl>
+              <a:tblPr firstRow="1" bandRow="1"/>
+              <a:tblGrid>
+                <a:gridCol w="2535211">
+                  <a:extLst>
+                    <a:ext uri="{9D8B030D-6E8A-4147-A177-3AD203B41FA5}">
+                      <a16:colId xmlns:a16="http://schemas.microsoft.com/office/drawing/2014/main" val="3744240669"/>
+                    </a:ext>
+                  </a:extLst>
+                </a:gridCol>
+                <a:gridCol w="4507036">
+                  <a:extLst>
+                    <a:ext uri="{9D8B030D-6E8A-4147-A177-3AD203B41FA5}">
+                      <a16:colId xmlns:a16="http://schemas.microsoft.com/office/drawing/2014/main" val="1648944909"/>
+                    </a:ext>
+                  </a:extLst>
+                </a:gridCol>
+              </a:tblGrid>
+              <a:tr h="370840">
+                <a:tc>
+                  <a:txBody>
+                    <a:bodyPr/>
+                    <a:lstStyle/>
+                    <a:p>
+                      <a:pPr algn="r"/>
+                      <a:r>
+                        <a:rPr lang="en-US" sz="1400" i="1" kern="1200" dirty="0">
+                          <a:solidFill>
+                            <a:schemeClr val="bg1"/>
+                          </a:solidFill>
+                          <a:latin typeface="+mj-lt"/>
+                          <a:ea typeface="+mn-ea"/>
+                          <a:cs typeface="+mn-cs"/>
+                        </a:rPr>
+                        <a:t>Part</a:t>
+                      </a:r>
+                      <a:endParaRPr lang="en-US" sz="1400" i="1" baseline="0" dirty="0">
+                        <a:solidFill>
+                          <a:schemeClr val="bg1"/>
+                        </a:solidFill>
+                        <a:latin typeface="+mj-lt"/>
+                      </a:endParaRPr>
+                    </a:p>
+                  </a:txBody>
+                  <a:tcPr>
+                    <a:lnR w="12700" cap="flat" cmpd="sng" algn="ctr">
+                      <a:solidFill>
+                        <a:schemeClr val="bg1"/>
+                      </a:solidFill>
+                      <a:prstDash val="solid"/>
+                      <a:round/>
+                      <a:headEnd type="none" w="med" len="med"/>
+                      <a:tailEnd type="none" w="med" len="med"/>
+                    </a:lnR>
+                    <a:lnT w="38100" cap="flat" cmpd="sng" algn="ctr">
+                      <a:solidFill>
+                        <a:schemeClr val="bg1"/>
+                      </a:solidFill>
+                      <a:prstDash val="solid"/>
+                      <a:round/>
+                      <a:headEnd type="none" w="med" len="med"/>
+                      <a:tailEnd type="none" w="med" len="med"/>
+                    </a:lnT>
+                    <a:lnB w="12700" cap="flat" cmpd="sng" algn="ctr">
+                      <a:solidFill>
+                        <a:schemeClr val="bg1"/>
+                      </a:solidFill>
+                      <a:prstDash val="solid"/>
+                      <a:round/>
+                      <a:headEnd type="none" w="med" len="med"/>
+                      <a:tailEnd type="none" w="med" len="med"/>
+                    </a:lnB>
+                  </a:tcPr>
+                </a:tc>
+                <a:tc>
+                  <a:txBody>
+                    <a:bodyPr/>
+                    <a:lstStyle/>
+                    <a:p>
+                      <a:pPr marL="0" marR="0" lvl="0" indent="0" algn="l" defTabSz="914400" rtl="0" eaLnBrk="1" fontAlgn="auto" latinLnBrk="0" hangingPunct="1">
+                        <a:lnSpc>
+                          <a:spcPct val="100000"/>
+                        </a:lnSpc>
+                        <a:spcBef>
+                          <a:spcPts val="0"/>
+                        </a:spcBef>
+                        <a:spcAft>
+                          <a:spcPts val="0"/>
+                        </a:spcAft>
+                        <a:buClrTx/>
+                        <a:buSzTx/>
+                        <a:buFontTx/>
+                        <a:buNone/>
+                        <a:tabLst/>
+                        <a:defRPr/>
+                      </a:pPr>
+                      <a:r>
+                        <a:rPr lang="en-US" i="1" baseline="0" dirty="0" err="1">
+                          <a:solidFill>
+                            <a:srgbClr val="FFC000"/>
+                          </a:solidFill>
+                        </a:rPr>
+                        <a:t>d.mmm</a:t>
+                      </a:r>
+                      <a:endParaRPr lang="en-US" i="1" baseline="0" dirty="0">
+                        <a:solidFill>
+                          <a:srgbClr val="FFC000"/>
+                        </a:solidFill>
+                      </a:endParaRPr>
+                    </a:p>
+                  </a:txBody>
+                  <a:tcPr>
+                    <a:lnL w="12700" cap="flat" cmpd="sng" algn="ctr">
+                      <a:solidFill>
+                        <a:schemeClr val="bg1"/>
+                      </a:solidFill>
+                      <a:prstDash val="solid"/>
+                      <a:round/>
+                      <a:headEnd type="none" w="med" len="med"/>
+                      <a:tailEnd type="none" w="med" len="med"/>
+                    </a:lnL>
+                    <a:lnT w="38100" cap="flat" cmpd="sng" algn="ctr">
+                      <a:solidFill>
+                        <a:schemeClr val="bg1"/>
+                      </a:solidFill>
+                      <a:prstDash val="solid"/>
+                      <a:round/>
+                      <a:headEnd type="none" w="med" len="med"/>
+                      <a:tailEnd type="none" w="med" len="med"/>
+                    </a:lnT>
+                    <a:lnB w="12700" cap="flat" cmpd="sng" algn="ctr">
+                      <a:solidFill>
+                        <a:schemeClr val="bg1"/>
+                      </a:solidFill>
+                      <a:prstDash val="solid"/>
+                      <a:round/>
+                      <a:headEnd type="none" w="med" len="med"/>
+                      <a:tailEnd type="none" w="med" len="med"/>
+                    </a:lnB>
+                  </a:tcPr>
+                </a:tc>
+                <a:extLst>
+                  <a:ext uri="{0D108BD9-81ED-4DB2-BD59-A6C34878D82A}">
+                    <a16:rowId xmlns:a16="http://schemas.microsoft.com/office/drawing/2014/main" val="3167940327"/>
+                  </a:ext>
+                </a:extLst>
+              </a:tr>
+              <a:tr h="370840">
+                <a:tc>
+                  <a:txBody>
+                    <a:bodyPr/>
+                    <a:lstStyle/>
+                    <a:p>
+                      <a:pPr marL="0" marR="0" lvl="0" indent="0" algn="r" defTabSz="914400" rtl="0" eaLnBrk="1" fontAlgn="auto" latinLnBrk="0" hangingPunct="1">
+                        <a:lnSpc>
+                          <a:spcPct val="100000"/>
+                        </a:lnSpc>
+                        <a:spcBef>
+                          <a:spcPts val="0"/>
+                        </a:spcBef>
+                        <a:spcAft>
+                          <a:spcPts val="0"/>
+                        </a:spcAft>
+                        <a:buClrTx/>
+                        <a:buSzTx/>
+                        <a:buFontTx/>
+                        <a:buNone/>
+                        <a:tabLst/>
+                        <a:defRPr/>
+                      </a:pPr>
+                      <a:r>
+                        <a:rPr lang="en-US" sz="1400" i="1" kern="1200" baseline="0" dirty="0">
+                          <a:solidFill>
+                            <a:schemeClr val="bg1"/>
+                          </a:solidFill>
+                          <a:latin typeface="+mj-lt"/>
+                          <a:ea typeface="+mn-ea"/>
+                          <a:cs typeface="+mn-cs"/>
+                        </a:rPr>
+                        <a:t>Part Name</a:t>
+                      </a:r>
+                    </a:p>
+                  </a:txBody>
+                  <a:tcPr>
+                    <a:lnR w="12700" cap="flat" cmpd="sng" algn="ctr">
+                      <a:solidFill>
+                        <a:schemeClr val="bg1"/>
+                      </a:solidFill>
+                      <a:prstDash val="solid"/>
+                      <a:round/>
+                      <a:headEnd type="none" w="med" len="med"/>
+                      <a:tailEnd type="none" w="med" len="med"/>
+                    </a:lnR>
+                    <a:lnT w="12700" cap="flat" cmpd="sng" algn="ctr">
+                      <a:solidFill>
+                        <a:schemeClr val="bg1"/>
+                      </a:solidFill>
+                      <a:prstDash val="solid"/>
+                      <a:round/>
+                      <a:headEnd type="none" w="med" len="med"/>
+                      <a:tailEnd type="none" w="med" len="med"/>
+                    </a:lnT>
+                    <a:lnB w="12700" cap="flat" cmpd="sng" algn="ctr">
+                      <a:solidFill>
+                        <a:schemeClr val="bg1"/>
+                      </a:solidFill>
+                      <a:prstDash val="solid"/>
+                      <a:round/>
+                      <a:headEnd type="none" w="med" len="med"/>
+                      <a:tailEnd type="none" w="med" len="med"/>
+                    </a:lnB>
+                  </a:tcPr>
+                </a:tc>
+                <a:tc>
+                  <a:txBody>
+                    <a:bodyPr/>
+                    <a:lstStyle/>
+                    <a:p>
+                      <a:pPr marL="0" marR="0" lvl="0" indent="0" algn="l" defTabSz="914400" rtl="0" eaLnBrk="1" fontAlgn="auto" latinLnBrk="0" hangingPunct="1">
+                        <a:lnSpc>
+                          <a:spcPct val="100000"/>
+                        </a:lnSpc>
+                        <a:spcBef>
+                          <a:spcPts val="0"/>
+                        </a:spcBef>
+                        <a:spcAft>
+                          <a:spcPts val="0"/>
+                        </a:spcAft>
+                        <a:buClrTx/>
+                        <a:buSzTx/>
+                        <a:buFontTx/>
+                        <a:buNone/>
+                        <a:tabLst/>
+                        <a:defRPr/>
+                      </a:pPr>
+                      <a:r>
+                        <a:rPr lang="en-US" baseline="0" dirty="0">
+                          <a:solidFill>
+                            <a:srgbClr val="00FF00"/>
+                          </a:solidFill>
+                        </a:rPr>
+                        <a:t>Significand</a:t>
+                      </a:r>
+                      <a:r>
+                        <a:rPr lang="en-US" baseline="0" dirty="0">
+                          <a:solidFill>
+                            <a:schemeClr val="bg1"/>
+                          </a:solidFill>
+                        </a:rPr>
+                        <a:t> (preferred), </a:t>
+                      </a:r>
+                      <a:r>
+                        <a:rPr lang="en-US" baseline="0" dirty="0">
+                          <a:solidFill>
+                            <a:srgbClr val="00FF00"/>
+                          </a:solidFill>
+                        </a:rPr>
+                        <a:t>Coefficient</a:t>
+                      </a:r>
+                      <a:r>
+                        <a:rPr lang="en-US" baseline="0" dirty="0">
+                          <a:solidFill>
+                            <a:schemeClr val="bg1"/>
+                          </a:solidFill>
+                        </a:rPr>
+                        <a:t>,</a:t>
+                      </a:r>
+                      <a:br>
+                        <a:rPr lang="en-US" baseline="0" dirty="0">
+                          <a:solidFill>
+                            <a:schemeClr val="bg1"/>
+                          </a:solidFill>
+                        </a:rPr>
+                      </a:br>
+                      <a:r>
+                        <a:rPr lang="en-US" baseline="0" dirty="0">
+                          <a:solidFill>
+                            <a:schemeClr val="bg1"/>
+                          </a:solidFill>
+                        </a:rPr>
+                        <a:t>(</a:t>
+                      </a:r>
+                      <a:r>
+                        <a:rPr lang="en-US" baseline="0" dirty="0">
+                          <a:solidFill>
+                            <a:srgbClr val="00FF00"/>
+                          </a:solidFill>
+                        </a:rPr>
+                        <a:t>Mantissa</a:t>
+                      </a:r>
+                      <a:r>
+                        <a:rPr lang="en-US" baseline="0" dirty="0">
+                          <a:solidFill>
+                            <a:schemeClr val="bg1"/>
+                          </a:solidFill>
+                        </a:rPr>
+                        <a:t> is obsolete term)</a:t>
+                      </a:r>
+                    </a:p>
+                  </a:txBody>
+                  <a:tcPr>
+                    <a:lnL w="12700" cap="flat" cmpd="sng" algn="ctr">
+                      <a:solidFill>
+                        <a:schemeClr val="bg1"/>
+                      </a:solidFill>
+                      <a:prstDash val="solid"/>
+                      <a:round/>
+                      <a:headEnd type="none" w="med" len="med"/>
+                      <a:tailEnd type="none" w="med" len="med"/>
+                    </a:lnL>
+                    <a:lnT w="12700" cap="flat" cmpd="sng" algn="ctr">
+                      <a:solidFill>
+                        <a:schemeClr val="bg1"/>
+                      </a:solidFill>
+                      <a:prstDash val="solid"/>
+                      <a:round/>
+                      <a:headEnd type="none" w="med" len="med"/>
+                      <a:tailEnd type="none" w="med" len="med"/>
+                    </a:lnT>
+                    <a:lnB w="12700" cap="flat" cmpd="sng" algn="ctr">
+                      <a:solidFill>
+                        <a:schemeClr val="bg1"/>
+                      </a:solidFill>
+                      <a:prstDash val="solid"/>
+                      <a:round/>
+                      <a:headEnd type="none" w="med" len="med"/>
+                      <a:tailEnd type="none" w="med" len="med"/>
+                    </a:lnB>
+                  </a:tcPr>
+                </a:tc>
+                <a:extLst>
+                  <a:ext uri="{0D108BD9-81ED-4DB2-BD59-A6C34878D82A}">
+                    <a16:rowId xmlns:a16="http://schemas.microsoft.com/office/drawing/2014/main" val="365307444"/>
+                  </a:ext>
+                </a:extLst>
+              </a:tr>
+              <a:tr h="370840">
+                <a:tc>
+                  <a:txBody>
+                    <a:bodyPr/>
+                    <a:lstStyle/>
+                    <a:p>
+                      <a:pPr marL="0" marR="0" lvl="0" indent="0" algn="r" defTabSz="914400" rtl="0" eaLnBrk="1" fontAlgn="auto" latinLnBrk="0" hangingPunct="1">
+                        <a:lnSpc>
+                          <a:spcPct val="100000"/>
+                        </a:lnSpc>
+                        <a:spcBef>
+                          <a:spcPts val="0"/>
+                        </a:spcBef>
+                        <a:spcAft>
+                          <a:spcPts val="0"/>
+                        </a:spcAft>
+                        <a:buClrTx/>
+                        <a:buSzTx/>
+                        <a:buFontTx/>
+                        <a:buNone/>
+                        <a:tabLst/>
+                        <a:defRPr/>
+                      </a:pPr>
+                      <a:r>
+                        <a:rPr lang="en-US" sz="1400" i="1" kern="1200" baseline="0" dirty="0">
+                          <a:solidFill>
+                            <a:schemeClr val="bg1"/>
+                          </a:solidFill>
+                          <a:latin typeface="+mj-lt"/>
+                          <a:ea typeface="+mn-ea"/>
+                          <a:cs typeface="+mn-cs"/>
+                        </a:rPr>
+                        <a:t>Part Property</a:t>
+                      </a:r>
+                    </a:p>
+                  </a:txBody>
+                  <a:tcPr>
+                    <a:lnR w="12700" cap="flat" cmpd="sng" algn="ctr">
+                      <a:solidFill>
+                        <a:schemeClr val="bg1"/>
+                      </a:solidFill>
+                      <a:prstDash val="solid"/>
+                      <a:round/>
+                      <a:headEnd type="none" w="med" len="med"/>
+                      <a:tailEnd type="none" w="med" len="med"/>
+                    </a:lnR>
+                    <a:lnT w="12700" cap="flat" cmpd="sng" algn="ctr">
+                      <a:solidFill>
+                        <a:schemeClr val="bg1"/>
+                      </a:solidFill>
+                      <a:prstDash val="solid"/>
+                      <a:round/>
+                      <a:headEnd type="none" w="med" len="med"/>
+                      <a:tailEnd type="none" w="med" len="med"/>
+                    </a:lnT>
+                    <a:lnB w="12700" cap="flat" cmpd="sng" algn="ctr">
+                      <a:solidFill>
+                        <a:schemeClr val="bg1"/>
+                      </a:solidFill>
+                      <a:prstDash val="solid"/>
+                      <a:round/>
+                      <a:headEnd type="none" w="med" len="med"/>
+                      <a:tailEnd type="none" w="med" len="med"/>
+                    </a:lnB>
+                  </a:tcPr>
+                </a:tc>
+                <a:tc>
+                  <a:txBody>
+                    <a:bodyPr/>
+                    <a:lstStyle/>
+                    <a:p>
+                      <a:r>
+                        <a:rPr lang="en-US" baseline="0" dirty="0">
+                          <a:solidFill>
+                            <a:schemeClr val="bg1"/>
+                          </a:solidFill>
+                        </a:rPr>
+                        <a:t>Number greater than or equal to 1.0 and less than 10. This number properly express significant digits</a:t>
+                      </a:r>
+                    </a:p>
+                  </a:txBody>
+                  <a:tcPr>
+                    <a:lnL w="12700" cap="flat" cmpd="sng" algn="ctr">
+                      <a:solidFill>
+                        <a:schemeClr val="bg1"/>
+                      </a:solidFill>
+                      <a:prstDash val="solid"/>
+                      <a:round/>
+                      <a:headEnd type="none" w="med" len="med"/>
+                      <a:tailEnd type="none" w="med" len="med"/>
+                    </a:lnL>
+                    <a:lnT w="12700" cap="flat" cmpd="sng" algn="ctr">
+                      <a:solidFill>
+                        <a:schemeClr val="bg1"/>
+                      </a:solidFill>
+                      <a:prstDash val="solid"/>
+                      <a:round/>
+                      <a:headEnd type="none" w="med" len="med"/>
+                      <a:tailEnd type="none" w="med" len="med"/>
+                    </a:lnT>
+                    <a:lnB w="12700" cap="flat" cmpd="sng" algn="ctr">
+                      <a:solidFill>
+                        <a:schemeClr val="bg1"/>
+                      </a:solidFill>
+                      <a:prstDash val="solid"/>
+                      <a:round/>
+                      <a:headEnd type="none" w="med" len="med"/>
+                      <a:tailEnd type="none" w="med" len="med"/>
+                    </a:lnB>
+                  </a:tcPr>
+                </a:tc>
+                <a:extLst>
+                  <a:ext uri="{0D108BD9-81ED-4DB2-BD59-A6C34878D82A}">
+                    <a16:rowId xmlns:a16="http://schemas.microsoft.com/office/drawing/2014/main" val="2630359962"/>
+                  </a:ext>
+                </a:extLst>
+              </a:tr>
+              <a:tr h="370840">
+                <a:tc>
+                  <a:txBody>
+                    <a:bodyPr/>
+                    <a:lstStyle/>
+                    <a:p>
+                      <a:pPr algn="r"/>
+                      <a:endParaRPr lang="en-US" sz="1400" i="1" baseline="0" dirty="0">
+                        <a:solidFill>
+                          <a:schemeClr val="bg1"/>
+                        </a:solidFill>
+                        <a:highlight>
+                          <a:srgbClr val="CCFFFF"/>
+                        </a:highlight>
+                        <a:latin typeface="+mj-lt"/>
+                      </a:endParaRPr>
+                    </a:p>
+                  </a:txBody>
+                  <a:tcPr>
+                    <a:lnR w="12700" cap="flat" cmpd="sng" algn="ctr">
+                      <a:solidFill>
+                        <a:schemeClr val="bg1"/>
+                      </a:solidFill>
+                      <a:prstDash val="solid"/>
+                      <a:round/>
+                      <a:headEnd type="none" w="med" len="med"/>
+                      <a:tailEnd type="none" w="med" len="med"/>
+                    </a:lnR>
+                    <a:lnT w="12700" cap="flat" cmpd="sng" algn="ctr">
+                      <a:solidFill>
+                        <a:schemeClr val="bg1"/>
+                      </a:solidFill>
+                      <a:prstDash val="solid"/>
+                      <a:round/>
+                      <a:headEnd type="none" w="med" len="med"/>
+                      <a:tailEnd type="none" w="med" len="med"/>
+                    </a:lnT>
+                    <a:lnB w="12700" cap="flat" cmpd="sng" algn="ctr">
+                      <a:solidFill>
+                        <a:schemeClr val="bg1"/>
+                      </a:solidFill>
+                      <a:prstDash val="solid"/>
+                      <a:round/>
+                      <a:headEnd type="none" w="med" len="med"/>
+                      <a:tailEnd type="none" w="med" len="med"/>
+                    </a:lnB>
+                    <a:solidFill>
+                      <a:schemeClr val="tx1">
+                        <a:lumMod val="65000"/>
+                        <a:lumOff val="35000"/>
+                      </a:schemeClr>
+                    </a:solidFill>
+                  </a:tcPr>
+                </a:tc>
+                <a:tc>
+                  <a:txBody>
+                    <a:bodyPr/>
+                    <a:lstStyle/>
+                    <a:p>
+                      <a:endParaRPr lang="en-US" baseline="0" dirty="0">
+                        <a:solidFill>
+                          <a:schemeClr val="bg1"/>
+                        </a:solidFill>
+                        <a:highlight>
+                          <a:srgbClr val="CCFFFF"/>
+                        </a:highlight>
+                      </a:endParaRPr>
+                    </a:p>
+                  </a:txBody>
+                  <a:tcPr>
+                    <a:lnL w="12700" cap="flat" cmpd="sng" algn="ctr">
+                      <a:solidFill>
+                        <a:schemeClr val="bg1"/>
+                      </a:solidFill>
+                      <a:prstDash val="solid"/>
+                      <a:round/>
+                      <a:headEnd type="none" w="med" len="med"/>
+                      <a:tailEnd type="none" w="med" len="med"/>
+                    </a:lnL>
+                    <a:lnT w="12700" cap="flat" cmpd="sng" algn="ctr">
+                      <a:solidFill>
+                        <a:schemeClr val="bg1"/>
+                      </a:solidFill>
+                      <a:prstDash val="solid"/>
+                      <a:round/>
+                      <a:headEnd type="none" w="med" len="med"/>
+                      <a:tailEnd type="none" w="med" len="med"/>
+                    </a:lnT>
+                    <a:lnB w="12700" cap="flat" cmpd="sng" algn="ctr">
+                      <a:solidFill>
+                        <a:schemeClr val="bg1"/>
+                      </a:solidFill>
+                      <a:prstDash val="solid"/>
+                      <a:round/>
+                      <a:headEnd type="none" w="med" len="med"/>
+                      <a:tailEnd type="none" w="med" len="med"/>
+                    </a:lnB>
+                    <a:solidFill>
+                      <a:schemeClr val="tx1">
+                        <a:lumMod val="65000"/>
+                        <a:lumOff val="35000"/>
+                      </a:schemeClr>
+                    </a:solidFill>
+                  </a:tcPr>
+                </a:tc>
+                <a:extLst>
+                  <a:ext uri="{0D108BD9-81ED-4DB2-BD59-A6C34878D82A}">
+                    <a16:rowId xmlns:a16="http://schemas.microsoft.com/office/drawing/2014/main" val="3176547581"/>
+                  </a:ext>
+                </a:extLst>
+              </a:tr>
+              <a:tr h="370840">
+                <a:tc>
+                  <a:txBody>
+                    <a:bodyPr/>
+                    <a:lstStyle/>
+                    <a:p>
+                      <a:pPr algn="r"/>
+                      <a:r>
+                        <a:rPr lang="en-US" sz="1400" i="1" kern="1200" dirty="0">
+                          <a:solidFill>
+                            <a:schemeClr val="bg1"/>
+                          </a:solidFill>
+                          <a:latin typeface="+mj-lt"/>
+                          <a:ea typeface="+mn-ea"/>
+                          <a:cs typeface="+mn-cs"/>
+                        </a:rPr>
+                        <a:t>Part</a:t>
+                      </a:r>
+                      <a:endParaRPr lang="en-US" sz="1400" i="1" baseline="0" dirty="0">
+                        <a:solidFill>
+                          <a:schemeClr val="bg1"/>
+                        </a:solidFill>
+                        <a:latin typeface="+mj-lt"/>
+                      </a:endParaRPr>
+                    </a:p>
+                  </a:txBody>
+                  <a:tcPr>
+                    <a:lnR w="12700" cap="flat" cmpd="sng" algn="ctr">
+                      <a:solidFill>
+                        <a:schemeClr val="bg1"/>
+                      </a:solidFill>
+                      <a:prstDash val="solid"/>
+                      <a:round/>
+                      <a:headEnd type="none" w="med" len="med"/>
+                      <a:tailEnd type="none" w="med" len="med"/>
+                    </a:lnR>
+                    <a:lnT w="12700" cap="flat" cmpd="sng" algn="ctr">
+                      <a:solidFill>
+                        <a:schemeClr val="bg1"/>
+                      </a:solidFill>
+                      <a:prstDash val="solid"/>
+                      <a:round/>
+                      <a:headEnd type="none" w="med" len="med"/>
+                      <a:tailEnd type="none" w="med" len="med"/>
+                    </a:lnT>
+                    <a:lnB w="12700" cap="flat" cmpd="sng" algn="ctr">
+                      <a:solidFill>
+                        <a:schemeClr val="bg1"/>
+                      </a:solidFill>
+                      <a:prstDash val="solid"/>
+                      <a:round/>
+                      <a:headEnd type="none" w="med" len="med"/>
+                      <a:tailEnd type="none" w="med" len="med"/>
+                    </a:lnB>
+                  </a:tcPr>
+                </a:tc>
+                <a:tc>
+                  <a:txBody>
+                    <a:bodyPr/>
+                    <a:lstStyle/>
+                    <a:p>
+                      <a:pPr marL="0" marR="0" lvl="0" indent="0" algn="l" defTabSz="914400" rtl="0" eaLnBrk="1" fontAlgn="auto" latinLnBrk="0" hangingPunct="1">
+                        <a:lnSpc>
+                          <a:spcPct val="100000"/>
+                        </a:lnSpc>
+                        <a:spcBef>
+                          <a:spcPts val="0"/>
+                        </a:spcBef>
+                        <a:spcAft>
+                          <a:spcPts val="0"/>
+                        </a:spcAft>
+                        <a:buClrTx/>
+                        <a:buSzTx/>
+                        <a:buFontTx/>
+                        <a:buNone/>
+                        <a:tabLst/>
+                        <a:defRPr/>
+                      </a:pPr>
+                      <a:r>
+                        <a:rPr lang="en-US" dirty="0">
+                          <a:solidFill>
+                            <a:schemeClr val="accent1">
+                              <a:lumMod val="60000"/>
+                              <a:lumOff val="40000"/>
+                            </a:schemeClr>
+                          </a:solidFill>
+                        </a:rPr>
+                        <a:t>10</a:t>
+                      </a:r>
+                      <a:r>
+                        <a:rPr lang="en-US" i="1" baseline="30000" dirty="0">
+                          <a:solidFill>
+                            <a:schemeClr val="accent1">
+                              <a:lumMod val="60000"/>
+                              <a:lumOff val="40000"/>
+                            </a:schemeClr>
+                          </a:solidFill>
+                        </a:rPr>
+                        <a:t>n</a:t>
+                      </a:r>
+                      <a:endParaRPr lang="en-US" baseline="0" dirty="0">
+                        <a:solidFill>
+                          <a:schemeClr val="accent1">
+                            <a:lumMod val="60000"/>
+                            <a:lumOff val="40000"/>
+                          </a:schemeClr>
+                        </a:solidFill>
+                      </a:endParaRPr>
+                    </a:p>
+                  </a:txBody>
+                  <a:tcPr>
+                    <a:lnL w="12700" cap="flat" cmpd="sng" algn="ctr">
+                      <a:solidFill>
+                        <a:schemeClr val="bg1"/>
+                      </a:solidFill>
+                      <a:prstDash val="solid"/>
+                      <a:round/>
+                      <a:headEnd type="none" w="med" len="med"/>
+                      <a:tailEnd type="none" w="med" len="med"/>
+                    </a:lnL>
+                    <a:lnT w="12700" cap="flat" cmpd="sng" algn="ctr">
+                      <a:solidFill>
+                        <a:schemeClr val="bg1"/>
+                      </a:solidFill>
+                      <a:prstDash val="solid"/>
+                      <a:round/>
+                      <a:headEnd type="none" w="med" len="med"/>
+                      <a:tailEnd type="none" w="med" len="med"/>
+                    </a:lnT>
+                    <a:lnB w="12700" cap="flat" cmpd="sng" algn="ctr">
+                      <a:solidFill>
+                        <a:schemeClr val="bg1"/>
+                      </a:solidFill>
+                      <a:prstDash val="solid"/>
+                      <a:round/>
+                      <a:headEnd type="none" w="med" len="med"/>
+                      <a:tailEnd type="none" w="med" len="med"/>
+                    </a:lnB>
+                  </a:tcPr>
+                </a:tc>
+                <a:extLst>
+                  <a:ext uri="{0D108BD9-81ED-4DB2-BD59-A6C34878D82A}">
+                    <a16:rowId xmlns:a16="http://schemas.microsoft.com/office/drawing/2014/main" val="4069714395"/>
+                  </a:ext>
+                </a:extLst>
+              </a:tr>
+              <a:tr h="370840">
+                <a:tc>
+                  <a:txBody>
+                    <a:bodyPr/>
+                    <a:lstStyle/>
+                    <a:p>
+                      <a:pPr algn="r"/>
+                      <a:r>
+                        <a:rPr lang="en-US" sz="1400" i="1" baseline="0" dirty="0">
+                          <a:solidFill>
+                            <a:schemeClr val="bg1"/>
+                          </a:solidFill>
+                          <a:latin typeface="+mj-lt"/>
+                        </a:rPr>
+                        <a:t>Part Name</a:t>
+                      </a:r>
+                    </a:p>
+                  </a:txBody>
+                  <a:tcPr>
+                    <a:lnR w="12700" cap="flat" cmpd="sng" algn="ctr">
+                      <a:solidFill>
+                        <a:schemeClr val="bg1"/>
+                      </a:solidFill>
+                      <a:prstDash val="solid"/>
+                      <a:round/>
+                      <a:headEnd type="none" w="med" len="med"/>
+                      <a:tailEnd type="none" w="med" len="med"/>
+                    </a:lnR>
+                    <a:lnT w="12700" cap="flat" cmpd="sng" algn="ctr">
+                      <a:solidFill>
+                        <a:schemeClr val="bg1"/>
+                      </a:solidFill>
+                      <a:prstDash val="solid"/>
+                      <a:round/>
+                      <a:headEnd type="none" w="med" len="med"/>
+                      <a:tailEnd type="none" w="med" len="med"/>
+                    </a:lnT>
+                    <a:lnB w="12700" cap="flat" cmpd="sng" algn="ctr">
+                      <a:solidFill>
+                        <a:schemeClr val="bg1"/>
+                      </a:solidFill>
+                      <a:prstDash val="solid"/>
+                      <a:round/>
+                      <a:headEnd type="none" w="med" len="med"/>
+                      <a:tailEnd type="none" w="med" len="med"/>
+                    </a:lnB>
+                  </a:tcPr>
+                </a:tc>
+                <a:tc>
+                  <a:txBody>
+                    <a:bodyPr/>
+                    <a:lstStyle/>
+                    <a:p>
+                      <a:r>
+                        <a:rPr lang="en-US" baseline="0" dirty="0">
+                          <a:solidFill>
+                            <a:srgbClr val="00FF00"/>
+                          </a:solidFill>
+                        </a:rPr>
+                        <a:t>Exponent</a:t>
+                      </a:r>
+                    </a:p>
+                  </a:txBody>
+                  <a:tcPr>
+                    <a:lnL w="12700" cap="flat" cmpd="sng" algn="ctr">
+                      <a:solidFill>
+                        <a:schemeClr val="bg1"/>
+                      </a:solidFill>
+                      <a:prstDash val="solid"/>
+                      <a:round/>
+                      <a:headEnd type="none" w="med" len="med"/>
+                      <a:tailEnd type="none" w="med" len="med"/>
+                    </a:lnL>
+                    <a:lnT w="12700" cap="flat" cmpd="sng" algn="ctr">
+                      <a:solidFill>
+                        <a:schemeClr val="bg1"/>
+                      </a:solidFill>
+                      <a:prstDash val="solid"/>
+                      <a:round/>
+                      <a:headEnd type="none" w="med" len="med"/>
+                      <a:tailEnd type="none" w="med" len="med"/>
+                    </a:lnT>
+                    <a:lnB w="12700" cap="flat" cmpd="sng" algn="ctr">
+                      <a:solidFill>
+                        <a:schemeClr val="bg1"/>
+                      </a:solidFill>
+                      <a:prstDash val="solid"/>
+                      <a:round/>
+                      <a:headEnd type="none" w="med" len="med"/>
+                      <a:tailEnd type="none" w="med" len="med"/>
+                    </a:lnB>
+                  </a:tcPr>
+                </a:tc>
+                <a:extLst>
+                  <a:ext uri="{0D108BD9-81ED-4DB2-BD59-A6C34878D82A}">
+                    <a16:rowId xmlns:a16="http://schemas.microsoft.com/office/drawing/2014/main" val="56812982"/>
+                  </a:ext>
+                </a:extLst>
+              </a:tr>
+              <a:tr h="370840">
+                <a:tc>
+                  <a:txBody>
+                    <a:bodyPr/>
+                    <a:lstStyle/>
+                    <a:p>
+                      <a:pPr algn="r"/>
+                      <a:r>
+                        <a:rPr lang="en-US" sz="1400" i="1" baseline="0" dirty="0">
+                          <a:solidFill>
+                            <a:schemeClr val="bg1"/>
+                          </a:solidFill>
+                          <a:latin typeface="+mj-lt"/>
+                        </a:rPr>
+                        <a:t>Part Property</a:t>
+                      </a:r>
+                    </a:p>
+                  </a:txBody>
+                  <a:tcPr>
+                    <a:lnR w="12700" cap="flat" cmpd="sng" algn="ctr">
+                      <a:solidFill>
+                        <a:schemeClr val="bg1"/>
+                      </a:solidFill>
+                      <a:prstDash val="solid"/>
+                      <a:round/>
+                      <a:headEnd type="none" w="med" len="med"/>
+                      <a:tailEnd type="none" w="med" len="med"/>
+                    </a:lnR>
+                    <a:lnT w="12700" cap="flat" cmpd="sng" algn="ctr">
+                      <a:solidFill>
+                        <a:schemeClr val="bg1"/>
+                      </a:solidFill>
+                      <a:prstDash val="solid"/>
+                      <a:round/>
+                      <a:headEnd type="none" w="med" len="med"/>
+                      <a:tailEnd type="none" w="med" len="med"/>
+                    </a:lnT>
+                    <a:lnB w="12700" cap="flat" cmpd="sng" algn="ctr">
+                      <a:solidFill>
+                        <a:schemeClr val="bg1"/>
+                      </a:solidFill>
+                      <a:prstDash val="solid"/>
+                      <a:round/>
+                      <a:headEnd type="none" w="med" len="med"/>
+                      <a:tailEnd type="none" w="med" len="med"/>
+                    </a:lnB>
+                  </a:tcPr>
+                </a:tc>
+                <a:tc>
+                  <a:txBody>
+                    <a:bodyPr/>
+                    <a:lstStyle/>
+                    <a:p>
+                      <a:r>
+                        <a:rPr lang="en-US" baseline="0" dirty="0">
+                          <a:solidFill>
+                            <a:schemeClr val="bg1"/>
+                          </a:solidFill>
+                        </a:rPr>
+                        <a:t>Exponent of 10 where </a:t>
+                      </a:r>
+                      <a:r>
+                        <a:rPr lang="en-US" b="1" i="1" baseline="0" dirty="0">
+                          <a:solidFill>
+                            <a:schemeClr val="bg1"/>
+                          </a:solidFill>
+                        </a:rPr>
+                        <a:t>n</a:t>
+                      </a:r>
+                      <a:r>
+                        <a:rPr lang="en-US" baseline="0" dirty="0">
+                          <a:solidFill>
+                            <a:schemeClr val="bg1"/>
+                          </a:solidFill>
+                        </a:rPr>
+                        <a:t> is integer, negative, positive (note 10</a:t>
+                      </a:r>
+                      <a:r>
+                        <a:rPr lang="en-US" baseline="30000" dirty="0">
+                          <a:solidFill>
+                            <a:schemeClr val="bg1"/>
+                          </a:solidFill>
+                        </a:rPr>
+                        <a:t>0 </a:t>
+                      </a:r>
+                      <a:r>
+                        <a:rPr lang="en-US" baseline="0" dirty="0">
+                          <a:solidFill>
+                            <a:schemeClr val="bg1"/>
+                          </a:solidFill>
+                        </a:rPr>
+                        <a:t>= 1)</a:t>
+                      </a:r>
+                    </a:p>
+                  </a:txBody>
+                  <a:tcPr>
+                    <a:lnL w="12700" cap="flat" cmpd="sng" algn="ctr">
+                      <a:solidFill>
+                        <a:schemeClr val="bg1"/>
+                      </a:solidFill>
+                      <a:prstDash val="solid"/>
+                      <a:round/>
+                      <a:headEnd type="none" w="med" len="med"/>
+                      <a:tailEnd type="none" w="med" len="med"/>
+                    </a:lnL>
+                    <a:lnT w="12700" cap="flat" cmpd="sng" algn="ctr">
+                      <a:solidFill>
+                        <a:schemeClr val="bg1"/>
+                      </a:solidFill>
+                      <a:prstDash val="solid"/>
+                      <a:round/>
+                      <a:headEnd type="none" w="med" len="med"/>
+                      <a:tailEnd type="none" w="med" len="med"/>
+                    </a:lnT>
+                    <a:lnB w="12700" cap="flat" cmpd="sng" algn="ctr">
+                      <a:solidFill>
+                        <a:schemeClr val="bg1"/>
+                      </a:solidFill>
+                      <a:prstDash val="solid"/>
+                      <a:round/>
+                      <a:headEnd type="none" w="med" len="med"/>
+                      <a:tailEnd type="none" w="med" len="med"/>
+                    </a:lnB>
+                  </a:tcPr>
+                </a:tc>
+                <a:extLst>
+                  <a:ext uri="{0D108BD9-81ED-4DB2-BD59-A6C34878D82A}">
+                    <a16:rowId xmlns:a16="http://schemas.microsoft.com/office/drawing/2014/main" val="2089654392"/>
+                  </a:ext>
+                </a:extLst>
+              </a:tr>
+            </a:tbl>
+          </a:graphicData>
+        </a:graphic>
+      </p:graphicFrame>
+    </p:spTree>
+    <p:extLst>
+      <p:ext uri="{BB962C8B-B14F-4D97-AF65-F5344CB8AC3E}">
+        <p14:creationId xmlns:p14="http://schemas.microsoft.com/office/powerpoint/2010/main" val="2250512596"/>
+      </p:ext>
+    </p:extLst>
+  </p:cSld>
+  <p:clrMapOvr>
+    <a:masterClrMapping/>
+  </p:clrMapOvr>
+</p:sld>
+</file>
+
+<file path=ppt/slides/slide40.xml><?xml version="1.0" encoding="utf-8"?>
 <p:sld xmlns:a="http://schemas.openxmlformats.org/drawingml/2006/main" xmlns:r="http://schemas.openxmlformats.org/officeDocument/2006/relationships" xmlns:p="http://schemas.openxmlformats.org/presentationml/2006/main">
   <p:cSld>
     <p:spTree>
@@ -36919,1148 +38202,7 @@
 </p:sld>
 </file>
 
-<file path=ppt/slides/slide4.xml><?xml version="1.0" encoding="utf-8"?>
-<p:sld xmlns:a="http://schemas.openxmlformats.org/drawingml/2006/main" xmlns:r="http://schemas.openxmlformats.org/officeDocument/2006/relationships" xmlns:p="http://schemas.openxmlformats.org/presentationml/2006/main">
-  <p:cSld>
-    <p:spTree>
-      <p:nvGrpSpPr>
-        <p:cNvPr id="1" name="">
-          <a:extLst>
-            <a:ext uri="{FF2B5EF4-FFF2-40B4-BE49-F238E27FC236}">
-              <a16:creationId xmlns:a16="http://schemas.microsoft.com/office/drawing/2014/main" id="{77205898-47DB-81B7-F63B-65FCBBEA12CF}"/>
-            </a:ext>
-          </a:extLst>
-        </p:cNvPr>
-        <p:cNvGrpSpPr/>
-        <p:nvPr/>
-      </p:nvGrpSpPr>
-      <p:grpSpPr>
-        <a:xfrm>
-          <a:off x="0" y="0"/>
-          <a:ext cx="0" cy="0"/>
-          <a:chOff x="0" y="0"/>
-          <a:chExt cx="0" cy="0"/>
-        </a:xfrm>
-      </p:grpSpPr>
-      <p:sp>
-        <p:nvSpPr>
-          <p:cNvPr id="4" name="Title 3">
-            <a:extLst>
-              <a:ext uri="{FF2B5EF4-FFF2-40B4-BE49-F238E27FC236}">
-                <a16:creationId xmlns:a16="http://schemas.microsoft.com/office/drawing/2014/main" id="{D7E8F352-CE19-BD16-D0FA-ED2971FDDA4B}"/>
-              </a:ext>
-            </a:extLst>
-          </p:cNvPr>
-          <p:cNvSpPr>
-            <a:spLocks noGrp="1"/>
-          </p:cNvSpPr>
-          <p:nvPr>
-            <p:ph type="title"/>
-          </p:nvPr>
-        </p:nvSpPr>
-        <p:spPr>
-          <a:xfrm>
-            <a:off x="364067" y="306073"/>
-            <a:ext cx="8421512" cy="707886"/>
-          </a:xfrm>
-        </p:spPr>
-        <p:txBody>
-          <a:bodyPr/>
-          <a:lstStyle/>
-          <a:p>
-            <a:r>
-              <a:rPr lang="en-US" sz="4000" dirty="0"/>
-              <a:t>Scientific Notation</a:t>
-            </a:r>
-          </a:p>
-        </p:txBody>
-      </p:sp>
-      <p:sp>
-        <p:nvSpPr>
-          <p:cNvPr id="6" name="Content Placeholder 5">
-            <a:extLst>
-              <a:ext uri="{FF2B5EF4-FFF2-40B4-BE49-F238E27FC236}">
-                <a16:creationId xmlns:a16="http://schemas.microsoft.com/office/drawing/2014/main" id="{452EC8EF-100A-C97D-FC60-0F9A0B8B0A80}"/>
-              </a:ext>
-            </a:extLst>
-          </p:cNvPr>
-          <p:cNvSpPr>
-            <a:spLocks noGrp="1"/>
-          </p:cNvSpPr>
-          <p:nvPr>
-            <p:ph idx="1"/>
-          </p:nvPr>
-        </p:nvSpPr>
-        <p:spPr/>
-        <p:txBody>
-          <a:bodyPr/>
-          <a:lstStyle/>
-          <a:p>
-            <a:pPr marL="0" indent="0">
-              <a:buNone/>
-            </a:pPr>
-            <a:r>
-              <a:rPr lang="en-US" dirty="0"/>
-              <a:t>A way of expressing numerical values</a:t>
-            </a:r>
-          </a:p>
-          <a:p>
-            <a:pPr marL="0" indent="0">
-              <a:buNone/>
-            </a:pPr>
-            <a:endParaRPr lang="en-US" sz="1200" dirty="0"/>
-          </a:p>
-          <a:p>
-            <a:pPr marL="0" indent="0">
-              <a:buNone/>
-            </a:pPr>
-            <a:r>
-              <a:rPr lang="en-US" dirty="0"/>
-              <a:t>Format:  </a:t>
-            </a:r>
-            <a:r>
-              <a:rPr lang="en-US" i="1" dirty="0" err="1">
-                <a:solidFill>
-                  <a:srgbClr val="FFC000"/>
-                </a:solidFill>
-              </a:rPr>
-              <a:t>d.mmm</a:t>
-            </a:r>
-            <a:r>
-              <a:rPr lang="en-US" i="1" dirty="0">
-                <a:solidFill>
-                  <a:srgbClr val="FFC000"/>
-                </a:solidFill>
-              </a:rPr>
-              <a:t> </a:t>
-            </a:r>
-            <a:r>
-              <a:rPr lang="en-US" dirty="0"/>
-              <a:t>× </a:t>
-            </a:r>
-            <a:r>
-              <a:rPr lang="en-US" dirty="0">
-                <a:solidFill>
-                  <a:schemeClr val="accent1">
-                    <a:lumMod val="60000"/>
-                    <a:lumOff val="40000"/>
-                  </a:schemeClr>
-                </a:solidFill>
-              </a:rPr>
-              <a:t>10</a:t>
-            </a:r>
-            <a:r>
-              <a:rPr lang="en-US" baseline="30000" dirty="0">
-                <a:solidFill>
-                  <a:schemeClr val="accent1">
-                    <a:lumMod val="60000"/>
-                    <a:lumOff val="40000"/>
-                  </a:schemeClr>
-                </a:solidFill>
-              </a:rPr>
-              <a:t>n</a:t>
-            </a:r>
-            <a:endParaRPr lang="en-US" i="1" baseline="30000" dirty="0">
-              <a:solidFill>
-                <a:schemeClr val="accent1">
-                  <a:lumMod val="60000"/>
-                  <a:lumOff val="40000"/>
-                </a:schemeClr>
-              </a:solidFill>
-            </a:endParaRPr>
-          </a:p>
-          <a:p>
-            <a:pPr marL="0" indent="0">
-              <a:buNone/>
-            </a:pPr>
-            <a:endParaRPr lang="en-US" i="1" baseline="30000" dirty="0"/>
-          </a:p>
-        </p:txBody>
-      </p:sp>
-      <p:graphicFrame>
-        <p:nvGraphicFramePr>
-          <p:cNvPr id="7" name="Content Placeholder 2">
-            <a:extLst>
-              <a:ext uri="{FF2B5EF4-FFF2-40B4-BE49-F238E27FC236}">
-                <a16:creationId xmlns:a16="http://schemas.microsoft.com/office/drawing/2014/main" id="{0EDC1EB6-DB92-CFB3-343C-FFDD22B1C09E}"/>
-              </a:ext>
-            </a:extLst>
-          </p:cNvPr>
-          <p:cNvGraphicFramePr>
-            <a:graphicFrameLocks/>
-          </p:cNvGraphicFramePr>
-          <p:nvPr>
-            <p:extLst>
-              <p:ext uri="{D42A27DB-BD31-4B8C-83A1-F6EECF244321}">
-                <p14:modId xmlns:p14="http://schemas.microsoft.com/office/powerpoint/2010/main" val="1947364222"/>
-              </p:ext>
-            </p:extLst>
-          </p:nvPr>
-        </p:nvGraphicFramePr>
-        <p:xfrm>
-          <a:off x="696033" y="2667230"/>
-          <a:ext cx="7042247" cy="3677920"/>
-        </p:xfrm>
-        <a:graphic>
-          <a:graphicData uri="http://schemas.openxmlformats.org/drawingml/2006/table">
-            <a:tbl>
-              <a:tblPr firstRow="1" bandRow="1"/>
-              <a:tblGrid>
-                <a:gridCol w="2535211">
-                  <a:extLst>
-                    <a:ext uri="{9D8B030D-6E8A-4147-A177-3AD203B41FA5}">
-                      <a16:colId xmlns:a16="http://schemas.microsoft.com/office/drawing/2014/main" val="3744240669"/>
-                    </a:ext>
-                  </a:extLst>
-                </a:gridCol>
-                <a:gridCol w="4507036">
-                  <a:extLst>
-                    <a:ext uri="{9D8B030D-6E8A-4147-A177-3AD203B41FA5}">
-                      <a16:colId xmlns:a16="http://schemas.microsoft.com/office/drawing/2014/main" val="1648944909"/>
-                    </a:ext>
-                  </a:extLst>
-                </a:gridCol>
-              </a:tblGrid>
-              <a:tr h="370840">
-                <a:tc>
-                  <a:txBody>
-                    <a:bodyPr/>
-                    <a:lstStyle/>
-                    <a:p>
-                      <a:pPr algn="r"/>
-                      <a:r>
-                        <a:rPr lang="en-US" sz="1400" i="1" kern="1200" dirty="0">
-                          <a:solidFill>
-                            <a:schemeClr val="bg1"/>
-                          </a:solidFill>
-                          <a:latin typeface="+mj-lt"/>
-                          <a:ea typeface="+mn-ea"/>
-                          <a:cs typeface="+mn-cs"/>
-                        </a:rPr>
-                        <a:t>Part</a:t>
-                      </a:r>
-                      <a:endParaRPr lang="en-US" sz="1400" i="1" baseline="0" dirty="0">
-                        <a:solidFill>
-                          <a:schemeClr val="bg1"/>
-                        </a:solidFill>
-                        <a:latin typeface="+mj-lt"/>
-                      </a:endParaRPr>
-                    </a:p>
-                  </a:txBody>
-                  <a:tcPr>
-                    <a:lnR w="12700" cap="flat" cmpd="sng" algn="ctr">
-                      <a:solidFill>
-                        <a:schemeClr val="bg1"/>
-                      </a:solidFill>
-                      <a:prstDash val="solid"/>
-                      <a:round/>
-                      <a:headEnd type="none" w="med" len="med"/>
-                      <a:tailEnd type="none" w="med" len="med"/>
-                    </a:lnR>
-                    <a:lnT w="38100" cap="flat" cmpd="sng" algn="ctr">
-                      <a:solidFill>
-                        <a:schemeClr val="bg1"/>
-                      </a:solidFill>
-                      <a:prstDash val="solid"/>
-                      <a:round/>
-                      <a:headEnd type="none" w="med" len="med"/>
-                      <a:tailEnd type="none" w="med" len="med"/>
-                    </a:lnT>
-                    <a:lnB w="12700" cap="flat" cmpd="sng" algn="ctr">
-                      <a:solidFill>
-                        <a:schemeClr val="bg1"/>
-                      </a:solidFill>
-                      <a:prstDash val="solid"/>
-                      <a:round/>
-                      <a:headEnd type="none" w="med" len="med"/>
-                      <a:tailEnd type="none" w="med" len="med"/>
-                    </a:lnB>
-                  </a:tcPr>
-                </a:tc>
-                <a:tc>
-                  <a:txBody>
-                    <a:bodyPr/>
-                    <a:lstStyle/>
-                    <a:p>
-                      <a:pPr marL="0" marR="0" lvl="0" indent="0" algn="l" defTabSz="914400" rtl="0" eaLnBrk="1" fontAlgn="auto" latinLnBrk="0" hangingPunct="1">
-                        <a:lnSpc>
-                          <a:spcPct val="100000"/>
-                        </a:lnSpc>
-                        <a:spcBef>
-                          <a:spcPts val="0"/>
-                        </a:spcBef>
-                        <a:spcAft>
-                          <a:spcPts val="0"/>
-                        </a:spcAft>
-                        <a:buClrTx/>
-                        <a:buSzTx/>
-                        <a:buFontTx/>
-                        <a:buNone/>
-                        <a:tabLst/>
-                        <a:defRPr/>
-                      </a:pPr>
-                      <a:r>
-                        <a:rPr lang="en-US" i="1" baseline="0" dirty="0" err="1">
-                          <a:solidFill>
-                            <a:srgbClr val="FFC000"/>
-                          </a:solidFill>
-                        </a:rPr>
-                        <a:t>n.mmm</a:t>
-                      </a:r>
-                      <a:endParaRPr lang="en-US" i="1" baseline="0" dirty="0">
-                        <a:solidFill>
-                          <a:srgbClr val="FFC000"/>
-                        </a:solidFill>
-                      </a:endParaRPr>
-                    </a:p>
-                  </a:txBody>
-                  <a:tcPr>
-                    <a:lnL w="12700" cap="flat" cmpd="sng" algn="ctr">
-                      <a:solidFill>
-                        <a:schemeClr val="bg1"/>
-                      </a:solidFill>
-                      <a:prstDash val="solid"/>
-                      <a:round/>
-                      <a:headEnd type="none" w="med" len="med"/>
-                      <a:tailEnd type="none" w="med" len="med"/>
-                    </a:lnL>
-                    <a:lnT w="38100" cap="flat" cmpd="sng" algn="ctr">
-                      <a:solidFill>
-                        <a:schemeClr val="bg1"/>
-                      </a:solidFill>
-                      <a:prstDash val="solid"/>
-                      <a:round/>
-                      <a:headEnd type="none" w="med" len="med"/>
-                      <a:tailEnd type="none" w="med" len="med"/>
-                    </a:lnT>
-                    <a:lnB w="12700" cap="flat" cmpd="sng" algn="ctr">
-                      <a:solidFill>
-                        <a:schemeClr val="bg1"/>
-                      </a:solidFill>
-                      <a:prstDash val="solid"/>
-                      <a:round/>
-                      <a:headEnd type="none" w="med" len="med"/>
-                      <a:tailEnd type="none" w="med" len="med"/>
-                    </a:lnB>
-                  </a:tcPr>
-                </a:tc>
-                <a:extLst>
-                  <a:ext uri="{0D108BD9-81ED-4DB2-BD59-A6C34878D82A}">
-                    <a16:rowId xmlns:a16="http://schemas.microsoft.com/office/drawing/2014/main" val="3167940327"/>
-                  </a:ext>
-                </a:extLst>
-              </a:tr>
-              <a:tr h="370840">
-                <a:tc>
-                  <a:txBody>
-                    <a:bodyPr/>
-                    <a:lstStyle/>
-                    <a:p>
-                      <a:pPr marL="0" marR="0" lvl="0" indent="0" algn="r" defTabSz="914400" rtl="0" eaLnBrk="1" fontAlgn="auto" latinLnBrk="0" hangingPunct="1">
-                        <a:lnSpc>
-                          <a:spcPct val="100000"/>
-                        </a:lnSpc>
-                        <a:spcBef>
-                          <a:spcPts val="0"/>
-                        </a:spcBef>
-                        <a:spcAft>
-                          <a:spcPts val="0"/>
-                        </a:spcAft>
-                        <a:buClrTx/>
-                        <a:buSzTx/>
-                        <a:buFontTx/>
-                        <a:buNone/>
-                        <a:tabLst/>
-                        <a:defRPr/>
-                      </a:pPr>
-                      <a:r>
-                        <a:rPr lang="en-US" sz="1400" i="1" kern="1200" baseline="0" dirty="0">
-                          <a:solidFill>
-                            <a:schemeClr val="bg1"/>
-                          </a:solidFill>
-                          <a:latin typeface="+mj-lt"/>
-                          <a:ea typeface="+mn-ea"/>
-                          <a:cs typeface="+mn-cs"/>
-                        </a:rPr>
-                        <a:t>Part Name</a:t>
-                      </a:r>
-                    </a:p>
-                  </a:txBody>
-                  <a:tcPr>
-                    <a:lnR w="12700" cap="flat" cmpd="sng" algn="ctr">
-                      <a:solidFill>
-                        <a:schemeClr val="bg1"/>
-                      </a:solidFill>
-                      <a:prstDash val="solid"/>
-                      <a:round/>
-                      <a:headEnd type="none" w="med" len="med"/>
-                      <a:tailEnd type="none" w="med" len="med"/>
-                    </a:lnR>
-                    <a:lnT w="12700" cap="flat" cmpd="sng" algn="ctr">
-                      <a:solidFill>
-                        <a:schemeClr val="bg1"/>
-                      </a:solidFill>
-                      <a:prstDash val="solid"/>
-                      <a:round/>
-                      <a:headEnd type="none" w="med" len="med"/>
-                      <a:tailEnd type="none" w="med" len="med"/>
-                    </a:lnT>
-                    <a:lnB w="12700" cap="flat" cmpd="sng" algn="ctr">
-                      <a:solidFill>
-                        <a:schemeClr val="bg1"/>
-                      </a:solidFill>
-                      <a:prstDash val="solid"/>
-                      <a:round/>
-                      <a:headEnd type="none" w="med" len="med"/>
-                      <a:tailEnd type="none" w="med" len="med"/>
-                    </a:lnB>
-                  </a:tcPr>
-                </a:tc>
-                <a:tc>
-                  <a:txBody>
-                    <a:bodyPr/>
-                    <a:lstStyle/>
-                    <a:p>
-                      <a:pPr marL="0" marR="0" lvl="0" indent="0" algn="l" defTabSz="914400" rtl="0" eaLnBrk="1" fontAlgn="auto" latinLnBrk="0" hangingPunct="1">
-                        <a:lnSpc>
-                          <a:spcPct val="100000"/>
-                        </a:lnSpc>
-                        <a:spcBef>
-                          <a:spcPts val="0"/>
-                        </a:spcBef>
-                        <a:spcAft>
-                          <a:spcPts val="0"/>
-                        </a:spcAft>
-                        <a:buClrTx/>
-                        <a:buSzTx/>
-                        <a:buFontTx/>
-                        <a:buNone/>
-                        <a:tabLst/>
-                        <a:defRPr/>
-                      </a:pPr>
-                      <a:r>
-                        <a:rPr lang="en-US" baseline="0" dirty="0">
-                          <a:solidFill>
-                            <a:srgbClr val="00FF00"/>
-                          </a:solidFill>
-                        </a:rPr>
-                        <a:t>Significand</a:t>
-                      </a:r>
-                      <a:r>
-                        <a:rPr lang="en-US" baseline="0" dirty="0">
-                          <a:solidFill>
-                            <a:schemeClr val="bg1"/>
-                          </a:solidFill>
-                        </a:rPr>
-                        <a:t> (preferred), </a:t>
-                      </a:r>
-                      <a:r>
-                        <a:rPr lang="en-US" baseline="0" dirty="0">
-                          <a:solidFill>
-                            <a:srgbClr val="00FF00"/>
-                          </a:solidFill>
-                        </a:rPr>
-                        <a:t>Coefficient</a:t>
-                      </a:r>
-                      <a:r>
-                        <a:rPr lang="en-US" baseline="0" dirty="0">
-                          <a:solidFill>
-                            <a:schemeClr val="bg1"/>
-                          </a:solidFill>
-                        </a:rPr>
-                        <a:t>,</a:t>
-                      </a:r>
-                      <a:br>
-                        <a:rPr lang="en-US" baseline="0" dirty="0">
-                          <a:solidFill>
-                            <a:schemeClr val="bg1"/>
-                          </a:solidFill>
-                        </a:rPr>
-                      </a:br>
-                      <a:r>
-                        <a:rPr lang="en-US" baseline="0" dirty="0">
-                          <a:solidFill>
-                            <a:schemeClr val="bg1"/>
-                          </a:solidFill>
-                        </a:rPr>
-                        <a:t>(</a:t>
-                      </a:r>
-                      <a:r>
-                        <a:rPr lang="en-US" baseline="0" dirty="0">
-                          <a:solidFill>
-                            <a:srgbClr val="00FF00"/>
-                          </a:solidFill>
-                        </a:rPr>
-                        <a:t>Mantissa</a:t>
-                      </a:r>
-                      <a:r>
-                        <a:rPr lang="en-US" baseline="0" dirty="0">
-                          <a:solidFill>
-                            <a:schemeClr val="bg1"/>
-                          </a:solidFill>
-                        </a:rPr>
-                        <a:t> is obsolete term)</a:t>
-                      </a:r>
-                    </a:p>
-                  </a:txBody>
-                  <a:tcPr>
-                    <a:lnL w="12700" cap="flat" cmpd="sng" algn="ctr">
-                      <a:solidFill>
-                        <a:schemeClr val="bg1"/>
-                      </a:solidFill>
-                      <a:prstDash val="solid"/>
-                      <a:round/>
-                      <a:headEnd type="none" w="med" len="med"/>
-                      <a:tailEnd type="none" w="med" len="med"/>
-                    </a:lnL>
-                    <a:lnT w="12700" cap="flat" cmpd="sng" algn="ctr">
-                      <a:solidFill>
-                        <a:schemeClr val="bg1"/>
-                      </a:solidFill>
-                      <a:prstDash val="solid"/>
-                      <a:round/>
-                      <a:headEnd type="none" w="med" len="med"/>
-                      <a:tailEnd type="none" w="med" len="med"/>
-                    </a:lnT>
-                    <a:lnB w="12700" cap="flat" cmpd="sng" algn="ctr">
-                      <a:solidFill>
-                        <a:schemeClr val="bg1"/>
-                      </a:solidFill>
-                      <a:prstDash val="solid"/>
-                      <a:round/>
-                      <a:headEnd type="none" w="med" len="med"/>
-                      <a:tailEnd type="none" w="med" len="med"/>
-                    </a:lnB>
-                  </a:tcPr>
-                </a:tc>
-                <a:extLst>
-                  <a:ext uri="{0D108BD9-81ED-4DB2-BD59-A6C34878D82A}">
-                    <a16:rowId xmlns:a16="http://schemas.microsoft.com/office/drawing/2014/main" val="365307444"/>
-                  </a:ext>
-                </a:extLst>
-              </a:tr>
-              <a:tr h="370840">
-                <a:tc>
-                  <a:txBody>
-                    <a:bodyPr/>
-                    <a:lstStyle/>
-                    <a:p>
-                      <a:pPr marL="0" marR="0" lvl="0" indent="0" algn="r" defTabSz="914400" rtl="0" eaLnBrk="1" fontAlgn="auto" latinLnBrk="0" hangingPunct="1">
-                        <a:lnSpc>
-                          <a:spcPct val="100000"/>
-                        </a:lnSpc>
-                        <a:spcBef>
-                          <a:spcPts val="0"/>
-                        </a:spcBef>
-                        <a:spcAft>
-                          <a:spcPts val="0"/>
-                        </a:spcAft>
-                        <a:buClrTx/>
-                        <a:buSzTx/>
-                        <a:buFontTx/>
-                        <a:buNone/>
-                        <a:tabLst/>
-                        <a:defRPr/>
-                      </a:pPr>
-                      <a:r>
-                        <a:rPr lang="en-US" sz="1400" i="1" kern="1200" baseline="0" dirty="0">
-                          <a:solidFill>
-                            <a:schemeClr val="bg1"/>
-                          </a:solidFill>
-                          <a:latin typeface="+mj-lt"/>
-                          <a:ea typeface="+mn-ea"/>
-                          <a:cs typeface="+mn-cs"/>
-                        </a:rPr>
-                        <a:t>Part Property</a:t>
-                      </a:r>
-                    </a:p>
-                  </a:txBody>
-                  <a:tcPr>
-                    <a:lnR w="12700" cap="flat" cmpd="sng" algn="ctr">
-                      <a:solidFill>
-                        <a:schemeClr val="bg1"/>
-                      </a:solidFill>
-                      <a:prstDash val="solid"/>
-                      <a:round/>
-                      <a:headEnd type="none" w="med" len="med"/>
-                      <a:tailEnd type="none" w="med" len="med"/>
-                    </a:lnR>
-                    <a:lnT w="12700" cap="flat" cmpd="sng" algn="ctr">
-                      <a:solidFill>
-                        <a:schemeClr val="bg1"/>
-                      </a:solidFill>
-                      <a:prstDash val="solid"/>
-                      <a:round/>
-                      <a:headEnd type="none" w="med" len="med"/>
-                      <a:tailEnd type="none" w="med" len="med"/>
-                    </a:lnT>
-                    <a:lnB w="12700" cap="flat" cmpd="sng" algn="ctr">
-                      <a:solidFill>
-                        <a:schemeClr val="bg1"/>
-                      </a:solidFill>
-                      <a:prstDash val="solid"/>
-                      <a:round/>
-                      <a:headEnd type="none" w="med" len="med"/>
-                      <a:tailEnd type="none" w="med" len="med"/>
-                    </a:lnB>
-                  </a:tcPr>
-                </a:tc>
-                <a:tc>
-                  <a:txBody>
-                    <a:bodyPr/>
-                    <a:lstStyle/>
-                    <a:p>
-                      <a:r>
-                        <a:rPr lang="en-US" baseline="0" dirty="0">
-                          <a:solidFill>
-                            <a:schemeClr val="bg1"/>
-                          </a:solidFill>
-                        </a:rPr>
-                        <a:t>Number greater than or equal to 1.0 and less than 10. This number properly express significant digits</a:t>
-                      </a:r>
-                    </a:p>
-                  </a:txBody>
-                  <a:tcPr>
-                    <a:lnL w="12700" cap="flat" cmpd="sng" algn="ctr">
-                      <a:solidFill>
-                        <a:schemeClr val="bg1"/>
-                      </a:solidFill>
-                      <a:prstDash val="solid"/>
-                      <a:round/>
-                      <a:headEnd type="none" w="med" len="med"/>
-                      <a:tailEnd type="none" w="med" len="med"/>
-                    </a:lnL>
-                    <a:lnT w="12700" cap="flat" cmpd="sng" algn="ctr">
-                      <a:solidFill>
-                        <a:schemeClr val="bg1"/>
-                      </a:solidFill>
-                      <a:prstDash val="solid"/>
-                      <a:round/>
-                      <a:headEnd type="none" w="med" len="med"/>
-                      <a:tailEnd type="none" w="med" len="med"/>
-                    </a:lnT>
-                    <a:lnB w="12700" cap="flat" cmpd="sng" algn="ctr">
-                      <a:solidFill>
-                        <a:schemeClr val="bg1"/>
-                      </a:solidFill>
-                      <a:prstDash val="solid"/>
-                      <a:round/>
-                      <a:headEnd type="none" w="med" len="med"/>
-                      <a:tailEnd type="none" w="med" len="med"/>
-                    </a:lnB>
-                  </a:tcPr>
-                </a:tc>
-                <a:extLst>
-                  <a:ext uri="{0D108BD9-81ED-4DB2-BD59-A6C34878D82A}">
-                    <a16:rowId xmlns:a16="http://schemas.microsoft.com/office/drawing/2014/main" val="2630359962"/>
-                  </a:ext>
-                </a:extLst>
-              </a:tr>
-              <a:tr h="370840">
-                <a:tc>
-                  <a:txBody>
-                    <a:bodyPr/>
-                    <a:lstStyle/>
-                    <a:p>
-                      <a:pPr algn="r"/>
-                      <a:endParaRPr lang="en-US" sz="1400" i="1" baseline="0" dirty="0">
-                        <a:solidFill>
-                          <a:schemeClr val="bg1"/>
-                        </a:solidFill>
-                        <a:highlight>
-                          <a:srgbClr val="CCFFFF"/>
-                        </a:highlight>
-                        <a:latin typeface="+mj-lt"/>
-                      </a:endParaRPr>
-                    </a:p>
-                  </a:txBody>
-                  <a:tcPr>
-                    <a:lnR w="12700" cap="flat" cmpd="sng" algn="ctr">
-                      <a:solidFill>
-                        <a:schemeClr val="bg1"/>
-                      </a:solidFill>
-                      <a:prstDash val="solid"/>
-                      <a:round/>
-                      <a:headEnd type="none" w="med" len="med"/>
-                      <a:tailEnd type="none" w="med" len="med"/>
-                    </a:lnR>
-                    <a:lnT w="12700" cap="flat" cmpd="sng" algn="ctr">
-                      <a:solidFill>
-                        <a:schemeClr val="bg1"/>
-                      </a:solidFill>
-                      <a:prstDash val="solid"/>
-                      <a:round/>
-                      <a:headEnd type="none" w="med" len="med"/>
-                      <a:tailEnd type="none" w="med" len="med"/>
-                    </a:lnT>
-                    <a:lnB w="12700" cap="flat" cmpd="sng" algn="ctr">
-                      <a:solidFill>
-                        <a:schemeClr val="bg1"/>
-                      </a:solidFill>
-                      <a:prstDash val="solid"/>
-                      <a:round/>
-                      <a:headEnd type="none" w="med" len="med"/>
-                      <a:tailEnd type="none" w="med" len="med"/>
-                    </a:lnB>
-                    <a:solidFill>
-                      <a:schemeClr val="tx1">
-                        <a:lumMod val="65000"/>
-                        <a:lumOff val="35000"/>
-                      </a:schemeClr>
-                    </a:solidFill>
-                  </a:tcPr>
-                </a:tc>
-                <a:tc>
-                  <a:txBody>
-                    <a:bodyPr/>
-                    <a:lstStyle/>
-                    <a:p>
-                      <a:endParaRPr lang="en-US" baseline="0" dirty="0">
-                        <a:solidFill>
-                          <a:schemeClr val="bg1"/>
-                        </a:solidFill>
-                        <a:highlight>
-                          <a:srgbClr val="CCFFFF"/>
-                        </a:highlight>
-                      </a:endParaRPr>
-                    </a:p>
-                  </a:txBody>
-                  <a:tcPr>
-                    <a:lnL w="12700" cap="flat" cmpd="sng" algn="ctr">
-                      <a:solidFill>
-                        <a:schemeClr val="bg1"/>
-                      </a:solidFill>
-                      <a:prstDash val="solid"/>
-                      <a:round/>
-                      <a:headEnd type="none" w="med" len="med"/>
-                      <a:tailEnd type="none" w="med" len="med"/>
-                    </a:lnL>
-                    <a:lnT w="12700" cap="flat" cmpd="sng" algn="ctr">
-                      <a:solidFill>
-                        <a:schemeClr val="bg1"/>
-                      </a:solidFill>
-                      <a:prstDash val="solid"/>
-                      <a:round/>
-                      <a:headEnd type="none" w="med" len="med"/>
-                      <a:tailEnd type="none" w="med" len="med"/>
-                    </a:lnT>
-                    <a:lnB w="12700" cap="flat" cmpd="sng" algn="ctr">
-                      <a:solidFill>
-                        <a:schemeClr val="bg1"/>
-                      </a:solidFill>
-                      <a:prstDash val="solid"/>
-                      <a:round/>
-                      <a:headEnd type="none" w="med" len="med"/>
-                      <a:tailEnd type="none" w="med" len="med"/>
-                    </a:lnB>
-                    <a:solidFill>
-                      <a:schemeClr val="tx1">
-                        <a:lumMod val="65000"/>
-                        <a:lumOff val="35000"/>
-                      </a:schemeClr>
-                    </a:solidFill>
-                  </a:tcPr>
-                </a:tc>
-                <a:extLst>
-                  <a:ext uri="{0D108BD9-81ED-4DB2-BD59-A6C34878D82A}">
-                    <a16:rowId xmlns:a16="http://schemas.microsoft.com/office/drawing/2014/main" val="3176547581"/>
-                  </a:ext>
-                </a:extLst>
-              </a:tr>
-              <a:tr h="370840">
-                <a:tc>
-                  <a:txBody>
-                    <a:bodyPr/>
-                    <a:lstStyle/>
-                    <a:p>
-                      <a:pPr algn="r"/>
-                      <a:r>
-                        <a:rPr lang="en-US" sz="1400" i="1" kern="1200" dirty="0">
-                          <a:solidFill>
-                            <a:schemeClr val="bg1"/>
-                          </a:solidFill>
-                          <a:latin typeface="+mj-lt"/>
-                          <a:ea typeface="+mn-ea"/>
-                          <a:cs typeface="+mn-cs"/>
-                        </a:rPr>
-                        <a:t>Part</a:t>
-                      </a:r>
-                      <a:endParaRPr lang="en-US" sz="1400" i="1" baseline="0" dirty="0">
-                        <a:solidFill>
-                          <a:schemeClr val="bg1"/>
-                        </a:solidFill>
-                        <a:latin typeface="+mj-lt"/>
-                      </a:endParaRPr>
-                    </a:p>
-                  </a:txBody>
-                  <a:tcPr>
-                    <a:lnR w="12700" cap="flat" cmpd="sng" algn="ctr">
-                      <a:solidFill>
-                        <a:schemeClr val="bg1"/>
-                      </a:solidFill>
-                      <a:prstDash val="solid"/>
-                      <a:round/>
-                      <a:headEnd type="none" w="med" len="med"/>
-                      <a:tailEnd type="none" w="med" len="med"/>
-                    </a:lnR>
-                    <a:lnT w="12700" cap="flat" cmpd="sng" algn="ctr">
-                      <a:solidFill>
-                        <a:schemeClr val="bg1"/>
-                      </a:solidFill>
-                      <a:prstDash val="solid"/>
-                      <a:round/>
-                      <a:headEnd type="none" w="med" len="med"/>
-                      <a:tailEnd type="none" w="med" len="med"/>
-                    </a:lnT>
-                    <a:lnB w="12700" cap="flat" cmpd="sng" algn="ctr">
-                      <a:solidFill>
-                        <a:schemeClr val="bg1"/>
-                      </a:solidFill>
-                      <a:prstDash val="solid"/>
-                      <a:round/>
-                      <a:headEnd type="none" w="med" len="med"/>
-                      <a:tailEnd type="none" w="med" len="med"/>
-                    </a:lnB>
-                  </a:tcPr>
-                </a:tc>
-                <a:tc>
-                  <a:txBody>
-                    <a:bodyPr/>
-                    <a:lstStyle/>
-                    <a:p>
-                      <a:pPr marL="0" marR="0" lvl="0" indent="0" algn="l" defTabSz="914400" rtl="0" eaLnBrk="1" fontAlgn="auto" latinLnBrk="0" hangingPunct="1">
-                        <a:lnSpc>
-                          <a:spcPct val="100000"/>
-                        </a:lnSpc>
-                        <a:spcBef>
-                          <a:spcPts val="0"/>
-                        </a:spcBef>
-                        <a:spcAft>
-                          <a:spcPts val="0"/>
-                        </a:spcAft>
-                        <a:buClrTx/>
-                        <a:buSzTx/>
-                        <a:buFontTx/>
-                        <a:buNone/>
-                        <a:tabLst/>
-                        <a:defRPr/>
-                      </a:pPr>
-                      <a:r>
-                        <a:rPr lang="en-US" dirty="0">
-                          <a:solidFill>
-                            <a:schemeClr val="accent1">
-                              <a:lumMod val="60000"/>
-                              <a:lumOff val="40000"/>
-                            </a:schemeClr>
-                          </a:solidFill>
-                        </a:rPr>
-                        <a:t>10</a:t>
-                      </a:r>
-                      <a:r>
-                        <a:rPr lang="en-US" i="1" baseline="30000" dirty="0">
-                          <a:solidFill>
-                            <a:schemeClr val="accent1">
-                              <a:lumMod val="60000"/>
-                              <a:lumOff val="40000"/>
-                            </a:schemeClr>
-                          </a:solidFill>
-                        </a:rPr>
-                        <a:t>n</a:t>
-                      </a:r>
-                      <a:endParaRPr lang="en-US" baseline="0" dirty="0">
-                        <a:solidFill>
-                          <a:schemeClr val="accent1">
-                            <a:lumMod val="60000"/>
-                            <a:lumOff val="40000"/>
-                          </a:schemeClr>
-                        </a:solidFill>
-                      </a:endParaRPr>
-                    </a:p>
-                  </a:txBody>
-                  <a:tcPr>
-                    <a:lnL w="12700" cap="flat" cmpd="sng" algn="ctr">
-                      <a:solidFill>
-                        <a:schemeClr val="bg1"/>
-                      </a:solidFill>
-                      <a:prstDash val="solid"/>
-                      <a:round/>
-                      <a:headEnd type="none" w="med" len="med"/>
-                      <a:tailEnd type="none" w="med" len="med"/>
-                    </a:lnL>
-                    <a:lnT w="12700" cap="flat" cmpd="sng" algn="ctr">
-                      <a:solidFill>
-                        <a:schemeClr val="bg1"/>
-                      </a:solidFill>
-                      <a:prstDash val="solid"/>
-                      <a:round/>
-                      <a:headEnd type="none" w="med" len="med"/>
-                      <a:tailEnd type="none" w="med" len="med"/>
-                    </a:lnT>
-                    <a:lnB w="12700" cap="flat" cmpd="sng" algn="ctr">
-                      <a:solidFill>
-                        <a:schemeClr val="bg1"/>
-                      </a:solidFill>
-                      <a:prstDash val="solid"/>
-                      <a:round/>
-                      <a:headEnd type="none" w="med" len="med"/>
-                      <a:tailEnd type="none" w="med" len="med"/>
-                    </a:lnB>
-                  </a:tcPr>
-                </a:tc>
-                <a:extLst>
-                  <a:ext uri="{0D108BD9-81ED-4DB2-BD59-A6C34878D82A}">
-                    <a16:rowId xmlns:a16="http://schemas.microsoft.com/office/drawing/2014/main" val="4069714395"/>
-                  </a:ext>
-                </a:extLst>
-              </a:tr>
-              <a:tr h="370840">
-                <a:tc>
-                  <a:txBody>
-                    <a:bodyPr/>
-                    <a:lstStyle/>
-                    <a:p>
-                      <a:pPr algn="r"/>
-                      <a:r>
-                        <a:rPr lang="en-US" sz="1400" i="1" baseline="0" dirty="0">
-                          <a:solidFill>
-                            <a:schemeClr val="bg1"/>
-                          </a:solidFill>
-                          <a:latin typeface="+mj-lt"/>
-                        </a:rPr>
-                        <a:t>Part Name</a:t>
-                      </a:r>
-                    </a:p>
-                  </a:txBody>
-                  <a:tcPr>
-                    <a:lnR w="12700" cap="flat" cmpd="sng" algn="ctr">
-                      <a:solidFill>
-                        <a:schemeClr val="bg1"/>
-                      </a:solidFill>
-                      <a:prstDash val="solid"/>
-                      <a:round/>
-                      <a:headEnd type="none" w="med" len="med"/>
-                      <a:tailEnd type="none" w="med" len="med"/>
-                    </a:lnR>
-                    <a:lnT w="12700" cap="flat" cmpd="sng" algn="ctr">
-                      <a:solidFill>
-                        <a:schemeClr val="bg1"/>
-                      </a:solidFill>
-                      <a:prstDash val="solid"/>
-                      <a:round/>
-                      <a:headEnd type="none" w="med" len="med"/>
-                      <a:tailEnd type="none" w="med" len="med"/>
-                    </a:lnT>
-                    <a:lnB w="12700" cap="flat" cmpd="sng" algn="ctr">
-                      <a:solidFill>
-                        <a:schemeClr val="bg1"/>
-                      </a:solidFill>
-                      <a:prstDash val="solid"/>
-                      <a:round/>
-                      <a:headEnd type="none" w="med" len="med"/>
-                      <a:tailEnd type="none" w="med" len="med"/>
-                    </a:lnB>
-                  </a:tcPr>
-                </a:tc>
-                <a:tc>
-                  <a:txBody>
-                    <a:bodyPr/>
-                    <a:lstStyle/>
-                    <a:p>
-                      <a:r>
-                        <a:rPr lang="en-US" baseline="0" dirty="0">
-                          <a:solidFill>
-                            <a:srgbClr val="00FF00"/>
-                          </a:solidFill>
-                        </a:rPr>
-                        <a:t>Exponent</a:t>
-                      </a:r>
-                    </a:p>
-                  </a:txBody>
-                  <a:tcPr>
-                    <a:lnL w="12700" cap="flat" cmpd="sng" algn="ctr">
-                      <a:solidFill>
-                        <a:schemeClr val="bg1"/>
-                      </a:solidFill>
-                      <a:prstDash val="solid"/>
-                      <a:round/>
-                      <a:headEnd type="none" w="med" len="med"/>
-                      <a:tailEnd type="none" w="med" len="med"/>
-                    </a:lnL>
-                    <a:lnT w="12700" cap="flat" cmpd="sng" algn="ctr">
-                      <a:solidFill>
-                        <a:schemeClr val="bg1"/>
-                      </a:solidFill>
-                      <a:prstDash val="solid"/>
-                      <a:round/>
-                      <a:headEnd type="none" w="med" len="med"/>
-                      <a:tailEnd type="none" w="med" len="med"/>
-                    </a:lnT>
-                    <a:lnB w="12700" cap="flat" cmpd="sng" algn="ctr">
-                      <a:solidFill>
-                        <a:schemeClr val="bg1"/>
-                      </a:solidFill>
-                      <a:prstDash val="solid"/>
-                      <a:round/>
-                      <a:headEnd type="none" w="med" len="med"/>
-                      <a:tailEnd type="none" w="med" len="med"/>
-                    </a:lnB>
-                  </a:tcPr>
-                </a:tc>
-                <a:extLst>
-                  <a:ext uri="{0D108BD9-81ED-4DB2-BD59-A6C34878D82A}">
-                    <a16:rowId xmlns:a16="http://schemas.microsoft.com/office/drawing/2014/main" val="56812982"/>
-                  </a:ext>
-                </a:extLst>
-              </a:tr>
-              <a:tr h="370840">
-                <a:tc>
-                  <a:txBody>
-                    <a:bodyPr/>
-                    <a:lstStyle/>
-                    <a:p>
-                      <a:pPr algn="r"/>
-                      <a:r>
-                        <a:rPr lang="en-US" sz="1400" i="1" baseline="0" dirty="0">
-                          <a:solidFill>
-                            <a:schemeClr val="bg1"/>
-                          </a:solidFill>
-                          <a:latin typeface="+mj-lt"/>
-                        </a:rPr>
-                        <a:t>Part Property</a:t>
-                      </a:r>
-                    </a:p>
-                  </a:txBody>
-                  <a:tcPr>
-                    <a:lnR w="12700" cap="flat" cmpd="sng" algn="ctr">
-                      <a:solidFill>
-                        <a:schemeClr val="bg1"/>
-                      </a:solidFill>
-                      <a:prstDash val="solid"/>
-                      <a:round/>
-                      <a:headEnd type="none" w="med" len="med"/>
-                      <a:tailEnd type="none" w="med" len="med"/>
-                    </a:lnR>
-                    <a:lnT w="12700" cap="flat" cmpd="sng" algn="ctr">
-                      <a:solidFill>
-                        <a:schemeClr val="bg1"/>
-                      </a:solidFill>
-                      <a:prstDash val="solid"/>
-                      <a:round/>
-                      <a:headEnd type="none" w="med" len="med"/>
-                      <a:tailEnd type="none" w="med" len="med"/>
-                    </a:lnT>
-                    <a:lnB w="12700" cap="flat" cmpd="sng" algn="ctr">
-                      <a:solidFill>
-                        <a:schemeClr val="bg1"/>
-                      </a:solidFill>
-                      <a:prstDash val="solid"/>
-                      <a:round/>
-                      <a:headEnd type="none" w="med" len="med"/>
-                      <a:tailEnd type="none" w="med" len="med"/>
-                    </a:lnB>
-                  </a:tcPr>
-                </a:tc>
-                <a:tc>
-                  <a:txBody>
-                    <a:bodyPr/>
-                    <a:lstStyle/>
-                    <a:p>
-                      <a:r>
-                        <a:rPr lang="en-US" baseline="0" dirty="0">
-                          <a:solidFill>
-                            <a:schemeClr val="bg1"/>
-                          </a:solidFill>
-                        </a:rPr>
-                        <a:t>Exponent of 10 where </a:t>
-                      </a:r>
-                      <a:r>
-                        <a:rPr lang="en-US" b="1" i="1" baseline="0" dirty="0">
-                          <a:solidFill>
-                            <a:schemeClr val="bg1"/>
-                          </a:solidFill>
-                        </a:rPr>
-                        <a:t>n</a:t>
-                      </a:r>
-                      <a:r>
-                        <a:rPr lang="en-US" baseline="0" dirty="0">
-                          <a:solidFill>
-                            <a:schemeClr val="bg1"/>
-                          </a:solidFill>
-                        </a:rPr>
-                        <a:t> is integer, negative, positive (note 10</a:t>
-                      </a:r>
-                      <a:r>
-                        <a:rPr lang="en-US" baseline="30000" dirty="0">
-                          <a:solidFill>
-                            <a:schemeClr val="bg1"/>
-                          </a:solidFill>
-                        </a:rPr>
-                        <a:t>0 </a:t>
-                      </a:r>
-                      <a:r>
-                        <a:rPr lang="en-US" baseline="0" dirty="0">
-                          <a:solidFill>
-                            <a:schemeClr val="bg1"/>
-                          </a:solidFill>
-                        </a:rPr>
-                        <a:t>= 1)</a:t>
-                      </a:r>
-                    </a:p>
-                  </a:txBody>
-                  <a:tcPr>
-                    <a:lnL w="12700" cap="flat" cmpd="sng" algn="ctr">
-                      <a:solidFill>
-                        <a:schemeClr val="bg1"/>
-                      </a:solidFill>
-                      <a:prstDash val="solid"/>
-                      <a:round/>
-                      <a:headEnd type="none" w="med" len="med"/>
-                      <a:tailEnd type="none" w="med" len="med"/>
-                    </a:lnL>
-                    <a:lnT w="12700" cap="flat" cmpd="sng" algn="ctr">
-                      <a:solidFill>
-                        <a:schemeClr val="bg1"/>
-                      </a:solidFill>
-                      <a:prstDash val="solid"/>
-                      <a:round/>
-                      <a:headEnd type="none" w="med" len="med"/>
-                      <a:tailEnd type="none" w="med" len="med"/>
-                    </a:lnT>
-                    <a:lnB w="12700" cap="flat" cmpd="sng" algn="ctr">
-                      <a:solidFill>
-                        <a:schemeClr val="bg1"/>
-                      </a:solidFill>
-                      <a:prstDash val="solid"/>
-                      <a:round/>
-                      <a:headEnd type="none" w="med" len="med"/>
-                      <a:tailEnd type="none" w="med" len="med"/>
-                    </a:lnB>
-                  </a:tcPr>
-                </a:tc>
-                <a:extLst>
-                  <a:ext uri="{0D108BD9-81ED-4DB2-BD59-A6C34878D82A}">
-                    <a16:rowId xmlns:a16="http://schemas.microsoft.com/office/drawing/2014/main" val="2089654392"/>
-                  </a:ext>
-                </a:extLst>
-              </a:tr>
-            </a:tbl>
-          </a:graphicData>
-        </a:graphic>
-      </p:graphicFrame>
-    </p:spTree>
-    <p:extLst>
-      <p:ext uri="{BB962C8B-B14F-4D97-AF65-F5344CB8AC3E}">
-        <p14:creationId xmlns:p14="http://schemas.microsoft.com/office/powerpoint/2010/main" val="2250512596"/>
-      </p:ext>
-    </p:extLst>
-  </p:cSld>
-  <p:clrMapOvr>
-    <a:masterClrMapping/>
-  </p:clrMapOvr>
-</p:sld>
-</file>
-
-<file path=ppt/slides/slide40.xml><?xml version="1.0" encoding="utf-8"?>
+<file path=ppt/slides/slide41.xml><?xml version="1.0" encoding="utf-8"?>
 <p:sld xmlns:a="http://schemas.openxmlformats.org/drawingml/2006/main" xmlns:r="http://schemas.openxmlformats.org/officeDocument/2006/relationships" xmlns:p="http://schemas.openxmlformats.org/presentationml/2006/main">
   <p:cSld>
     <p:spTree>
@@ -38297,7 +38439,7 @@
 </p:sld>
 </file>
 
-<file path=ppt/slides/slide41.xml><?xml version="1.0" encoding="utf-8"?>
+<file path=ppt/slides/slide42.xml><?xml version="1.0" encoding="utf-8"?>
 <p:sld xmlns:a="http://schemas.openxmlformats.org/drawingml/2006/main" xmlns:r="http://schemas.openxmlformats.org/officeDocument/2006/relationships" xmlns:p="http://schemas.openxmlformats.org/presentationml/2006/main">
   <p:cSld>
     <p:spTree>
@@ -38503,7 +38645,7 @@
 </p:sld>
 </file>
 
-<file path=ppt/slides/slide42.xml><?xml version="1.0" encoding="utf-8"?>
+<file path=ppt/slides/slide43.xml><?xml version="1.0" encoding="utf-8"?>
 <p:sld xmlns:a="http://schemas.openxmlformats.org/drawingml/2006/main" xmlns:r="http://schemas.openxmlformats.org/officeDocument/2006/relationships" xmlns:p="http://schemas.openxmlformats.org/presentationml/2006/main">
   <p:cSld>
     <p:spTree>
@@ -38925,7 +39067,7 @@
 </p:sld>
 </file>
 
-<file path=ppt/slides/slide43.xml><?xml version="1.0" encoding="utf-8"?>
+<file path=ppt/slides/slide44.xml><?xml version="1.0" encoding="utf-8"?>
 <p:sld xmlns:a="http://schemas.openxmlformats.org/drawingml/2006/main" xmlns:r="http://schemas.openxmlformats.org/officeDocument/2006/relationships" xmlns:p="http://schemas.openxmlformats.org/presentationml/2006/main">
   <p:cSld>
     <p:spTree>
@@ -38976,8 +39118,8 @@
           </a:p>
         </p:txBody>
       </p:sp>
-      <mc:AlternateContent xmlns:mc="http://schemas.openxmlformats.org/markup-compatibility/2006">
-        <mc:Choice xmlns:a14="http://schemas.microsoft.com/office/drawing/2010/main" Requires="a14">
+      <mc:AlternateContent xmlns:mc="http://schemas.openxmlformats.org/markup-compatibility/2006" xmlns:a14="http://schemas.microsoft.com/office/drawing/2010/main">
+        <mc:Choice Requires="a14">
           <p:sp>
             <p:nvSpPr>
               <p:cNvPr id="2" name="Content Placeholder 1">
@@ -39531,7 +39673,7 @@
             </p:txBody>
           </p:sp>
         </mc:Choice>
-        <mc:Fallback>
+        <mc:Fallback xmlns="">
           <p:sp>
             <p:nvSpPr>
               <p:cNvPr id="2" name="Content Placeholder 1">
@@ -39594,7 +39736,7 @@
 </p:sld>
 </file>
 
-<file path=ppt/slides/slide44.xml><?xml version="1.0" encoding="utf-8"?>
+<file path=ppt/slides/slide45.xml><?xml version="1.0" encoding="utf-8"?>
 <p:sld xmlns:a="http://schemas.openxmlformats.org/drawingml/2006/main" xmlns:r="http://schemas.openxmlformats.org/officeDocument/2006/relationships" xmlns:p="http://schemas.openxmlformats.org/presentationml/2006/main">
   <p:cSld>
     <p:spTree>
@@ -39686,7 +39828,7 @@
 </p:sld>
 </file>
 
-<file path=ppt/slides/slide45.xml><?xml version="1.0" encoding="utf-8"?>
+<file path=ppt/slides/slide46.xml><?xml version="1.0" encoding="utf-8"?>
 <p:sld xmlns:a="http://schemas.openxmlformats.org/drawingml/2006/main" xmlns:r="http://schemas.openxmlformats.org/officeDocument/2006/relationships" xmlns:p="http://schemas.openxmlformats.org/presentationml/2006/main">
   <p:cSld>
     <p:spTree>
@@ -39834,7 +39976,7 @@
 </p:sld>
 </file>
 
-<file path=ppt/slides/slide46.xml><?xml version="1.0" encoding="utf-8"?>
+<file path=ppt/slides/slide47.xml><?xml version="1.0" encoding="utf-8"?>
 <p:sld xmlns:a="http://schemas.openxmlformats.org/drawingml/2006/main" xmlns:r="http://schemas.openxmlformats.org/officeDocument/2006/relationships" xmlns:p="http://schemas.openxmlformats.org/presentationml/2006/main">
   <p:cSld>
     <p:spTree>
@@ -40367,7 +40509,7 @@
 </p:sld>
 </file>
 
-<file path=ppt/slides/slide47.xml><?xml version="1.0" encoding="utf-8"?>
+<file path=ppt/slides/slide48.xml><?xml version="1.0" encoding="utf-8"?>
 <p:sld xmlns:a="http://schemas.openxmlformats.org/drawingml/2006/main" xmlns:r="http://schemas.openxmlformats.org/officeDocument/2006/relationships" xmlns:p="http://schemas.openxmlformats.org/presentationml/2006/main">
   <p:cSld>
     <p:spTree>
@@ -41129,7 +41271,7 @@
 </p:sld>
 </file>
 
-<file path=ppt/slides/slide48.xml><?xml version="1.0" encoding="utf-8"?>
+<file path=ppt/slides/slide49.xml><?xml version="1.0" encoding="utf-8"?>
 <p:sld xmlns:a="http://schemas.openxmlformats.org/drawingml/2006/main" xmlns:r="http://schemas.openxmlformats.org/officeDocument/2006/relationships" xmlns:p="http://schemas.openxmlformats.org/presentationml/2006/main">
   <p:cSld>
     <p:spTree>
@@ -42049,175 +42191,346 @@
           </a:p>
         </p:txBody>
       </p:sp>
-      <p:sp>
-        <p:nvSpPr>
-          <p:cNvPr id="6" name="Content Placeholder 5">
-            <a:extLst>
-              <a:ext uri="{FF2B5EF4-FFF2-40B4-BE49-F238E27FC236}">
-                <a16:creationId xmlns:a16="http://schemas.microsoft.com/office/drawing/2014/main" id="{5714C4C0-0FC0-AD06-D333-60BD008C05EC}"/>
-              </a:ext>
-            </a:extLst>
-          </p:cNvPr>
-          <p:cNvSpPr>
-            <a:spLocks noGrp="1"/>
-          </p:cNvSpPr>
-          <p:nvPr>
-            <p:ph idx="1"/>
-          </p:nvPr>
-        </p:nvSpPr>
-        <p:spPr/>
-        <p:txBody>
-          <a:bodyPr/>
-          <a:lstStyle/>
-          <a:p>
-            <a:pPr marL="0" indent="0">
-              <a:buNone/>
-            </a:pPr>
-            <a:r>
-              <a:rPr lang="en-US" i="1" dirty="0"/>
-              <a:t>decimal point moves to right</a:t>
-            </a:r>
-          </a:p>
-          <a:p>
-            <a:pPr marL="0" indent="0">
-              <a:buNone/>
-            </a:pPr>
-            <a:r>
-              <a:rPr lang="en-US" dirty="0"/>
-              <a:t>1. = 10</a:t>
-            </a:r>
-            <a:r>
-              <a:rPr lang="en-US" baseline="30000" dirty="0"/>
-              <a:t>0</a:t>
-            </a:r>
-          </a:p>
-          <a:p>
-            <a:pPr marL="0" indent="0">
-              <a:buNone/>
-            </a:pPr>
-            <a:r>
-              <a:rPr lang="en-US" dirty="0"/>
-              <a:t>10. = 10</a:t>
-            </a:r>
-            <a:r>
-              <a:rPr lang="en-US" baseline="30000" dirty="0"/>
-              <a:t>1</a:t>
-            </a:r>
-          </a:p>
-          <a:p>
-            <a:pPr marL="0" indent="0">
-              <a:buNone/>
-            </a:pPr>
-            <a:r>
-              <a:rPr lang="en-US" dirty="0"/>
-              <a:t>100. = 10</a:t>
-            </a:r>
-            <a:r>
-              <a:rPr lang="en-US" baseline="30000" dirty="0"/>
-              <a:t>2</a:t>
-            </a:r>
-          </a:p>
-          <a:p>
-            <a:pPr marL="0" indent="0">
-              <a:buNone/>
-            </a:pPr>
-            <a:endParaRPr lang="en-US" baseline="30000" dirty="0"/>
-          </a:p>
-          <a:p>
-            <a:pPr marL="0" indent="0">
-              <a:buNone/>
-            </a:pPr>
-            <a:r>
-              <a:rPr lang="en-US" i="1" dirty="0"/>
-              <a:t>decimal point moves to left</a:t>
-            </a:r>
-          </a:p>
-          <a:p>
-            <a:pPr marL="0" indent="0">
-              <a:buNone/>
-            </a:pPr>
-            <a:r>
-              <a:rPr lang="en-US" dirty="0"/>
-              <a:t>0.1 = 10</a:t>
-            </a:r>
-            <a:r>
-              <a:rPr lang="en-US" baseline="30000" dirty="0"/>
-              <a:t>-1</a:t>
-            </a:r>
-          </a:p>
-          <a:p>
-            <a:pPr marL="0" indent="0">
-              <a:buNone/>
-            </a:pPr>
-            <a:r>
-              <a:rPr lang="en-US" dirty="0"/>
-              <a:t>0.01 = 10</a:t>
-            </a:r>
-            <a:r>
-              <a:rPr lang="en-US" baseline="30000" dirty="0"/>
-              <a:t>-2</a:t>
-            </a:r>
-          </a:p>
-          <a:p>
-            <a:pPr marL="0" indent="0">
-              <a:buNone/>
-            </a:pPr>
-            <a:r>
-              <a:rPr lang="en-US" dirty="0"/>
-              <a:t>0.001 = 10</a:t>
-            </a:r>
-            <a:r>
-              <a:rPr lang="en-US" baseline="30000" dirty="0"/>
-              <a:t>-3</a:t>
-            </a:r>
-          </a:p>
-          <a:p>
-            <a:pPr marL="0" indent="0">
-              <a:buNone/>
-            </a:pPr>
-            <a:endParaRPr lang="en-US" baseline="30000" dirty="0"/>
-          </a:p>
-          <a:p>
-            <a:pPr marL="0" indent="0">
-              <a:buNone/>
-            </a:pPr>
-            <a:endParaRPr lang="en-US" dirty="0"/>
-          </a:p>
-          <a:p>
-            <a:pPr marL="0" indent="0">
-              <a:buNone/>
-            </a:pPr>
-            <a:endParaRPr lang="en-US" dirty="0"/>
-          </a:p>
-          <a:p>
-            <a:pPr marL="0" indent="0">
-              <a:buNone/>
-            </a:pPr>
-            <a:endParaRPr lang="en-US" dirty="0"/>
-          </a:p>
-          <a:p>
-            <a:pPr marL="0" indent="0">
-              <a:buNone/>
-            </a:pPr>
-            <a:r>
-              <a:rPr lang="en-US" dirty="0"/>
-              <a:t>1 atmosphere (atm) = 101,325 Pascals (Pa)</a:t>
-            </a:r>
-          </a:p>
-          <a:p>
-            <a:pPr marL="0" indent="0">
-              <a:buNone/>
-            </a:pPr>
-            <a:endParaRPr lang="en-US" dirty="0"/>
-          </a:p>
-          <a:p>
-            <a:pPr marL="0" indent="0">
-              <a:buNone/>
-            </a:pPr>
-            <a:endParaRPr lang="en-US" dirty="0"/>
-          </a:p>
-        </p:txBody>
-      </p:sp>
+      <mc:AlternateContent xmlns:mc="http://schemas.openxmlformats.org/markup-compatibility/2006">
+        <mc:Choice xmlns:a14="http://schemas.microsoft.com/office/drawing/2010/main" Requires="a14">
+          <p:sp>
+            <p:nvSpPr>
+              <p:cNvPr id="6" name="Content Placeholder 5">
+                <a:extLst>
+                  <a:ext uri="{FF2B5EF4-FFF2-40B4-BE49-F238E27FC236}">
+                    <a16:creationId xmlns:a16="http://schemas.microsoft.com/office/drawing/2014/main" id="{5714C4C0-0FC0-AD06-D333-60BD008C05EC}"/>
+                  </a:ext>
+                </a:extLst>
+              </p:cNvPr>
+              <p:cNvSpPr>
+                <a:spLocks noGrp="1"/>
+              </p:cNvSpPr>
+              <p:nvPr>
+                <p:ph idx="1"/>
+              </p:nvPr>
+            </p:nvSpPr>
+            <p:spPr/>
+            <p:txBody>
+              <a:bodyPr/>
+              <a:lstStyle/>
+              <a:p>
+                <a:pPr marL="0" indent="0">
+                  <a:buNone/>
+                </a:pPr>
+                <a:r>
+                  <a:rPr lang="en-US" i="1" dirty="0"/>
+                  <a:t>decimal point moves to right</a:t>
+                </a:r>
+              </a:p>
+              <a:p>
+                <a:pPr marL="0" indent="0">
+                  <a:buNone/>
+                </a:pPr>
+                <a:r>
+                  <a:rPr lang="en-US" dirty="0"/>
+                  <a:t>1. = 10</a:t>
+                </a:r>
+                <a:r>
+                  <a:rPr lang="en-US" baseline="30000" dirty="0"/>
+                  <a:t>0</a:t>
+                </a:r>
+              </a:p>
+              <a:p>
+                <a:pPr marL="0" indent="0">
+                  <a:buNone/>
+                </a:pPr>
+                <a:r>
+                  <a:rPr lang="en-US" dirty="0"/>
+                  <a:t>10. = 10</a:t>
+                </a:r>
+                <a:r>
+                  <a:rPr lang="en-US" baseline="30000" dirty="0"/>
+                  <a:t>1</a:t>
+                </a:r>
+              </a:p>
+              <a:p>
+                <a:pPr marL="0" indent="0">
+                  <a:buNone/>
+                </a:pPr>
+                <a:r>
+                  <a:rPr lang="en-US" dirty="0"/>
+                  <a:t>100. = 10</a:t>
+                </a:r>
+                <a:r>
+                  <a:rPr lang="en-US" baseline="30000" dirty="0"/>
+                  <a:t>2</a:t>
+                </a:r>
+              </a:p>
+              <a:p>
+                <a:pPr marL="0" indent="0">
+                  <a:buNone/>
+                </a:pPr>
+                <a:endParaRPr lang="en-US" baseline="30000" dirty="0"/>
+              </a:p>
+              <a:p>
+                <a:pPr marL="0" indent="0">
+                  <a:buNone/>
+                </a:pPr>
+                <a:r>
+                  <a:rPr lang="en-US" i="1" dirty="0"/>
+                  <a:t>decimal point moves to left</a:t>
+                </a:r>
+              </a:p>
+              <a:p>
+                <a:pPr marL="0" indent="0">
+                  <a:buNone/>
+                </a:pPr>
+                <a:r>
+                  <a:rPr lang="en-US" dirty="0"/>
+                  <a:t>0.1 = 10</a:t>
+                </a:r>
+                <a:r>
+                  <a:rPr lang="en-US" baseline="30000" dirty="0"/>
+                  <a:t>-1 </a:t>
+                </a:r>
+                <a:r>
+                  <a:rPr lang="en-US" dirty="0"/>
+                  <a:t>= 1/10 = </a:t>
+                </a:r>
+                <a14:m>
+                  <m:oMath xmlns:m="http://schemas.openxmlformats.org/officeDocument/2006/math">
+                    <m:f>
+                      <m:fPr>
+                        <m:ctrlPr>
+                          <a:rPr lang="en-US" i="1">
+                            <a:latin typeface="Cambria Math" panose="02040503050406030204" pitchFamily="18" charset="0"/>
+                          </a:rPr>
+                        </m:ctrlPr>
+                      </m:fPr>
+                      <m:num>
+                        <m:r>
+                          <a:rPr lang="en-US" i="1">
+                            <a:latin typeface="Cambria Math" panose="02040503050406030204" pitchFamily="18" charset="0"/>
+                          </a:rPr>
+                          <m:t>1</m:t>
+                        </m:r>
+                      </m:num>
+                      <m:den>
+                        <m:r>
+                          <a:rPr lang="en-US" i="1">
+                            <a:latin typeface="Cambria Math" panose="02040503050406030204" pitchFamily="18" charset="0"/>
+                          </a:rPr>
+                          <m:t>10</m:t>
+                        </m:r>
+                      </m:den>
+                    </m:f>
+                  </m:oMath>
+                </a14:m>
+                <a:r>
+                  <a:rPr lang="en-US" baseline="30000" dirty="0"/>
+                  <a:t> </a:t>
+                </a:r>
+                <a:r>
+                  <a:rPr lang="en-US" sz="1600" dirty="0"/>
+                  <a:t> (expressed in various ways)</a:t>
+                </a:r>
+                <a:endParaRPr lang="en-US" baseline="30000" dirty="0"/>
+              </a:p>
+              <a:p>
+                <a:pPr marL="0" indent="0">
+                  <a:buNone/>
+                </a:pPr>
+                <a:r>
+                  <a:rPr lang="en-US" dirty="0"/>
+                  <a:t>0.01 = 10</a:t>
+                </a:r>
+                <a:r>
+                  <a:rPr lang="en-US" baseline="30000" dirty="0"/>
+                  <a:t>-2</a:t>
+                </a:r>
+                <a:r>
+                  <a:rPr lang="en-US" dirty="0"/>
+                  <a:t> = 1/100 = </a:t>
+                </a:r>
+                <a14:m>
+                  <m:oMath xmlns:m="http://schemas.openxmlformats.org/officeDocument/2006/math">
+                    <m:f>
+                      <m:fPr>
+                        <m:ctrlPr>
+                          <a:rPr lang="en-US" i="1">
+                            <a:latin typeface="Cambria Math" panose="02040503050406030204" pitchFamily="18" charset="0"/>
+                          </a:rPr>
+                        </m:ctrlPr>
+                      </m:fPr>
+                      <m:num>
+                        <m:r>
+                          <a:rPr lang="en-US" i="1">
+                            <a:latin typeface="Cambria Math" panose="02040503050406030204" pitchFamily="18" charset="0"/>
+                          </a:rPr>
+                          <m:t>1</m:t>
+                        </m:r>
+                      </m:num>
+                      <m:den>
+                        <m:r>
+                          <a:rPr lang="en-US" i="1">
+                            <a:latin typeface="Cambria Math" panose="02040503050406030204" pitchFamily="18" charset="0"/>
+                          </a:rPr>
+                          <m:t>10</m:t>
+                        </m:r>
+                        <m:r>
+                          <a:rPr lang="en-US" b="0" i="1" smtClean="0">
+                            <a:latin typeface="Cambria Math" panose="02040503050406030204" pitchFamily="18" charset="0"/>
+                          </a:rPr>
+                          <m:t>0</m:t>
+                        </m:r>
+                      </m:den>
+                    </m:f>
+                  </m:oMath>
+                </a14:m>
+                <a:endParaRPr lang="en-US" baseline="30000" dirty="0"/>
+              </a:p>
+              <a:p>
+                <a:pPr marL="0" indent="0">
+                  <a:buNone/>
+                </a:pPr>
+                <a:r>
+                  <a:rPr lang="en-US" dirty="0"/>
+                  <a:t>0.001 = 10</a:t>
+                </a:r>
+                <a:r>
+                  <a:rPr lang="en-US" baseline="30000" dirty="0"/>
+                  <a:t>-3</a:t>
+                </a:r>
+                <a:r>
+                  <a:rPr lang="en-US" dirty="0"/>
+                  <a:t> = 1/1000 = </a:t>
+                </a:r>
+                <a14:m>
+                  <m:oMath xmlns:m="http://schemas.openxmlformats.org/officeDocument/2006/math">
+                    <m:f>
+                      <m:fPr>
+                        <m:ctrlPr>
+                          <a:rPr lang="en-US" i="1">
+                            <a:latin typeface="Cambria Math" panose="02040503050406030204" pitchFamily="18" charset="0"/>
+                          </a:rPr>
+                        </m:ctrlPr>
+                      </m:fPr>
+                      <m:num>
+                        <m:r>
+                          <a:rPr lang="en-US" i="1">
+                            <a:latin typeface="Cambria Math" panose="02040503050406030204" pitchFamily="18" charset="0"/>
+                          </a:rPr>
+                          <m:t>1</m:t>
+                        </m:r>
+                      </m:num>
+                      <m:den>
+                        <m:r>
+                          <a:rPr lang="en-US" i="1">
+                            <a:latin typeface="Cambria Math" panose="02040503050406030204" pitchFamily="18" charset="0"/>
+                          </a:rPr>
+                          <m:t>10</m:t>
+                        </m:r>
+                        <m:r>
+                          <a:rPr lang="en-US" i="1">
+                            <a:latin typeface="Cambria Math" panose="02040503050406030204" pitchFamily="18" charset="0"/>
+                          </a:rPr>
+                          <m:t>0</m:t>
+                        </m:r>
+                        <m:r>
+                          <a:rPr lang="en-US" b="0" i="1" smtClean="0">
+                            <a:latin typeface="Cambria Math" panose="02040503050406030204" pitchFamily="18" charset="0"/>
+                          </a:rPr>
+                          <m:t>0</m:t>
+                        </m:r>
+                      </m:den>
+                    </m:f>
+                  </m:oMath>
+                </a14:m>
+                <a:endParaRPr lang="en-US" baseline="30000" dirty="0"/>
+              </a:p>
+              <a:p>
+                <a:pPr marL="0" indent="0">
+                  <a:buNone/>
+                </a:pPr>
+                <a:endParaRPr lang="en-US" baseline="30000" dirty="0"/>
+              </a:p>
+              <a:p>
+                <a:pPr marL="0" indent="0">
+                  <a:buNone/>
+                </a:pPr>
+                <a:endParaRPr lang="en-US" dirty="0"/>
+              </a:p>
+              <a:p>
+                <a:pPr marL="0" indent="0">
+                  <a:buNone/>
+                </a:pPr>
+                <a:endParaRPr lang="en-US" dirty="0"/>
+              </a:p>
+              <a:p>
+                <a:pPr marL="0" indent="0">
+                  <a:buNone/>
+                </a:pPr>
+                <a:endParaRPr lang="en-US" dirty="0"/>
+              </a:p>
+              <a:p>
+                <a:pPr marL="0" indent="0">
+                  <a:buNone/>
+                </a:pPr>
+                <a:r>
+                  <a:rPr lang="en-US" dirty="0"/>
+                  <a:t>1 atmosphere (atm) = 101,325 Pascals (Pa)</a:t>
+                </a:r>
+              </a:p>
+              <a:p>
+                <a:pPr marL="0" indent="0">
+                  <a:buNone/>
+                </a:pPr>
+                <a:endParaRPr lang="en-US" dirty="0"/>
+              </a:p>
+              <a:p>
+                <a:pPr marL="0" indent="0">
+                  <a:buNone/>
+                </a:pPr>
+                <a:endParaRPr lang="en-US" dirty="0"/>
+              </a:p>
+            </p:txBody>
+          </p:sp>
+        </mc:Choice>
+        <mc:Fallback>
+          <p:sp>
+            <p:nvSpPr>
+              <p:cNvPr id="6" name="Content Placeholder 5">
+                <a:extLst>
+                  <a:ext uri="{FF2B5EF4-FFF2-40B4-BE49-F238E27FC236}">
+                    <a16:creationId xmlns:a16="http://schemas.microsoft.com/office/drawing/2014/main" id="{5714C4C0-0FC0-AD06-D333-60BD008C05EC}"/>
+                  </a:ext>
+                </a:extLst>
+              </p:cNvPr>
+              <p:cNvSpPr>
+                <a:spLocks noGrp="1" noRot="1" noChangeAspect="1" noMove="1" noResize="1" noEditPoints="1" noAdjustHandles="1" noChangeArrowheads="1" noChangeShapeType="1" noTextEdit="1"/>
+              </p:cNvSpPr>
+              <p:nvPr>
+                <p:ph idx="1"/>
+              </p:nvPr>
+            </p:nvSpPr>
+            <p:spPr>
+              <a:blipFill>
+                <a:blip r:embed="rId2"/>
+                <a:stretch>
+                  <a:fillRect l="-1090" t="-936" b="-25848"/>
+                </a:stretch>
+              </a:blipFill>
+            </p:spPr>
+            <p:txBody>
+              <a:bodyPr/>
+              <a:lstStyle/>
+              <a:p>
+                <a:r>
+                  <a:rPr lang="en-US">
+                    <a:noFill/>
+                  </a:rPr>
+                  <a:t> </a:t>
+                </a:r>
+              </a:p>
+            </p:txBody>
+          </p:sp>
+        </mc:Fallback>
+      </mc:AlternateContent>
     </p:spTree>
     <p:extLst>
       <p:ext uri="{BB962C8B-B14F-4D97-AF65-F5344CB8AC3E}">
@@ -42722,6 +43035,19 @@
           <a:bodyPr/>
           <a:lstStyle/>
           <a:p>
+            <a:pPr marL="0" indent="0">
+              <a:buNone/>
+            </a:pPr>
+            <a:r>
+              <a:rPr lang="en-US" sz="1800" i="1" dirty="0">
+                <a:solidFill>
+                  <a:srgbClr val="CC99FF"/>
+                </a:solidFill>
+              </a:rPr>
+              <a:t>Reiterating #3</a:t>
+            </a:r>
+          </a:p>
+          <a:p>
             <a:pPr marL="457200" indent="-457200">
               <a:buFont typeface="+mj-lt"/>
               <a:buAutoNum type="arabicPeriod" startAt="3"/>
@@ -43063,9 +43389,23 @@
           <a:bodyPr/>
           <a:lstStyle/>
           <a:p>
+            <a:pPr marL="0" indent="0">
+              <a:buNone/>
+              <a:defRPr/>
+            </a:pPr>
+            <a:r>
+              <a:rPr lang="en-US" i="1" dirty="0">
+                <a:solidFill>
+                  <a:srgbClr val="CC99FF"/>
+                </a:solidFill>
+              </a:rPr>
+              <a:t>Reiterating #4</a:t>
+            </a:r>
+          </a:p>
+          <a:p>
             <a:pPr marL="457200" lvl="0" indent="-457200">
               <a:buFont typeface="+mj-lt"/>
-              <a:buAutoNum type="arabicPeriod"/>
+              <a:buAutoNum type="arabicPeriod" startAt="4"/>
               <a:defRPr/>
             </a:pPr>
             <a:r>

</xml_diff>